<commit_message>
Deleted a slide from presentation and added another one at the end
</commit_message>
<xml_diff>
--- a/Design Patterns Part 1.pptx
+++ b/Design Patterns Part 1.pptx
@@ -20,11 +20,11 @@
     <p:sldId id="317" r:id="rId11"/>
     <p:sldId id="318" r:id="rId12"/>
     <p:sldId id="319" r:id="rId13"/>
-    <p:sldId id="320" r:id="rId14"/>
-    <p:sldId id="321" r:id="rId15"/>
-    <p:sldId id="322" r:id="rId16"/>
-    <p:sldId id="323" r:id="rId17"/>
-    <p:sldId id="324" r:id="rId18"/>
+    <p:sldId id="321" r:id="rId14"/>
+    <p:sldId id="322" r:id="rId15"/>
+    <p:sldId id="323" r:id="rId16"/>
+    <p:sldId id="324" r:id="rId17"/>
+    <p:sldId id="325" r:id="rId18"/>
     <p:sldId id="274" r:id="rId19"/>
   </p:sldIdLst>
   <p:sldSz cx="9144000" cy="6858000" type="screen4x3"/>
@@ -263,7 +263,7 @@
               <a:pPr>
                 <a:defRPr/>
               </a:pPr>
-              <a:t>5/26/2012</a:t>
+              <a:t>5/27/2012</a:t>
             </a:fld>
             <a:endParaRPr lang="en-US"/>
           </a:p>
@@ -441,7 +441,7 @@
               <a:pPr>
                 <a:defRPr/>
               </a:pPr>
-              <a:t>5/26/2012</a:t>
+              <a:t>5/27/2012</a:t>
             </a:fld>
             <a:endParaRPr lang="en-US"/>
           </a:p>
@@ -3129,7 +3129,7 @@
             <a:pPr eaLnBrk="1" hangingPunct="1"/>
             <a:r>
               <a:rPr lang="en-US" dirty="0" smtClean="0"/>
-              <a:t>Behavioral Patterns</a:t>
+              <a:t>Observer Pattern</a:t>
             </a:r>
           </a:p>
         </p:txBody>
@@ -3197,204 +3197,6 @@
           <a:bodyPr/>
           <a:lstStyle/>
           <a:p>
-            <a:r>
-              <a:rPr lang="en-US" b="1" dirty="0" smtClean="0"/>
-              <a:t>Strategy </a:t>
-            </a:r>
-            <a:r>
-              <a:rPr lang="en-US" dirty="0" smtClean="0"/>
-              <a:t>– Creates new objects by cloning of a few stored prototypes</a:t>
-            </a:r>
-          </a:p>
-          <a:p>
-            <a:r>
-              <a:rPr lang="en-US" b="1" dirty="0" smtClean="0"/>
-              <a:t>State </a:t>
-            </a:r>
-            <a:r>
-              <a:rPr lang="en-US" dirty="0" smtClean="0"/>
-              <a:t>– Method decides which concrete implementation</a:t>
-            </a:r>
-          </a:p>
-          <a:p>
-            <a:r>
-              <a:rPr lang="en-US" b="1" dirty="0" smtClean="0"/>
-              <a:t>Template Method </a:t>
-            </a:r>
-            <a:r>
-              <a:rPr lang="en-US" dirty="0" smtClean="0"/>
-              <a:t>– One instance of a class with global access</a:t>
-            </a:r>
-          </a:p>
-          <a:p>
-            <a:r>
-              <a:rPr lang="en-US" b="1" dirty="0" smtClean="0"/>
-              <a:t>Chain of Responsibility </a:t>
-            </a:r>
-            <a:r>
-              <a:rPr lang="en-US" dirty="0" smtClean="0"/>
-              <a:t>– Creates new objects by cloning of a few stored prototypes</a:t>
-            </a:r>
-          </a:p>
-          <a:p>
-            <a:r>
-              <a:rPr lang="en-US" b="1" dirty="0" err="1" smtClean="0"/>
-              <a:t>Iterator</a:t>
-            </a:r>
-            <a:r>
-              <a:rPr lang="en-US" b="1" dirty="0" smtClean="0"/>
-              <a:t> </a:t>
-            </a:r>
-            <a:r>
-              <a:rPr lang="en-US" dirty="0" smtClean="0"/>
-              <a:t>– Method decides which concrete implementation</a:t>
-            </a:r>
-          </a:p>
-          <a:p>
-            <a:r>
-              <a:rPr lang="en-US" b="1" dirty="0" smtClean="0"/>
-              <a:t>Mediator </a:t>
-            </a:r>
-            <a:r>
-              <a:rPr lang="en-US" dirty="0" smtClean="0"/>
-              <a:t>– One instance of a class with global access</a:t>
-            </a:r>
-          </a:p>
-          <a:p>
-            <a:endParaRPr lang="en-US" dirty="0" smtClean="0"/>
-          </a:p>
-        </p:txBody>
-      </p:sp>
-    </p:spTree>
-  </p:cSld>
-  <p:clrMapOvr>
-    <a:masterClrMapping/>
-  </p:clrMapOvr>
-  <p:timing>
-    <p:tnLst>
-      <p:par>
-        <p:cTn id="1" dur="indefinite" restart="never" nodeType="tmRoot"/>
-      </p:par>
-    </p:tnLst>
-  </p:timing>
-</p:sld>
-</file>
-
-<file path=ppt/slides/slide11.xml><?xml version="1.0" encoding="utf-8"?>
-<p:sld xmlns:a="http://schemas.openxmlformats.org/drawingml/2006/main" xmlns:r="http://schemas.openxmlformats.org/officeDocument/2006/relationships" xmlns:p="http://schemas.openxmlformats.org/presentationml/2006/main">
-  <p:cSld>
-    <p:spTree>
-      <p:nvGrpSpPr>
-        <p:cNvPr id="1" name=""/>
-        <p:cNvGrpSpPr/>
-        <p:nvPr/>
-      </p:nvGrpSpPr>
-      <p:grpSpPr>
-        <a:xfrm>
-          <a:off x="0" y="0"/>
-          <a:ext cx="0" cy="0"/>
-          <a:chOff x="0" y="0"/>
-          <a:chExt cx="0" cy="0"/>
-        </a:xfrm>
-      </p:grpSpPr>
-      <p:sp>
-        <p:nvSpPr>
-          <p:cNvPr id="3074" name="Title 1"/>
-          <p:cNvSpPr>
-            <a:spLocks noGrp="1"/>
-          </p:cNvSpPr>
-          <p:nvPr>
-            <p:ph type="title"/>
-          </p:nvPr>
-        </p:nvSpPr>
-        <p:spPr bwMode="auto">
-          <a:noFill/>
-          <a:ln>
-            <a:miter lim="800000"/>
-            <a:headEnd/>
-            <a:tailEnd/>
-          </a:ln>
-        </p:spPr>
-        <p:txBody>
-          <a:bodyPr vert="horz" wrap="square" lIns="91440" tIns="45720" rIns="91440" bIns="45720" numCol="1" anchor="t" anchorCtr="0" compatLnSpc="1">
-            <a:prstTxWarp prst="textNoShape">
-              <a:avLst/>
-            </a:prstTxWarp>
-          </a:bodyPr>
-          <a:lstStyle/>
-          <a:p>
-            <a:pPr eaLnBrk="1" hangingPunct="1"/>
-            <a:r>
-              <a:rPr lang="en-US" dirty="0" smtClean="0"/>
-              <a:t>Observer Pattern</a:t>
-            </a:r>
-            <a:endParaRPr lang="en-US" dirty="0" smtClean="0"/>
-          </a:p>
-        </p:txBody>
-      </p:sp>
-      <p:sp>
-        <p:nvSpPr>
-          <p:cNvPr id="4" name="Rectangle 3"/>
-          <p:cNvSpPr/>
-          <p:nvPr/>
-        </p:nvSpPr>
-        <p:spPr>
-          <a:xfrm>
-            <a:off x="2514600" y="6553200"/>
-            <a:ext cx="4114800" cy="228600"/>
-          </a:xfrm>
-          <a:prstGeom prst="rect">
-            <a:avLst/>
-          </a:prstGeom>
-          <a:solidFill>
-            <a:schemeClr val="bg1"/>
-          </a:solidFill>
-          <a:ln>
-            <a:solidFill>
-              <a:schemeClr val="bg1"/>
-            </a:solidFill>
-          </a:ln>
-        </p:spPr>
-        <p:style>
-          <a:lnRef idx="2">
-            <a:schemeClr val="accent1">
-              <a:shade val="50000"/>
-            </a:schemeClr>
-          </a:lnRef>
-          <a:fillRef idx="1">
-            <a:schemeClr val="accent1"/>
-          </a:fillRef>
-          <a:effectRef idx="0">
-            <a:schemeClr val="accent1"/>
-          </a:effectRef>
-          <a:fontRef idx="minor">
-            <a:schemeClr val="lt1"/>
-          </a:fontRef>
-        </p:style>
-        <p:txBody>
-          <a:bodyPr rtlCol="0" anchor="ctr"/>
-          <a:lstStyle/>
-          <a:p>
-            <a:pPr algn="ctr"/>
-            <a:endParaRPr lang="en-US"/>
-          </a:p>
-        </p:txBody>
-      </p:sp>
-      <p:sp>
-        <p:nvSpPr>
-          <p:cNvPr id="13" name="Text Placeholder 12"/>
-          <p:cNvSpPr>
-            <a:spLocks noGrp="1"/>
-          </p:cNvSpPr>
-          <p:nvPr>
-            <p:ph type="body" sz="quarter" idx="10"/>
-          </p:nvPr>
-        </p:nvSpPr>
-        <p:spPr/>
-        <p:txBody>
-          <a:bodyPr/>
-          <a:lstStyle/>
-          <a:p>
             <a:pPr>
               <a:buNone/>
             </a:pPr>
@@ -3402,7 +3204,6 @@
               <a:rPr lang="en-US" dirty="0" smtClean="0"/>
               <a:t>Publisher/Subscriber</a:t>
             </a:r>
-            <a:endParaRPr lang="en-US" dirty="0" smtClean="0"/>
           </a:p>
         </p:txBody>
       </p:sp>
@@ -3453,7 +3254,7 @@
 </p:sld>
 </file>
 
-<file path=ppt/slides/slide12.xml><?xml version="1.0" encoding="utf-8"?>
+<file path=ppt/slides/slide11.xml><?xml version="1.0" encoding="utf-8"?>
 <p:sld xmlns:a="http://schemas.openxmlformats.org/drawingml/2006/main" xmlns:r="http://schemas.openxmlformats.org/officeDocument/2006/relationships" xmlns:p="http://schemas.openxmlformats.org/presentationml/2006/main">
   <p:cSld>
     <p:spTree>
@@ -3501,7 +3302,6 @@
               <a:rPr lang="en-US" dirty="0" smtClean="0"/>
               <a:t>Singleton Pattern</a:t>
             </a:r>
-            <a:endParaRPr lang="en-US" dirty="0" smtClean="0"/>
           </a:p>
         </p:txBody>
       </p:sp>
@@ -3575,7 +3375,6 @@
               <a:rPr lang="en-US" dirty="0" smtClean="0"/>
               <a:t>Single Instance across the application</a:t>
             </a:r>
-            <a:endParaRPr lang="en-US" dirty="0" smtClean="0"/>
           </a:p>
         </p:txBody>
       </p:sp>
@@ -3626,7 +3425,7 @@
 </p:sld>
 </file>
 
-<file path=ppt/slides/slide13.xml><?xml version="1.0" encoding="utf-8"?>
+<file path=ppt/slides/slide12.xml><?xml version="1.0" encoding="utf-8"?>
 <p:sld xmlns:a="http://schemas.openxmlformats.org/drawingml/2006/main" xmlns:r="http://schemas.openxmlformats.org/officeDocument/2006/relationships" xmlns:p="http://schemas.openxmlformats.org/presentationml/2006/main">
   <p:cSld>
     <p:spTree>
@@ -3674,7 +3473,6 @@
               <a:rPr lang="en-US" dirty="0" smtClean="0"/>
               <a:t>Chain of Responsibility</a:t>
             </a:r>
-            <a:endParaRPr lang="en-US" dirty="0" smtClean="0"/>
           </a:p>
         </p:txBody>
       </p:sp>
@@ -3748,7 +3546,6 @@
               <a:rPr lang="en-US" dirty="0" smtClean="0"/>
               <a:t>.</a:t>
             </a:r>
-            <a:endParaRPr lang="en-US" dirty="0" smtClean="0"/>
           </a:p>
         </p:txBody>
       </p:sp>
@@ -3799,7 +3596,7 @@
 </p:sld>
 </file>
 
-<file path=ppt/slides/slide14.xml><?xml version="1.0" encoding="utf-8"?>
+<file path=ppt/slides/slide13.xml><?xml version="1.0" encoding="utf-8"?>
 <p:sld xmlns:a="http://schemas.openxmlformats.org/drawingml/2006/main" xmlns:r="http://schemas.openxmlformats.org/officeDocument/2006/relationships" xmlns:p="http://schemas.openxmlformats.org/presentationml/2006/main">
   <p:cSld>
     <p:spTree>
@@ -3847,7 +3644,6 @@
               <a:rPr lang="en-US" dirty="0" smtClean="0"/>
               <a:t>Factory Method</a:t>
             </a:r>
-            <a:endParaRPr lang="en-US" dirty="0" smtClean="0"/>
           </a:p>
         </p:txBody>
       </p:sp>
@@ -3921,7 +3717,146 @@
               <a:rPr lang="en-US" dirty="0" smtClean="0"/>
               <a:t>.</a:t>
             </a:r>
+          </a:p>
+        </p:txBody>
+      </p:sp>
+    </p:spTree>
+  </p:cSld>
+  <p:clrMapOvr>
+    <a:masterClrMapping/>
+  </p:clrMapOvr>
+  <p:timing>
+    <p:tnLst>
+      <p:par>
+        <p:cTn id="1" dur="indefinite" restart="never" nodeType="tmRoot"/>
+      </p:par>
+    </p:tnLst>
+  </p:timing>
+</p:sld>
+</file>
+
+<file path=ppt/slides/slide14.xml><?xml version="1.0" encoding="utf-8"?>
+<p:sld xmlns:a="http://schemas.openxmlformats.org/drawingml/2006/main" xmlns:r="http://schemas.openxmlformats.org/officeDocument/2006/relationships" xmlns:p="http://schemas.openxmlformats.org/presentationml/2006/main">
+  <p:cSld>
+    <p:spTree>
+      <p:nvGrpSpPr>
+        <p:cNvPr id="1" name=""/>
+        <p:cNvGrpSpPr/>
+        <p:nvPr/>
+      </p:nvGrpSpPr>
+      <p:grpSpPr>
+        <a:xfrm>
+          <a:off x="0" y="0"/>
+          <a:ext cx="0" cy="0"/>
+          <a:chOff x="0" y="0"/>
+          <a:chExt cx="0" cy="0"/>
+        </a:xfrm>
+      </p:grpSpPr>
+      <p:sp>
+        <p:nvSpPr>
+          <p:cNvPr id="3074" name="Title 1"/>
+          <p:cNvSpPr>
+            <a:spLocks noGrp="1"/>
+          </p:cNvSpPr>
+          <p:nvPr>
+            <p:ph type="title"/>
+          </p:nvPr>
+        </p:nvSpPr>
+        <p:spPr bwMode="auto">
+          <a:noFill/>
+          <a:ln>
+            <a:miter lim="800000"/>
+            <a:headEnd/>
+            <a:tailEnd/>
+          </a:ln>
+        </p:spPr>
+        <p:txBody>
+          <a:bodyPr vert="horz" wrap="square" lIns="91440" tIns="45720" rIns="91440" bIns="45720" numCol="1" anchor="t" anchorCtr="0" compatLnSpc="1">
+            <a:prstTxWarp prst="textNoShape">
+              <a:avLst/>
+            </a:prstTxWarp>
+          </a:bodyPr>
+          <a:lstStyle/>
+          <a:p>
+            <a:pPr eaLnBrk="1" hangingPunct="1"/>
+            <a:r>
+              <a:rPr lang="en-US" dirty="0" smtClean="0"/>
+              <a:t>Strategy</a:t>
+            </a:r>
             <a:endParaRPr lang="en-US" dirty="0" smtClean="0"/>
+          </a:p>
+        </p:txBody>
+      </p:sp>
+      <p:sp>
+        <p:nvSpPr>
+          <p:cNvPr id="4" name="Rectangle 3"/>
+          <p:cNvSpPr/>
+          <p:nvPr/>
+        </p:nvSpPr>
+        <p:spPr>
+          <a:xfrm>
+            <a:off x="2514600" y="6553200"/>
+            <a:ext cx="4114800" cy="228600"/>
+          </a:xfrm>
+          <a:prstGeom prst="rect">
+            <a:avLst/>
+          </a:prstGeom>
+          <a:solidFill>
+            <a:schemeClr val="bg1"/>
+          </a:solidFill>
+          <a:ln>
+            <a:solidFill>
+              <a:schemeClr val="bg1"/>
+            </a:solidFill>
+          </a:ln>
+        </p:spPr>
+        <p:style>
+          <a:lnRef idx="2">
+            <a:schemeClr val="accent1">
+              <a:shade val="50000"/>
+            </a:schemeClr>
+          </a:lnRef>
+          <a:fillRef idx="1">
+            <a:schemeClr val="accent1"/>
+          </a:fillRef>
+          <a:effectRef idx="0">
+            <a:schemeClr val="accent1"/>
+          </a:effectRef>
+          <a:fontRef idx="minor">
+            <a:schemeClr val="lt1"/>
+          </a:fontRef>
+        </p:style>
+        <p:txBody>
+          <a:bodyPr rtlCol="0" anchor="ctr"/>
+          <a:lstStyle/>
+          <a:p>
+            <a:pPr algn="ctr"/>
+            <a:endParaRPr lang="en-US"/>
+          </a:p>
+        </p:txBody>
+      </p:sp>
+      <p:sp>
+        <p:nvSpPr>
+          <p:cNvPr id="13" name="Text Placeholder 12"/>
+          <p:cNvSpPr>
+            <a:spLocks noGrp="1"/>
+          </p:cNvSpPr>
+          <p:nvPr>
+            <p:ph type="body" sz="quarter" idx="10"/>
+          </p:nvPr>
+        </p:nvSpPr>
+        <p:spPr/>
+        <p:txBody>
+          <a:bodyPr/>
+          <a:lstStyle/>
+          <a:p>
+            <a:pPr>
+              <a:buNone/>
+            </a:pPr>
+            <a:r>
+              <a:rPr lang="en-US" dirty="0" smtClean="0"/>
+              <a:t>.</a:t>
+            </a:r>
           </a:p>
         </p:txBody>
       </p:sp>
@@ -6557,15 +6492,7 @@
             </a:pPr>
             <a:r>
               <a:rPr lang="en-US" sz="2000" dirty="0" smtClean="0"/>
-              <a:t>Specific Areas such as architecture, UI, </a:t>
-            </a:r>
-            <a:r>
-              <a:rPr lang="en-US" sz="2000" dirty="0" smtClean="0"/>
-              <a:t>concurrency</a:t>
-            </a:r>
-            <a:r>
-              <a:rPr lang="en-US" sz="2000" dirty="0" smtClean="0"/>
-              <a:t>, security</a:t>
+              <a:t>Specific Areas such as architecture, UI, concurrency, security</a:t>
             </a:r>
           </a:p>
           <a:p>
@@ -7703,13 +7630,8 @@
             </a:r>
             <a:r>
               <a:rPr lang="en-US" dirty="0" smtClean="0"/>
-              <a:t>– </a:t>
-            </a:r>
-            <a:r>
-              <a:rPr lang="en-US" dirty="0" smtClean="0"/>
-              <a:t>Defines and performs new operations on all elements of an existing structure</a:t>
-            </a:r>
-            <a:endParaRPr lang="en-US" dirty="0" smtClean="0"/>
+              <a:t>– Defines and performs new operations on all elements of an existing structure</a:t>
+            </a:r>
           </a:p>
           <a:p>
             <a:r>
@@ -7718,13 +7640,8 @@
             </a:r>
             <a:r>
               <a:rPr lang="en-US" dirty="0" smtClean="0"/>
-              <a:t>– </a:t>
-            </a:r>
-            <a:r>
-              <a:rPr lang="en-US" dirty="0" smtClean="0"/>
-              <a:t>?</a:t>
-            </a:r>
-            <a:endParaRPr lang="en-US" dirty="0" smtClean="0"/>
+              <a:t>– ?</a:t>
+            </a:r>
           </a:p>
           <a:p>
             <a:r>
@@ -7733,11 +7650,7 @@
             </a:r>
             <a:r>
               <a:rPr lang="en-US" dirty="0" smtClean="0"/>
-              <a:t>– </a:t>
-            </a:r>
-            <a:r>
-              <a:rPr lang="en-US" dirty="0" smtClean="0"/>
-              <a:t>Captures the state of an object’s internal state and saves externally</a:t>
+              <a:t>– Captures the state of an object’s internal state and saves externally</a:t>
             </a:r>
           </a:p>
           <a:p>
@@ -8632,6 +8545,21 @@
 </file>
 
 <file path=customXml/item1.xml><?xml version="1.0" encoding="utf-8"?>
+<?mso-contentType ?>
+<FormTemplates xmlns="http://schemas.microsoft.com/sharepoint/v3/contenttype/forms">
+  <Display>DocumentLibraryForm</Display>
+  <Edit>DocumentLibraryForm</Edit>
+  <New>DocumentLibraryForm</New>
+</FormTemplates>
+</file>
+
+<file path=customXml/item2.xml><?xml version="1.0" encoding="utf-8"?>
+<p:properties xmlns:p="http://schemas.microsoft.com/office/2006/metadata/properties" xmlns:xsi="http://www.w3.org/2001/XMLSchema-instance">
+  <documentManagement/>
+</p:properties>
+</file>
+
+<file path=customXml/item3.xml><?xml version="1.0" encoding="utf-8"?>
 <ct:contentTypeSchema xmlns:ct="http://schemas.microsoft.com/office/2006/metadata/contentType" xmlns:ma="http://schemas.microsoft.com/office/2006/metadata/properties/metaAttributes" ct:_="" ma:_="" ma:contentTypeName="Document" ma:contentTypeID="0x010100081EEA846D466D42A2F8C262663B0874" ma:contentTypeVersion="0" ma:contentTypeDescription="Create a new document." ma:contentTypeScope="" ma:versionID="bb71263b1de598fc4454cb39f55dc523">
   <xsd:schema xmlns:xsd="http://www.w3.org/2001/XMLSchema" xmlns:p="http://schemas.microsoft.com/office/2006/metadata/properties" targetNamespace="http://schemas.microsoft.com/office/2006/metadata/properties" ma:root="true" ma:fieldsID="4aeb20c0e3442673af7ee10786458764">
     <xsd:element name="properties">
@@ -8680,32 +8608,10 @@
 </ct:contentTypeSchema>
 </file>
 
-<file path=customXml/item2.xml><?xml version="1.0" encoding="utf-8"?>
-<p:properties xmlns:p="http://schemas.microsoft.com/office/2006/metadata/properties" xmlns:xsi="http://www.w3.org/2001/XMLSchema-instance">
-  <documentManagement/>
-</p:properties>
-</file>
-
-<file path=customXml/item3.xml><?xml version="1.0" encoding="utf-8"?>
-<?mso-contentType ?>
-<FormTemplates xmlns="http://schemas.microsoft.com/sharepoint/v3/contenttype/forms">
-  <Display>DocumentLibraryForm</Display>
-  <Edit>DocumentLibraryForm</Edit>
-  <New>DocumentLibraryForm</New>
-</FormTemplates>
-</file>
-
 <file path=customXml/itemProps1.xml><?xml version="1.0" encoding="utf-8"?>
-<ds:datastoreItem xmlns:ds="http://schemas.openxmlformats.org/officeDocument/2006/customXml" ds:itemID="{ADBD3571-0B2C-4EE2-BC06-1BEB32539D86}">
+<ds:datastoreItem xmlns:ds="http://schemas.openxmlformats.org/officeDocument/2006/customXml" ds:itemID="{B8CDF88D-34F6-4273-95F6-DA3DE3684139}">
   <ds:schemaRefs>
-    <ds:schemaRef ds:uri="http://schemas.microsoft.com/office/2006/metadata/contentType"/>
-    <ds:schemaRef ds:uri="http://schemas.microsoft.com/office/2006/metadata/properties/metaAttributes"/>
-    <ds:schemaRef ds:uri="http://www.w3.org/2001/XMLSchema"/>
-    <ds:schemaRef ds:uri="http://schemas.microsoft.com/office/2006/metadata/properties"/>
-    <ds:schemaRef ds:uri="http://schemas.openxmlformats.org/package/2006/metadata/core-properties"/>
-    <ds:schemaRef ds:uri="http://purl.org/dc/elements/1.1/"/>
-    <ds:schemaRef ds:uri="http://purl.org/dc/terms/"/>
-    <ds:schemaRef ds:uri="http://schemas.microsoft.com/office/internal/2005/internalDocumentation"/>
+    <ds:schemaRef ds:uri="http://schemas.microsoft.com/sharepoint/v3/contenttype/forms"/>
   </ds:schemaRefs>
 </ds:datastoreItem>
 </file>
@@ -8725,9 +8631,16 @@
 </file>
 
 <file path=customXml/itemProps3.xml><?xml version="1.0" encoding="utf-8"?>
-<ds:datastoreItem xmlns:ds="http://schemas.openxmlformats.org/officeDocument/2006/customXml" ds:itemID="{B8CDF88D-34F6-4273-95F6-DA3DE3684139}">
+<ds:datastoreItem xmlns:ds="http://schemas.openxmlformats.org/officeDocument/2006/customXml" ds:itemID="{ADBD3571-0B2C-4EE2-BC06-1BEB32539D86}">
   <ds:schemaRefs>
-    <ds:schemaRef ds:uri="http://schemas.microsoft.com/sharepoint/v3/contenttype/forms"/>
+    <ds:schemaRef ds:uri="http://schemas.microsoft.com/office/2006/metadata/contentType"/>
+    <ds:schemaRef ds:uri="http://schemas.microsoft.com/office/2006/metadata/properties/metaAttributes"/>
+    <ds:schemaRef ds:uri="http://www.w3.org/2001/XMLSchema"/>
+    <ds:schemaRef ds:uri="http://schemas.microsoft.com/office/2006/metadata/properties"/>
+    <ds:schemaRef ds:uri="http://schemas.openxmlformats.org/package/2006/metadata/core-properties"/>
+    <ds:schemaRef ds:uri="http://purl.org/dc/elements/1.1/"/>
+    <ds:schemaRef ds:uri="http://purl.org/dc/terms/"/>
+    <ds:schemaRef ds:uri="http://schemas.microsoft.com/office/internal/2005/internalDocumentation"/>
   </ds:schemaRefs>
 </ds:datastoreItem>
 </file>
</xml_diff>

<commit_message>
Updated the training slide with the goals for the presentation
</commit_message>
<xml_diff>
--- a/Design Patterns Part 1.pptx
+++ b/Design Patterns Part 1.pptx
@@ -5,37 +5,38 @@
     <p:sldMasterId id="2147483822" r:id="rId4"/>
   </p:sldMasterIdLst>
   <p:notesMasterIdLst>
-    <p:notesMasterId r:id="rId20"/>
+    <p:notesMasterId r:id="rId21"/>
   </p:notesMasterIdLst>
   <p:handoutMasterIdLst>
-    <p:handoutMasterId r:id="rId21"/>
+    <p:handoutMasterId r:id="rId22"/>
   </p:handoutMasterIdLst>
   <p:sldIdLst>
     <p:sldId id="256" r:id="rId5"/>
     <p:sldId id="309" r:id="rId6"/>
-    <p:sldId id="311" r:id="rId7"/>
-    <p:sldId id="261" r:id="rId8"/>
-    <p:sldId id="280" r:id="rId9"/>
-    <p:sldId id="315" r:id="rId10"/>
-    <p:sldId id="317" r:id="rId11"/>
-    <p:sldId id="318" r:id="rId12"/>
-    <p:sldId id="319" r:id="rId13"/>
-    <p:sldId id="321" r:id="rId14"/>
-    <p:sldId id="322" r:id="rId15"/>
-    <p:sldId id="323" r:id="rId16"/>
-    <p:sldId id="324" r:id="rId17"/>
-    <p:sldId id="325" r:id="rId18"/>
-    <p:sldId id="274" r:id="rId19"/>
+    <p:sldId id="326" r:id="rId7"/>
+    <p:sldId id="311" r:id="rId8"/>
+    <p:sldId id="261" r:id="rId9"/>
+    <p:sldId id="280" r:id="rId10"/>
+    <p:sldId id="315" r:id="rId11"/>
+    <p:sldId id="317" r:id="rId12"/>
+    <p:sldId id="318" r:id="rId13"/>
+    <p:sldId id="319" r:id="rId14"/>
+    <p:sldId id="321" r:id="rId15"/>
+    <p:sldId id="322" r:id="rId16"/>
+    <p:sldId id="323" r:id="rId17"/>
+    <p:sldId id="324" r:id="rId18"/>
+    <p:sldId id="325" r:id="rId19"/>
+    <p:sldId id="274" r:id="rId20"/>
   </p:sldIdLst>
   <p:sldSz cx="9144000" cy="6858000" type="screen4x3"/>
   <p:notesSz cx="7010400" cy="9296400"/>
   <p:embeddedFontLst>
     <p:embeddedFont>
       <p:font typeface="Calibri" pitchFamily="34" charset="0"/>
-      <p:regular r:id="rId22"/>
-      <p:bold r:id="rId23"/>
-      <p:italic r:id="rId24"/>
-      <p:boldItalic r:id="rId25"/>
+      <p:regular r:id="rId23"/>
+      <p:bold r:id="rId24"/>
+      <p:italic r:id="rId25"/>
+      <p:boldItalic r:id="rId26"/>
     </p:embeddedFont>
   </p:embeddedFontLst>
   <p:defaultTextStyle>
@@ -1180,6 +1181,93 @@
 </p:notes>
 </file>
 
+<file path=ppt/notesSlides/notesSlide14.xml><?xml version="1.0" encoding="utf-8"?>
+<p:notes xmlns:a="http://schemas.openxmlformats.org/drawingml/2006/main" xmlns:r="http://schemas.openxmlformats.org/officeDocument/2006/relationships" xmlns:p="http://schemas.openxmlformats.org/presentationml/2006/main">
+  <p:cSld>
+    <p:spTree>
+      <p:nvGrpSpPr>
+        <p:cNvPr id="1" name=""/>
+        <p:cNvGrpSpPr/>
+        <p:nvPr/>
+      </p:nvGrpSpPr>
+      <p:grpSpPr>
+        <a:xfrm>
+          <a:off x="0" y="0"/>
+          <a:ext cx="0" cy="0"/>
+          <a:chOff x="0" y="0"/>
+          <a:chExt cx="0" cy="0"/>
+        </a:xfrm>
+      </p:grpSpPr>
+      <p:sp>
+        <p:nvSpPr>
+          <p:cNvPr id="2" name="Slide Image Placeholder 1"/>
+          <p:cNvSpPr>
+            <a:spLocks noGrp="1" noRot="1" noChangeAspect="1"/>
+          </p:cNvSpPr>
+          <p:nvPr>
+            <p:ph type="sldImg"/>
+          </p:nvPr>
+        </p:nvSpPr>
+        <p:spPr/>
+      </p:sp>
+      <p:sp>
+        <p:nvSpPr>
+          <p:cNvPr id="3" name="Notes Placeholder 2"/>
+          <p:cNvSpPr>
+            <a:spLocks noGrp="1"/>
+          </p:cNvSpPr>
+          <p:nvPr>
+            <p:ph type="body" idx="1"/>
+          </p:nvPr>
+        </p:nvSpPr>
+        <p:spPr/>
+        <p:txBody>
+          <a:bodyPr>
+            <a:normAutofit/>
+          </a:bodyPr>
+          <a:lstStyle/>
+          <a:p>
+            <a:endParaRPr lang="en-US" dirty="0"/>
+          </a:p>
+        </p:txBody>
+      </p:sp>
+      <p:sp>
+        <p:nvSpPr>
+          <p:cNvPr id="4" name="Slide Number Placeholder 3"/>
+          <p:cNvSpPr>
+            <a:spLocks noGrp="1"/>
+          </p:cNvSpPr>
+          <p:nvPr>
+            <p:ph type="sldNum" sz="quarter" idx="10"/>
+          </p:nvPr>
+        </p:nvSpPr>
+        <p:spPr/>
+        <p:txBody>
+          <a:bodyPr/>
+          <a:lstStyle/>
+          <a:p>
+            <a:pPr>
+              <a:defRPr/>
+            </a:pPr>
+            <a:fld id="{1931C8FD-CC35-423B-99F4-64D81D6A80AE}" type="slidenum">
+              <a:rPr lang="en-US" smtClean="0"/>
+              <a:pPr>
+                <a:defRPr/>
+              </a:pPr>
+              <a:t>15</a:t>
+            </a:fld>
+            <a:endParaRPr lang="en-US"/>
+          </a:p>
+        </p:txBody>
+      </p:sp>
+    </p:spTree>
+  </p:cSld>
+  <p:clrMapOvr>
+    <a:masterClrMapping/>
+  </p:clrMapOvr>
+</p:notes>
+</file>
+
 <file path=ppt/notesSlides/notesSlide2.xml><?xml version="1.0" encoding="utf-8"?>
 <p:notes xmlns:a="http://schemas.openxmlformats.org/drawingml/2006/main" xmlns:r="http://schemas.openxmlformats.org/officeDocument/2006/relationships" xmlns:p="http://schemas.openxmlformats.org/presentationml/2006/main">
   <p:cSld>
@@ -1427,7 +1515,7 @@
               <a:pPr>
                 <a:defRPr/>
               </a:pPr>
-              <a:t>5</a:t>
+              <a:t>4</a:t>
             </a:fld>
             <a:endParaRPr lang="en-US"/>
           </a:p>
@@ -3129,6 +3217,185 @@
             <a:pPr eaLnBrk="1" hangingPunct="1"/>
             <a:r>
               <a:rPr lang="en-US" dirty="0" smtClean="0"/>
+              <a:t>Behavioral Patterns</a:t>
+            </a:r>
+          </a:p>
+        </p:txBody>
+      </p:sp>
+      <p:sp>
+        <p:nvSpPr>
+          <p:cNvPr id="4" name="Rectangle 3"/>
+          <p:cNvSpPr/>
+          <p:nvPr/>
+        </p:nvSpPr>
+        <p:spPr>
+          <a:xfrm>
+            <a:off x="2514600" y="6553200"/>
+            <a:ext cx="4114800" cy="228600"/>
+          </a:xfrm>
+          <a:prstGeom prst="rect">
+            <a:avLst/>
+          </a:prstGeom>
+          <a:solidFill>
+            <a:schemeClr val="bg1"/>
+          </a:solidFill>
+          <a:ln>
+            <a:solidFill>
+              <a:schemeClr val="bg1"/>
+            </a:solidFill>
+          </a:ln>
+        </p:spPr>
+        <p:style>
+          <a:lnRef idx="2">
+            <a:schemeClr val="accent1">
+              <a:shade val="50000"/>
+            </a:schemeClr>
+          </a:lnRef>
+          <a:fillRef idx="1">
+            <a:schemeClr val="accent1"/>
+          </a:fillRef>
+          <a:effectRef idx="0">
+            <a:schemeClr val="accent1"/>
+          </a:effectRef>
+          <a:fontRef idx="minor">
+            <a:schemeClr val="lt1"/>
+          </a:fontRef>
+        </p:style>
+        <p:txBody>
+          <a:bodyPr rtlCol="0" anchor="ctr"/>
+          <a:lstStyle/>
+          <a:p>
+            <a:pPr algn="ctr"/>
+            <a:endParaRPr lang="en-US"/>
+          </a:p>
+        </p:txBody>
+      </p:sp>
+      <p:sp>
+        <p:nvSpPr>
+          <p:cNvPr id="13" name="Text Placeholder 12"/>
+          <p:cNvSpPr>
+            <a:spLocks noGrp="1"/>
+          </p:cNvSpPr>
+          <p:nvPr>
+            <p:ph type="body" sz="quarter" idx="10"/>
+          </p:nvPr>
+        </p:nvSpPr>
+        <p:spPr/>
+        <p:txBody>
+          <a:bodyPr/>
+          <a:lstStyle/>
+          <a:p>
+            <a:r>
+              <a:rPr lang="en-US" b="1" dirty="0" smtClean="0"/>
+              <a:t>Observer </a:t>
+            </a:r>
+            <a:r>
+              <a:rPr lang="en-US" dirty="0" smtClean="0"/>
+              <a:t>– Publisher Subscriber System</a:t>
+            </a:r>
+          </a:p>
+          <a:p>
+            <a:r>
+              <a:rPr lang="en-US" b="1" dirty="0" smtClean="0"/>
+              <a:t>Visitor </a:t>
+            </a:r>
+            <a:r>
+              <a:rPr lang="en-US" dirty="0" smtClean="0"/>
+              <a:t>– Defines and performs new operations on all elements of an existing structure</a:t>
+            </a:r>
+          </a:p>
+          <a:p>
+            <a:r>
+              <a:rPr lang="en-US" b="1" dirty="0" smtClean="0"/>
+              <a:t>Interpreter </a:t>
+            </a:r>
+            <a:r>
+              <a:rPr lang="en-US" dirty="0" smtClean="0"/>
+              <a:t>– ?</a:t>
+            </a:r>
+          </a:p>
+          <a:p>
+            <a:r>
+              <a:rPr lang="en-US" b="1" dirty="0" smtClean="0"/>
+              <a:t>Memento </a:t>
+            </a:r>
+            <a:r>
+              <a:rPr lang="en-US" dirty="0" smtClean="0"/>
+              <a:t>– Captures the state of an object’s internal state and saves externally</a:t>
+            </a:r>
+          </a:p>
+          <a:p>
+            <a:endParaRPr lang="en-US" dirty="0" smtClean="0"/>
+          </a:p>
+          <a:p>
+            <a:pPr>
+              <a:buNone/>
+            </a:pPr>
+            <a:endParaRPr lang="en-US" dirty="0" smtClean="0"/>
+          </a:p>
+        </p:txBody>
+      </p:sp>
+    </p:spTree>
+  </p:cSld>
+  <p:clrMapOvr>
+    <a:masterClrMapping/>
+  </p:clrMapOvr>
+  <p:timing>
+    <p:tnLst>
+      <p:par>
+        <p:cTn id="1" dur="indefinite" restart="never" nodeType="tmRoot"/>
+      </p:par>
+    </p:tnLst>
+  </p:timing>
+</p:sld>
+</file>
+
+<file path=ppt/slides/slide11.xml><?xml version="1.0" encoding="utf-8"?>
+<p:sld xmlns:a="http://schemas.openxmlformats.org/drawingml/2006/main" xmlns:r="http://schemas.openxmlformats.org/officeDocument/2006/relationships" xmlns:p="http://schemas.openxmlformats.org/presentationml/2006/main">
+  <p:cSld>
+    <p:spTree>
+      <p:nvGrpSpPr>
+        <p:cNvPr id="1" name=""/>
+        <p:cNvGrpSpPr/>
+        <p:nvPr/>
+      </p:nvGrpSpPr>
+      <p:grpSpPr>
+        <a:xfrm>
+          <a:off x="0" y="0"/>
+          <a:ext cx="0" cy="0"/>
+          <a:chOff x="0" y="0"/>
+          <a:chExt cx="0" cy="0"/>
+        </a:xfrm>
+      </p:grpSpPr>
+      <p:sp>
+        <p:nvSpPr>
+          <p:cNvPr id="3074" name="Title 1"/>
+          <p:cNvSpPr>
+            <a:spLocks noGrp="1"/>
+          </p:cNvSpPr>
+          <p:nvPr>
+            <p:ph type="title"/>
+          </p:nvPr>
+        </p:nvSpPr>
+        <p:spPr bwMode="auto">
+          <a:noFill/>
+          <a:ln>
+            <a:miter lim="800000"/>
+            <a:headEnd/>
+            <a:tailEnd/>
+          </a:ln>
+        </p:spPr>
+        <p:txBody>
+          <a:bodyPr vert="horz" wrap="square" lIns="91440" tIns="45720" rIns="91440" bIns="45720" numCol="1" anchor="t" anchorCtr="0" compatLnSpc="1">
+            <a:prstTxWarp prst="textNoShape">
+              <a:avLst/>
+            </a:prstTxWarp>
+          </a:bodyPr>
+          <a:lstStyle/>
+          <a:p>
+            <a:pPr eaLnBrk="1" hangingPunct="1"/>
+            <a:r>
+              <a:rPr lang="en-US" dirty="0" smtClean="0"/>
               <a:t>Observer Pattern</a:t>
             </a:r>
           </a:p>
@@ -3254,7 +3521,7 @@
 </p:sld>
 </file>
 
-<file path=ppt/slides/slide11.xml><?xml version="1.0" encoding="utf-8"?>
+<file path=ppt/slides/slide12.xml><?xml version="1.0" encoding="utf-8"?>
 <p:sld xmlns:a="http://schemas.openxmlformats.org/drawingml/2006/main" xmlns:r="http://schemas.openxmlformats.org/officeDocument/2006/relationships" xmlns:p="http://schemas.openxmlformats.org/presentationml/2006/main">
   <p:cSld>
     <p:spTree>
@@ -3425,7 +3692,7 @@
 </p:sld>
 </file>
 
-<file path=ppt/slides/slide12.xml><?xml version="1.0" encoding="utf-8"?>
+<file path=ppt/slides/slide13.xml><?xml version="1.0" encoding="utf-8"?>
 <p:sld xmlns:a="http://schemas.openxmlformats.org/drawingml/2006/main" xmlns:r="http://schemas.openxmlformats.org/officeDocument/2006/relationships" xmlns:p="http://schemas.openxmlformats.org/presentationml/2006/main">
   <p:cSld>
     <p:spTree>
@@ -3596,7 +3863,7 @@
 </p:sld>
 </file>
 
-<file path=ppt/slides/slide13.xml><?xml version="1.0" encoding="utf-8"?>
+<file path=ppt/slides/slide14.xml><?xml version="1.0" encoding="utf-8"?>
 <p:sld xmlns:a="http://schemas.openxmlformats.org/drawingml/2006/main" xmlns:r="http://schemas.openxmlformats.org/officeDocument/2006/relationships" xmlns:p="http://schemas.openxmlformats.org/presentationml/2006/main">
   <p:cSld>
     <p:spTree>
@@ -3735,7 +4002,7 @@
 </p:sld>
 </file>
 
-<file path=ppt/slides/slide14.xml><?xml version="1.0" encoding="utf-8"?>
+<file path=ppt/slides/slide15.xml><?xml version="1.0" encoding="utf-8"?>
 <p:sld xmlns:a="http://schemas.openxmlformats.org/drawingml/2006/main" xmlns:r="http://schemas.openxmlformats.org/officeDocument/2006/relationships" xmlns:p="http://schemas.openxmlformats.org/presentationml/2006/main">
   <p:cSld>
     <p:spTree>
@@ -3783,7 +4050,6 @@
               <a:rPr lang="en-US" dirty="0" smtClean="0"/>
               <a:t>Strategy</a:t>
             </a:r>
-            <a:endParaRPr lang="en-US" dirty="0" smtClean="0"/>
           </a:p>
         </p:txBody>
       </p:sp>
@@ -3875,7 +4141,7 @@
 </p:sld>
 </file>
 
-<file path=ppt/slides/slide15.xml><?xml version="1.0" encoding="utf-8"?>
+<file path=ppt/slides/slide16.xml><?xml version="1.0" encoding="utf-8"?>
 <p:sld xmlns:a="http://schemas.openxmlformats.org/drawingml/2006/main" xmlns:r="http://schemas.openxmlformats.org/officeDocument/2006/relationships" xmlns:p="http://schemas.openxmlformats.org/presentationml/2006/main">
   <p:cSld>
     <p:spTree>
@@ -5401,6 +5667,100 @@
       </p:grpSpPr>
       <p:sp>
         <p:nvSpPr>
+          <p:cNvPr id="3075" name="Text Placeholder 2"/>
+          <p:cNvSpPr>
+            <a:spLocks noGrp="1"/>
+          </p:cNvSpPr>
+          <p:nvPr>
+            <p:ph type="body" sz="quarter" idx="10"/>
+          </p:nvPr>
+        </p:nvSpPr>
+        <p:spPr>
+          <a:xfrm>
+            <a:off x="685800" y="1066800"/>
+            <a:ext cx="8229600" cy="5181600"/>
+          </a:xfrm>
+        </p:spPr>
+        <p:txBody>
+          <a:bodyPr/>
+          <a:lstStyle/>
+          <a:p>
+            <a:pPr eaLnBrk="1" hangingPunct="1">
+              <a:buNone/>
+            </a:pPr>
+            <a:r>
+              <a:rPr lang="en-US" sz="3200" b="1" dirty="0" smtClean="0">
+                <a:solidFill>
+                  <a:srgbClr val="C00000"/>
+                </a:solidFill>
+              </a:rPr>
+              <a:t>Introduce the Topic of Design Patterns</a:t>
+            </a:r>
+            <a:endParaRPr lang="en-US" sz="2000" dirty="0" smtClean="0">
+              <a:solidFill>
+                <a:srgbClr val="C00000"/>
+              </a:solidFill>
+            </a:endParaRPr>
+          </a:p>
+          <a:p>
+            <a:pPr eaLnBrk="1" hangingPunct="1"/>
+            <a:r>
+              <a:rPr lang="en-US" b="1" dirty="0" smtClean="0"/>
+              <a:t>What design patterns are</a:t>
+            </a:r>
+            <a:endParaRPr lang="en-US" b="1" dirty="0" smtClean="0"/>
+          </a:p>
+          <a:p>
+            <a:pPr eaLnBrk="1" hangingPunct="1"/>
+            <a:r>
+              <a:rPr lang="en-US" b="1" dirty="0" smtClean="0"/>
+              <a:t>List all the original 23 Gang of Four Design Patterns</a:t>
+            </a:r>
+            <a:endParaRPr lang="en-US" b="1" dirty="0" smtClean="0"/>
+          </a:p>
+          <a:p>
+            <a:pPr eaLnBrk="1" hangingPunct="1"/>
+            <a:r>
+              <a:rPr lang="en-US" b="1" dirty="0" smtClean="0"/>
+              <a:t>Introduce the necessary UML required for understanding DP</a:t>
+            </a:r>
+            <a:endParaRPr lang="en-US" dirty="0" smtClean="0"/>
+          </a:p>
+          <a:p>
+            <a:pPr eaLnBrk="1" hangingPunct="1"/>
+            <a:r>
+              <a:rPr lang="en-US" b="1" dirty="0" smtClean="0"/>
+              <a:t>Introduce 4 to 5 design patterns in Detail</a:t>
+            </a:r>
+          </a:p>
+          <a:p>
+            <a:pPr eaLnBrk="1" hangingPunct="1"/>
+            <a:r>
+              <a:rPr lang="en-US" b="1" dirty="0" smtClean="0"/>
+              <a:t>Inspire you to research design patterns further</a:t>
+            </a:r>
+          </a:p>
+          <a:p>
+            <a:pPr eaLnBrk="1" hangingPunct="1"/>
+            <a:r>
+              <a:rPr lang="en-US" b="1" dirty="0" smtClean="0"/>
+              <a:t>Gather Interest on a part 2 of </a:t>
+            </a:r>
+            <a:r>
+              <a:rPr lang="en-US" b="1" smtClean="0"/>
+              <a:t>design patterns</a:t>
+            </a:r>
+          </a:p>
+          <a:p>
+            <a:pPr eaLnBrk="1" hangingPunct="1">
+              <a:buNone/>
+            </a:pPr>
+            <a:endParaRPr lang="en-US" b="1" dirty="0" smtClean="0"/>
+          </a:p>
+        </p:txBody>
+      </p:sp>
+      <p:sp>
+        <p:nvSpPr>
           <p:cNvPr id="3074" name="Title 1"/>
           <p:cNvSpPr>
             <a:spLocks noGrp="1"/>
@@ -5428,137 +5788,21 @@
             <a:pPr eaLnBrk="1" hangingPunct="1"/>
             <a:r>
               <a:rPr lang="en-US" dirty="0" smtClean="0"/>
-              <a:t>Philosophy and Beginnings	</a:t>
-            </a:r>
-          </a:p>
-        </p:txBody>
-      </p:sp>
-      <p:sp>
-        <p:nvSpPr>
-          <p:cNvPr id="3075" name="Text Placeholder 2"/>
-          <p:cNvSpPr>
-            <a:spLocks noGrp="1"/>
-          </p:cNvSpPr>
-          <p:nvPr>
-            <p:ph type="body" sz="quarter" idx="10"/>
-          </p:nvPr>
+              <a:t>Objectives of This Presentation</a:t>
+            </a:r>
+            <a:endParaRPr lang="en-US" dirty="0" smtClean="0"/>
+          </a:p>
+        </p:txBody>
+      </p:sp>
+      <p:sp>
+        <p:nvSpPr>
+          <p:cNvPr id="4" name="Rectangle 3"/>
+          <p:cNvSpPr/>
+          <p:nvPr/>
         </p:nvSpPr>
         <p:spPr>
           <a:xfrm>
-            <a:off x="685800" y="1143000"/>
-            <a:ext cx="8229600" cy="4800600"/>
-          </a:xfrm>
-        </p:spPr>
-        <p:txBody>
-          <a:bodyPr/>
-          <a:lstStyle/>
-          <a:p>
-            <a:pPr marL="457200" indent="-457200">
-              <a:buFont typeface="+mj-lt"/>
-              <a:buAutoNum type="arabicPeriod"/>
-            </a:pPr>
-            <a:r>
-              <a:rPr lang="en-US" dirty="0" smtClean="0"/>
-              <a:t>We are talking about software. Right?</a:t>
-            </a:r>
-          </a:p>
-          <a:p>
-            <a:pPr marL="457200" indent="-457200">
-              <a:buFont typeface="+mj-lt"/>
-              <a:buAutoNum type="arabicPeriod"/>
-            </a:pPr>
-            <a:r>
-              <a:rPr lang="en-US" dirty="0" smtClean="0"/>
-              <a:t>Reusable solution to a commonly occurring problem within a given context</a:t>
-            </a:r>
-          </a:p>
-          <a:p>
-            <a:pPr marL="457200" indent="-457200">
-              <a:buFont typeface="+mj-lt"/>
-              <a:buAutoNum type="arabicPeriod"/>
-            </a:pPr>
-            <a:r>
-              <a:rPr lang="en-US" dirty="0" smtClean="0"/>
-              <a:t>Christopher Alexander (1977/79)</a:t>
-            </a:r>
-          </a:p>
-          <a:p>
-            <a:pPr marL="457200" indent="-457200">
-              <a:buNone/>
-            </a:pPr>
-            <a:r>
-              <a:rPr lang="en-US" b="1" i="1" dirty="0" smtClean="0"/>
-              <a:t>          A Pattern Language: Towns, Buildings, Construction</a:t>
-            </a:r>
-            <a:endParaRPr lang="en-US" dirty="0" smtClean="0"/>
-          </a:p>
-          <a:p>
-            <a:pPr marL="457200" indent="-457200">
-              <a:buNone/>
-            </a:pPr>
-            <a:r>
-              <a:rPr lang="en-US" dirty="0" smtClean="0"/>
-              <a:t>4. 	Form a common language</a:t>
-            </a:r>
-          </a:p>
-          <a:p>
-            <a:pPr marL="457200" indent="-457200">
-              <a:buNone/>
-            </a:pPr>
-            <a:r>
-              <a:rPr lang="en-US" dirty="0" smtClean="0"/>
-              <a:t>5. 	</a:t>
-            </a:r>
-            <a:r>
-              <a:rPr lang="en-US" dirty="0" err="1" smtClean="0"/>
-              <a:t>GoF</a:t>
-            </a:r>
-            <a:r>
-              <a:rPr lang="en-US" dirty="0" smtClean="0"/>
-              <a:t> – </a:t>
-            </a:r>
-            <a:r>
-              <a:rPr lang="en-US" b="1" i="1" dirty="0" smtClean="0"/>
-              <a:t>DESIGN PATTERNS Elements of Reusable Object Oriented Software Gamma, et al. </a:t>
-            </a:r>
-            <a:r>
-              <a:rPr lang="en-US" dirty="0" smtClean="0"/>
-              <a:t>(1995)</a:t>
-            </a:r>
-          </a:p>
-          <a:p>
-            <a:pPr marL="457200" indent="-457200">
-              <a:buNone/>
-            </a:pPr>
-            <a:r>
-              <a:rPr lang="en-US" sz="3200" dirty="0" smtClean="0"/>
-              <a:t>	</a:t>
-            </a:r>
-            <a:endParaRPr lang="en-US" sz="1600" dirty="0" smtClean="0"/>
-          </a:p>
-          <a:p>
-            <a:pPr marL="457200" indent="-457200">
-              <a:buNone/>
-            </a:pPr>
-            <a:endParaRPr lang="en-US" sz="2000" dirty="0" smtClean="0"/>
-          </a:p>
-          <a:p>
-            <a:pPr marL="457200" indent="-457200">
-              <a:buNone/>
-            </a:pPr>
-            <a:endParaRPr lang="en-US" sz="2000" dirty="0" smtClean="0"/>
-          </a:p>
-        </p:txBody>
-      </p:sp>
-      <p:sp>
-        <p:nvSpPr>
-          <p:cNvPr id="5" name="Rectangle 4"/>
-          <p:cNvSpPr/>
-          <p:nvPr/>
-        </p:nvSpPr>
-        <p:spPr>
-          <a:xfrm>
-            <a:off x="2514600" y="6553200"/>
+            <a:off x="1981200" y="6477000"/>
             <a:ext cx="4114800" cy="228600"/>
           </a:xfrm>
           <a:prstGeom prst="rect">
@@ -5603,6 +5847,9 @@
   <p:clrMapOvr>
     <a:masterClrMapping/>
   </p:clrMapOvr>
+  <p:transition>
+    <p:dissolve/>
+  </p:transition>
   <p:timing>
     <p:tnLst>
       <p:par>
@@ -6403,7 +6650,7 @@
             <a:pPr eaLnBrk="1" hangingPunct="1"/>
             <a:r>
               <a:rPr lang="en-US" dirty="0" smtClean="0"/>
-              <a:t>Design Pattern Categories</a:t>
+              <a:t>Philosophy and Beginnings	</a:t>
             </a:r>
           </a:p>
         </p:txBody>
@@ -6420,8 +6667,8 @@
         </p:nvSpPr>
         <p:spPr>
           <a:xfrm>
-            <a:off x="381000" y="1295400"/>
-            <a:ext cx="8686800" cy="3886200"/>
+            <a:off x="685800" y="1143000"/>
+            <a:ext cx="8229600" cy="4800600"/>
           </a:xfrm>
         </p:spPr>
         <p:txBody>
@@ -6433,16 +6680,8 @@
               <a:buAutoNum type="arabicPeriod"/>
             </a:pPr>
             <a:r>
-              <a:rPr lang="en-US" sz="2000" dirty="0" smtClean="0"/>
-              <a:t>23 Patterns in </a:t>
-            </a:r>
-            <a:r>
-              <a:rPr lang="en-US" sz="2000" dirty="0" err="1" smtClean="0"/>
-              <a:t>GoF</a:t>
-            </a:r>
-            <a:r>
-              <a:rPr lang="en-US" sz="2000" dirty="0" smtClean="0"/>
-              <a:t>- Foundation</a:t>
+              <a:rPr lang="en-US" dirty="0" smtClean="0"/>
+              <a:t>We are talking about software. Right?</a:t>
             </a:r>
           </a:p>
           <a:p>
@@ -6451,38 +6690,8 @@
               <a:buAutoNum type="arabicPeriod"/>
             </a:pPr>
             <a:r>
-              <a:rPr lang="en-US" sz="2000" dirty="0" smtClean="0"/>
-              <a:t>3 Groups </a:t>
-            </a:r>
-          </a:p>
-          <a:p>
-            <a:pPr marL="857250" lvl="1" indent="-457200">
-              <a:buFont typeface="+mj-lt"/>
-              <a:buAutoNum type="arabicPeriod"/>
-            </a:pPr>
-            <a:r>
-              <a:rPr lang="en-US" sz="2000" dirty="0" smtClean="0"/>
-              <a:t>Creational</a:t>
-            </a:r>
-          </a:p>
-          <a:p>
-            <a:pPr marL="857250" lvl="1" indent="-457200">
-              <a:buFont typeface="+mj-lt"/>
-              <a:buAutoNum type="arabicPeriod"/>
-            </a:pPr>
-            <a:r>
-              <a:rPr lang="en-US" sz="2000" dirty="0" smtClean="0"/>
-              <a:t>Structural</a:t>
-            </a:r>
-          </a:p>
-          <a:p>
-            <a:pPr marL="857250" lvl="1" indent="-457200">
-              <a:buFont typeface="+mj-lt"/>
-              <a:buAutoNum type="arabicPeriod"/>
-            </a:pPr>
-            <a:r>
-              <a:rPr lang="en-US" sz="2000" dirty="0" smtClean="0"/>
-              <a:t>Behavioral</a:t>
+              <a:rPr lang="en-US" dirty="0" smtClean="0"/>
+              <a:t>Reusable solution to a commonly occurring problem within a given context</a:t>
             </a:r>
           </a:p>
           <a:p>
@@ -6491,8 +6700,8 @@
               <a:buAutoNum type="arabicPeriod"/>
             </a:pPr>
             <a:r>
-              <a:rPr lang="en-US" sz="2000" dirty="0" smtClean="0"/>
-              <a:t>Specific Areas such as architecture, UI, concurrency, security</a:t>
+              <a:rPr lang="en-US" dirty="0" smtClean="0"/>
+              <a:t>Christopher Alexander (1977/79)</a:t>
             </a:r>
           </a:p>
           <a:p>
@@ -6500,33 +6709,66 @@
               <a:buNone/>
             </a:pPr>
             <a:r>
-              <a:rPr lang="en-US" sz="2000" dirty="0" smtClean="0"/>
-              <a:t>4. 	Forces and Solution</a:t>
-            </a:r>
+              <a:rPr lang="en-US" b="1" i="1" dirty="0" smtClean="0"/>
+              <a:t>          A Pattern Language: Towns, Buildings, Construction</a:t>
+            </a:r>
+            <a:endParaRPr lang="en-US" dirty="0" smtClean="0"/>
           </a:p>
           <a:p>
             <a:pPr marL="457200" indent="-457200">
               <a:buNone/>
             </a:pPr>
             <a:r>
-              <a:rPr lang="en-US" sz="2000" dirty="0" smtClean="0"/>
-              <a:t>5. 	UML</a:t>
+              <a:rPr lang="en-US" dirty="0" smtClean="0"/>
+              <a:t>4. 	Form a common language</a:t>
             </a:r>
           </a:p>
           <a:p>
             <a:pPr marL="457200" indent="-457200">
               <a:buNone/>
             </a:pPr>
-            <a:endParaRPr lang="en-US" sz="2000" i="1" dirty="0" smtClean="0"/>
+            <a:r>
+              <a:rPr lang="en-US" dirty="0" smtClean="0"/>
+              <a:t>5. 	</a:t>
+            </a:r>
+            <a:r>
+              <a:rPr lang="en-US" dirty="0" err="1" smtClean="0"/>
+              <a:t>GoF</a:t>
+            </a:r>
+            <a:r>
+              <a:rPr lang="en-US" dirty="0" smtClean="0"/>
+              <a:t> – </a:t>
+            </a:r>
+            <a:r>
+              <a:rPr lang="en-US" b="1" i="1" dirty="0" smtClean="0"/>
+              <a:t>DESIGN PATTERNS Elements of Reusable Object Oriented Software Gamma, et al. </a:t>
+            </a:r>
+            <a:r>
+              <a:rPr lang="en-US" dirty="0" smtClean="0"/>
+              <a:t>(1995)</a:t>
+            </a:r>
           </a:p>
           <a:p>
             <a:pPr marL="457200" indent="-457200">
               <a:buNone/>
             </a:pPr>
             <a:r>
-              <a:rPr lang="en-US" sz="2000" i="1" dirty="0" smtClean="0"/>
-              <a:t>         </a:t>
-            </a:r>
+              <a:rPr lang="en-US" sz="3200" dirty="0" smtClean="0"/>
+              <a:t>	</a:t>
+            </a:r>
+            <a:endParaRPr lang="en-US" sz="1600" dirty="0" smtClean="0"/>
+          </a:p>
+          <a:p>
+            <a:pPr marL="457200" indent="-457200">
+              <a:buNone/>
+            </a:pPr>
+            <a:endParaRPr lang="en-US" sz="2000" dirty="0" smtClean="0"/>
+          </a:p>
+          <a:p>
+            <a:pPr marL="457200" indent="-457200">
+              <a:buNone/>
+            </a:pPr>
+            <a:endParaRPr lang="en-US" sz="2000" dirty="0" smtClean="0"/>
           </a:p>
         </p:txBody>
       </p:sp>
@@ -6586,6 +6828,986 @@
   <p:timing>
     <p:tnLst>
       <p:par>
+        <p:cTn id="1" dur="indefinite" restart="never" nodeType="tmRoot">
+          <p:childTnLst>
+            <p:seq concurrent="1" nextAc="seek">
+              <p:cTn id="2" dur="indefinite" nodeType="mainSeq">
+                <p:childTnLst>
+                  <p:par>
+                    <p:cTn id="3" fill="hold">
+                      <p:stCondLst>
+                        <p:cond delay="indefinite"/>
+                      </p:stCondLst>
+                      <p:childTnLst>
+                        <p:par>
+                          <p:cTn id="4" fill="hold">
+                            <p:stCondLst>
+                              <p:cond delay="0"/>
+                            </p:stCondLst>
+                            <p:childTnLst>
+                              <p:par>
+                                <p:cTn id="5" presetID="2" presetClass="entr" presetSubtype="4" fill="hold" nodeType="clickEffect">
+                                  <p:stCondLst>
+                                    <p:cond delay="0"/>
+                                  </p:stCondLst>
+                                  <p:childTnLst>
+                                    <p:set>
+                                      <p:cBhvr>
+                                        <p:cTn id="6" dur="1" fill="hold">
+                                          <p:stCondLst>
+                                            <p:cond delay="0"/>
+                                          </p:stCondLst>
+                                        </p:cTn>
+                                        <p:tgtEl>
+                                          <p:spTgt spid="3075">
+                                            <p:txEl>
+                                              <p:pRg st="0" end="0"/>
+                                            </p:txEl>
+                                          </p:spTgt>
+                                        </p:tgtEl>
+                                        <p:attrNameLst>
+                                          <p:attrName>style.visibility</p:attrName>
+                                        </p:attrNameLst>
+                                      </p:cBhvr>
+                                      <p:to>
+                                        <p:strVal val="visible"/>
+                                      </p:to>
+                                    </p:set>
+                                    <p:anim calcmode="lin" valueType="num">
+                                      <p:cBhvr additive="base">
+                                        <p:cTn id="7" dur="500" fill="hold"/>
+                                        <p:tgtEl>
+                                          <p:spTgt spid="3075">
+                                            <p:txEl>
+                                              <p:pRg st="0" end="0"/>
+                                            </p:txEl>
+                                          </p:spTgt>
+                                        </p:tgtEl>
+                                        <p:attrNameLst>
+                                          <p:attrName>ppt_x</p:attrName>
+                                        </p:attrNameLst>
+                                      </p:cBhvr>
+                                      <p:tavLst>
+                                        <p:tav tm="0">
+                                          <p:val>
+                                            <p:strVal val="#ppt_x"/>
+                                          </p:val>
+                                        </p:tav>
+                                        <p:tav tm="100000">
+                                          <p:val>
+                                            <p:strVal val="#ppt_x"/>
+                                          </p:val>
+                                        </p:tav>
+                                      </p:tavLst>
+                                    </p:anim>
+                                    <p:anim calcmode="lin" valueType="num">
+                                      <p:cBhvr additive="base">
+                                        <p:cTn id="8" dur="500" fill="hold"/>
+                                        <p:tgtEl>
+                                          <p:spTgt spid="3075">
+                                            <p:txEl>
+                                              <p:pRg st="0" end="0"/>
+                                            </p:txEl>
+                                          </p:spTgt>
+                                        </p:tgtEl>
+                                        <p:attrNameLst>
+                                          <p:attrName>ppt_y</p:attrName>
+                                        </p:attrNameLst>
+                                      </p:cBhvr>
+                                      <p:tavLst>
+                                        <p:tav tm="0">
+                                          <p:val>
+                                            <p:strVal val="1+#ppt_h/2"/>
+                                          </p:val>
+                                        </p:tav>
+                                        <p:tav tm="100000">
+                                          <p:val>
+                                            <p:strVal val="#ppt_y"/>
+                                          </p:val>
+                                        </p:tav>
+                                      </p:tavLst>
+                                    </p:anim>
+                                  </p:childTnLst>
+                                </p:cTn>
+                              </p:par>
+                            </p:childTnLst>
+                          </p:cTn>
+                        </p:par>
+                      </p:childTnLst>
+                    </p:cTn>
+                  </p:par>
+                  <p:par>
+                    <p:cTn id="9" fill="hold">
+                      <p:stCondLst>
+                        <p:cond delay="indefinite"/>
+                      </p:stCondLst>
+                      <p:childTnLst>
+                        <p:par>
+                          <p:cTn id="10" fill="hold">
+                            <p:stCondLst>
+                              <p:cond delay="0"/>
+                            </p:stCondLst>
+                            <p:childTnLst>
+                              <p:par>
+                                <p:cTn id="11" presetID="2" presetClass="entr" presetSubtype="4" fill="hold" nodeType="clickEffect">
+                                  <p:stCondLst>
+                                    <p:cond delay="0"/>
+                                  </p:stCondLst>
+                                  <p:childTnLst>
+                                    <p:set>
+                                      <p:cBhvr>
+                                        <p:cTn id="12" dur="1" fill="hold">
+                                          <p:stCondLst>
+                                            <p:cond delay="0"/>
+                                          </p:stCondLst>
+                                        </p:cTn>
+                                        <p:tgtEl>
+                                          <p:spTgt spid="3075">
+                                            <p:txEl>
+                                              <p:pRg st="1" end="1"/>
+                                            </p:txEl>
+                                          </p:spTgt>
+                                        </p:tgtEl>
+                                        <p:attrNameLst>
+                                          <p:attrName>style.visibility</p:attrName>
+                                        </p:attrNameLst>
+                                      </p:cBhvr>
+                                      <p:to>
+                                        <p:strVal val="visible"/>
+                                      </p:to>
+                                    </p:set>
+                                    <p:anim calcmode="lin" valueType="num">
+                                      <p:cBhvr additive="base">
+                                        <p:cTn id="13" dur="500" fill="hold"/>
+                                        <p:tgtEl>
+                                          <p:spTgt spid="3075">
+                                            <p:txEl>
+                                              <p:pRg st="1" end="1"/>
+                                            </p:txEl>
+                                          </p:spTgt>
+                                        </p:tgtEl>
+                                        <p:attrNameLst>
+                                          <p:attrName>ppt_x</p:attrName>
+                                        </p:attrNameLst>
+                                      </p:cBhvr>
+                                      <p:tavLst>
+                                        <p:tav tm="0">
+                                          <p:val>
+                                            <p:strVal val="#ppt_x"/>
+                                          </p:val>
+                                        </p:tav>
+                                        <p:tav tm="100000">
+                                          <p:val>
+                                            <p:strVal val="#ppt_x"/>
+                                          </p:val>
+                                        </p:tav>
+                                      </p:tavLst>
+                                    </p:anim>
+                                    <p:anim calcmode="lin" valueType="num">
+                                      <p:cBhvr additive="base">
+                                        <p:cTn id="14" dur="500" fill="hold"/>
+                                        <p:tgtEl>
+                                          <p:spTgt spid="3075">
+                                            <p:txEl>
+                                              <p:pRg st="1" end="1"/>
+                                            </p:txEl>
+                                          </p:spTgt>
+                                        </p:tgtEl>
+                                        <p:attrNameLst>
+                                          <p:attrName>ppt_y</p:attrName>
+                                        </p:attrNameLst>
+                                      </p:cBhvr>
+                                      <p:tavLst>
+                                        <p:tav tm="0">
+                                          <p:val>
+                                            <p:strVal val="1+#ppt_h/2"/>
+                                          </p:val>
+                                        </p:tav>
+                                        <p:tav tm="100000">
+                                          <p:val>
+                                            <p:strVal val="#ppt_y"/>
+                                          </p:val>
+                                        </p:tav>
+                                      </p:tavLst>
+                                    </p:anim>
+                                  </p:childTnLst>
+                                </p:cTn>
+                              </p:par>
+                            </p:childTnLst>
+                          </p:cTn>
+                        </p:par>
+                      </p:childTnLst>
+                    </p:cTn>
+                  </p:par>
+                  <p:par>
+                    <p:cTn id="15" fill="hold">
+                      <p:stCondLst>
+                        <p:cond delay="indefinite"/>
+                      </p:stCondLst>
+                      <p:childTnLst>
+                        <p:par>
+                          <p:cTn id="16" fill="hold">
+                            <p:stCondLst>
+                              <p:cond delay="0"/>
+                            </p:stCondLst>
+                            <p:childTnLst>
+                              <p:par>
+                                <p:cTn id="17" presetID="2" presetClass="entr" presetSubtype="4" fill="hold" nodeType="clickEffect">
+                                  <p:stCondLst>
+                                    <p:cond delay="0"/>
+                                  </p:stCondLst>
+                                  <p:childTnLst>
+                                    <p:set>
+                                      <p:cBhvr>
+                                        <p:cTn id="18" dur="1" fill="hold">
+                                          <p:stCondLst>
+                                            <p:cond delay="0"/>
+                                          </p:stCondLst>
+                                        </p:cTn>
+                                        <p:tgtEl>
+                                          <p:spTgt spid="3075">
+                                            <p:txEl>
+                                              <p:pRg st="2" end="2"/>
+                                            </p:txEl>
+                                          </p:spTgt>
+                                        </p:tgtEl>
+                                        <p:attrNameLst>
+                                          <p:attrName>style.visibility</p:attrName>
+                                        </p:attrNameLst>
+                                      </p:cBhvr>
+                                      <p:to>
+                                        <p:strVal val="visible"/>
+                                      </p:to>
+                                    </p:set>
+                                    <p:anim calcmode="lin" valueType="num">
+                                      <p:cBhvr additive="base">
+                                        <p:cTn id="19" dur="500" fill="hold"/>
+                                        <p:tgtEl>
+                                          <p:spTgt spid="3075">
+                                            <p:txEl>
+                                              <p:pRg st="2" end="2"/>
+                                            </p:txEl>
+                                          </p:spTgt>
+                                        </p:tgtEl>
+                                        <p:attrNameLst>
+                                          <p:attrName>ppt_x</p:attrName>
+                                        </p:attrNameLst>
+                                      </p:cBhvr>
+                                      <p:tavLst>
+                                        <p:tav tm="0">
+                                          <p:val>
+                                            <p:strVal val="#ppt_x"/>
+                                          </p:val>
+                                        </p:tav>
+                                        <p:tav tm="100000">
+                                          <p:val>
+                                            <p:strVal val="#ppt_x"/>
+                                          </p:val>
+                                        </p:tav>
+                                      </p:tavLst>
+                                    </p:anim>
+                                    <p:anim calcmode="lin" valueType="num">
+                                      <p:cBhvr additive="base">
+                                        <p:cTn id="20" dur="500" fill="hold"/>
+                                        <p:tgtEl>
+                                          <p:spTgt spid="3075">
+                                            <p:txEl>
+                                              <p:pRg st="2" end="2"/>
+                                            </p:txEl>
+                                          </p:spTgt>
+                                        </p:tgtEl>
+                                        <p:attrNameLst>
+                                          <p:attrName>ppt_y</p:attrName>
+                                        </p:attrNameLst>
+                                      </p:cBhvr>
+                                      <p:tavLst>
+                                        <p:tav tm="0">
+                                          <p:val>
+                                            <p:strVal val="1+#ppt_h/2"/>
+                                          </p:val>
+                                        </p:tav>
+                                        <p:tav tm="100000">
+                                          <p:val>
+                                            <p:strVal val="#ppt_y"/>
+                                          </p:val>
+                                        </p:tav>
+                                      </p:tavLst>
+                                    </p:anim>
+                                  </p:childTnLst>
+                                </p:cTn>
+                              </p:par>
+                            </p:childTnLst>
+                          </p:cTn>
+                        </p:par>
+                      </p:childTnLst>
+                    </p:cTn>
+                  </p:par>
+                  <p:par>
+                    <p:cTn id="21" fill="hold">
+                      <p:stCondLst>
+                        <p:cond delay="indefinite"/>
+                      </p:stCondLst>
+                      <p:childTnLst>
+                        <p:par>
+                          <p:cTn id="22" fill="hold">
+                            <p:stCondLst>
+                              <p:cond delay="0"/>
+                            </p:stCondLst>
+                            <p:childTnLst>
+                              <p:par>
+                                <p:cTn id="23" presetID="2" presetClass="entr" presetSubtype="4" fill="hold" nodeType="clickEffect">
+                                  <p:stCondLst>
+                                    <p:cond delay="0"/>
+                                  </p:stCondLst>
+                                  <p:childTnLst>
+                                    <p:set>
+                                      <p:cBhvr>
+                                        <p:cTn id="24" dur="1" fill="hold">
+                                          <p:stCondLst>
+                                            <p:cond delay="0"/>
+                                          </p:stCondLst>
+                                        </p:cTn>
+                                        <p:tgtEl>
+                                          <p:spTgt spid="3075">
+                                            <p:txEl>
+                                              <p:pRg st="3" end="3"/>
+                                            </p:txEl>
+                                          </p:spTgt>
+                                        </p:tgtEl>
+                                        <p:attrNameLst>
+                                          <p:attrName>style.visibility</p:attrName>
+                                        </p:attrNameLst>
+                                      </p:cBhvr>
+                                      <p:to>
+                                        <p:strVal val="visible"/>
+                                      </p:to>
+                                    </p:set>
+                                    <p:anim calcmode="lin" valueType="num">
+                                      <p:cBhvr additive="base">
+                                        <p:cTn id="25" dur="500" fill="hold"/>
+                                        <p:tgtEl>
+                                          <p:spTgt spid="3075">
+                                            <p:txEl>
+                                              <p:pRg st="3" end="3"/>
+                                            </p:txEl>
+                                          </p:spTgt>
+                                        </p:tgtEl>
+                                        <p:attrNameLst>
+                                          <p:attrName>ppt_x</p:attrName>
+                                        </p:attrNameLst>
+                                      </p:cBhvr>
+                                      <p:tavLst>
+                                        <p:tav tm="0">
+                                          <p:val>
+                                            <p:strVal val="#ppt_x"/>
+                                          </p:val>
+                                        </p:tav>
+                                        <p:tav tm="100000">
+                                          <p:val>
+                                            <p:strVal val="#ppt_x"/>
+                                          </p:val>
+                                        </p:tav>
+                                      </p:tavLst>
+                                    </p:anim>
+                                    <p:anim calcmode="lin" valueType="num">
+                                      <p:cBhvr additive="base">
+                                        <p:cTn id="26" dur="500" fill="hold"/>
+                                        <p:tgtEl>
+                                          <p:spTgt spid="3075">
+                                            <p:txEl>
+                                              <p:pRg st="3" end="3"/>
+                                            </p:txEl>
+                                          </p:spTgt>
+                                        </p:tgtEl>
+                                        <p:attrNameLst>
+                                          <p:attrName>ppt_y</p:attrName>
+                                        </p:attrNameLst>
+                                      </p:cBhvr>
+                                      <p:tavLst>
+                                        <p:tav tm="0">
+                                          <p:val>
+                                            <p:strVal val="1+#ppt_h/2"/>
+                                          </p:val>
+                                        </p:tav>
+                                        <p:tav tm="100000">
+                                          <p:val>
+                                            <p:strVal val="#ppt_y"/>
+                                          </p:val>
+                                        </p:tav>
+                                      </p:tavLst>
+                                    </p:anim>
+                                  </p:childTnLst>
+                                </p:cTn>
+                              </p:par>
+                            </p:childTnLst>
+                          </p:cTn>
+                        </p:par>
+                      </p:childTnLst>
+                    </p:cTn>
+                  </p:par>
+                  <p:par>
+                    <p:cTn id="27" fill="hold">
+                      <p:stCondLst>
+                        <p:cond delay="indefinite"/>
+                      </p:stCondLst>
+                      <p:childTnLst>
+                        <p:par>
+                          <p:cTn id="28" fill="hold">
+                            <p:stCondLst>
+                              <p:cond delay="0"/>
+                            </p:stCondLst>
+                            <p:childTnLst>
+                              <p:par>
+                                <p:cTn id="29" presetID="2" presetClass="entr" presetSubtype="4" fill="hold" nodeType="clickEffect">
+                                  <p:stCondLst>
+                                    <p:cond delay="0"/>
+                                  </p:stCondLst>
+                                  <p:childTnLst>
+                                    <p:set>
+                                      <p:cBhvr>
+                                        <p:cTn id="30" dur="1" fill="hold">
+                                          <p:stCondLst>
+                                            <p:cond delay="0"/>
+                                          </p:stCondLst>
+                                        </p:cTn>
+                                        <p:tgtEl>
+                                          <p:spTgt spid="3075">
+                                            <p:txEl>
+                                              <p:pRg st="4" end="4"/>
+                                            </p:txEl>
+                                          </p:spTgt>
+                                        </p:tgtEl>
+                                        <p:attrNameLst>
+                                          <p:attrName>style.visibility</p:attrName>
+                                        </p:attrNameLst>
+                                      </p:cBhvr>
+                                      <p:to>
+                                        <p:strVal val="visible"/>
+                                      </p:to>
+                                    </p:set>
+                                    <p:anim calcmode="lin" valueType="num">
+                                      <p:cBhvr additive="base">
+                                        <p:cTn id="31" dur="500" fill="hold"/>
+                                        <p:tgtEl>
+                                          <p:spTgt spid="3075">
+                                            <p:txEl>
+                                              <p:pRg st="4" end="4"/>
+                                            </p:txEl>
+                                          </p:spTgt>
+                                        </p:tgtEl>
+                                        <p:attrNameLst>
+                                          <p:attrName>ppt_x</p:attrName>
+                                        </p:attrNameLst>
+                                      </p:cBhvr>
+                                      <p:tavLst>
+                                        <p:tav tm="0">
+                                          <p:val>
+                                            <p:strVal val="#ppt_x"/>
+                                          </p:val>
+                                        </p:tav>
+                                        <p:tav tm="100000">
+                                          <p:val>
+                                            <p:strVal val="#ppt_x"/>
+                                          </p:val>
+                                        </p:tav>
+                                      </p:tavLst>
+                                    </p:anim>
+                                    <p:anim calcmode="lin" valueType="num">
+                                      <p:cBhvr additive="base">
+                                        <p:cTn id="32" dur="500" fill="hold"/>
+                                        <p:tgtEl>
+                                          <p:spTgt spid="3075">
+                                            <p:txEl>
+                                              <p:pRg st="4" end="4"/>
+                                            </p:txEl>
+                                          </p:spTgt>
+                                        </p:tgtEl>
+                                        <p:attrNameLst>
+                                          <p:attrName>ppt_y</p:attrName>
+                                        </p:attrNameLst>
+                                      </p:cBhvr>
+                                      <p:tavLst>
+                                        <p:tav tm="0">
+                                          <p:val>
+                                            <p:strVal val="1+#ppt_h/2"/>
+                                          </p:val>
+                                        </p:tav>
+                                        <p:tav tm="100000">
+                                          <p:val>
+                                            <p:strVal val="#ppt_y"/>
+                                          </p:val>
+                                        </p:tav>
+                                      </p:tavLst>
+                                    </p:anim>
+                                  </p:childTnLst>
+                                </p:cTn>
+                              </p:par>
+                            </p:childTnLst>
+                          </p:cTn>
+                        </p:par>
+                      </p:childTnLst>
+                    </p:cTn>
+                  </p:par>
+                  <p:par>
+                    <p:cTn id="33" fill="hold">
+                      <p:stCondLst>
+                        <p:cond delay="indefinite"/>
+                      </p:stCondLst>
+                      <p:childTnLst>
+                        <p:par>
+                          <p:cTn id="34" fill="hold">
+                            <p:stCondLst>
+                              <p:cond delay="0"/>
+                            </p:stCondLst>
+                            <p:childTnLst>
+                              <p:par>
+                                <p:cTn id="35" presetID="2" presetClass="entr" presetSubtype="4" fill="hold" nodeType="clickEffect">
+                                  <p:stCondLst>
+                                    <p:cond delay="0"/>
+                                  </p:stCondLst>
+                                  <p:childTnLst>
+                                    <p:set>
+                                      <p:cBhvr>
+                                        <p:cTn id="36" dur="1" fill="hold">
+                                          <p:stCondLst>
+                                            <p:cond delay="0"/>
+                                          </p:stCondLst>
+                                        </p:cTn>
+                                        <p:tgtEl>
+                                          <p:spTgt spid="3075">
+                                            <p:txEl>
+                                              <p:pRg st="5" end="5"/>
+                                            </p:txEl>
+                                          </p:spTgt>
+                                        </p:tgtEl>
+                                        <p:attrNameLst>
+                                          <p:attrName>style.visibility</p:attrName>
+                                        </p:attrNameLst>
+                                      </p:cBhvr>
+                                      <p:to>
+                                        <p:strVal val="visible"/>
+                                      </p:to>
+                                    </p:set>
+                                    <p:anim calcmode="lin" valueType="num">
+                                      <p:cBhvr additive="base">
+                                        <p:cTn id="37" dur="500" fill="hold"/>
+                                        <p:tgtEl>
+                                          <p:spTgt spid="3075">
+                                            <p:txEl>
+                                              <p:pRg st="5" end="5"/>
+                                            </p:txEl>
+                                          </p:spTgt>
+                                        </p:tgtEl>
+                                        <p:attrNameLst>
+                                          <p:attrName>ppt_x</p:attrName>
+                                        </p:attrNameLst>
+                                      </p:cBhvr>
+                                      <p:tavLst>
+                                        <p:tav tm="0">
+                                          <p:val>
+                                            <p:strVal val="#ppt_x"/>
+                                          </p:val>
+                                        </p:tav>
+                                        <p:tav tm="100000">
+                                          <p:val>
+                                            <p:strVal val="#ppt_x"/>
+                                          </p:val>
+                                        </p:tav>
+                                      </p:tavLst>
+                                    </p:anim>
+                                    <p:anim calcmode="lin" valueType="num">
+                                      <p:cBhvr additive="base">
+                                        <p:cTn id="38" dur="500" fill="hold"/>
+                                        <p:tgtEl>
+                                          <p:spTgt spid="3075">
+                                            <p:txEl>
+                                              <p:pRg st="5" end="5"/>
+                                            </p:txEl>
+                                          </p:spTgt>
+                                        </p:tgtEl>
+                                        <p:attrNameLst>
+                                          <p:attrName>ppt_y</p:attrName>
+                                        </p:attrNameLst>
+                                      </p:cBhvr>
+                                      <p:tavLst>
+                                        <p:tav tm="0">
+                                          <p:val>
+                                            <p:strVal val="1+#ppt_h/2"/>
+                                          </p:val>
+                                        </p:tav>
+                                        <p:tav tm="100000">
+                                          <p:val>
+                                            <p:strVal val="#ppt_y"/>
+                                          </p:val>
+                                        </p:tav>
+                                      </p:tavLst>
+                                    </p:anim>
+                                  </p:childTnLst>
+                                </p:cTn>
+                              </p:par>
+                            </p:childTnLst>
+                          </p:cTn>
+                        </p:par>
+                      </p:childTnLst>
+                    </p:cTn>
+                  </p:par>
+                  <p:par>
+                    <p:cTn id="39" fill="hold">
+                      <p:stCondLst>
+                        <p:cond delay="indefinite"/>
+                      </p:stCondLst>
+                      <p:childTnLst>
+                        <p:par>
+                          <p:cTn id="40" fill="hold">
+                            <p:stCondLst>
+                              <p:cond delay="0"/>
+                            </p:stCondLst>
+                            <p:childTnLst>
+                              <p:par>
+                                <p:cTn id="41" presetID="2" presetClass="entr" presetSubtype="4" fill="hold" nodeType="clickEffect">
+                                  <p:stCondLst>
+                                    <p:cond delay="0"/>
+                                  </p:stCondLst>
+                                  <p:childTnLst>
+                                    <p:set>
+                                      <p:cBhvr>
+                                        <p:cTn id="42" dur="1" fill="hold">
+                                          <p:stCondLst>
+                                            <p:cond delay="0"/>
+                                          </p:stCondLst>
+                                        </p:cTn>
+                                        <p:tgtEl>
+                                          <p:spTgt spid="3075">
+                                            <p:txEl>
+                                              <p:pRg st="6" end="6"/>
+                                            </p:txEl>
+                                          </p:spTgt>
+                                        </p:tgtEl>
+                                        <p:attrNameLst>
+                                          <p:attrName>style.visibility</p:attrName>
+                                        </p:attrNameLst>
+                                      </p:cBhvr>
+                                      <p:to>
+                                        <p:strVal val="visible"/>
+                                      </p:to>
+                                    </p:set>
+                                    <p:anim calcmode="lin" valueType="num">
+                                      <p:cBhvr additive="base">
+                                        <p:cTn id="43" dur="500" fill="hold"/>
+                                        <p:tgtEl>
+                                          <p:spTgt spid="3075">
+                                            <p:txEl>
+                                              <p:pRg st="6" end="6"/>
+                                            </p:txEl>
+                                          </p:spTgt>
+                                        </p:tgtEl>
+                                        <p:attrNameLst>
+                                          <p:attrName>ppt_x</p:attrName>
+                                        </p:attrNameLst>
+                                      </p:cBhvr>
+                                      <p:tavLst>
+                                        <p:tav tm="0">
+                                          <p:val>
+                                            <p:strVal val="#ppt_x"/>
+                                          </p:val>
+                                        </p:tav>
+                                        <p:tav tm="100000">
+                                          <p:val>
+                                            <p:strVal val="#ppt_x"/>
+                                          </p:val>
+                                        </p:tav>
+                                      </p:tavLst>
+                                    </p:anim>
+                                    <p:anim calcmode="lin" valueType="num">
+                                      <p:cBhvr additive="base">
+                                        <p:cTn id="44" dur="500" fill="hold"/>
+                                        <p:tgtEl>
+                                          <p:spTgt spid="3075">
+                                            <p:txEl>
+                                              <p:pRg st="6" end="6"/>
+                                            </p:txEl>
+                                          </p:spTgt>
+                                        </p:tgtEl>
+                                        <p:attrNameLst>
+                                          <p:attrName>ppt_y</p:attrName>
+                                        </p:attrNameLst>
+                                      </p:cBhvr>
+                                      <p:tavLst>
+                                        <p:tav tm="0">
+                                          <p:val>
+                                            <p:strVal val="1+#ppt_h/2"/>
+                                          </p:val>
+                                        </p:tav>
+                                        <p:tav tm="100000">
+                                          <p:val>
+                                            <p:strVal val="#ppt_y"/>
+                                          </p:val>
+                                        </p:tav>
+                                      </p:tavLst>
+                                    </p:anim>
+                                  </p:childTnLst>
+                                </p:cTn>
+                              </p:par>
+                            </p:childTnLst>
+                          </p:cTn>
+                        </p:par>
+                      </p:childTnLst>
+                    </p:cTn>
+                  </p:par>
+                </p:childTnLst>
+              </p:cTn>
+              <p:prevCondLst>
+                <p:cond evt="onPrev" delay="0">
+                  <p:tgtEl>
+                    <p:sldTgt/>
+                  </p:tgtEl>
+                </p:cond>
+              </p:prevCondLst>
+              <p:nextCondLst>
+                <p:cond evt="onNext" delay="0">
+                  <p:tgtEl>
+                    <p:sldTgt/>
+                  </p:tgtEl>
+                </p:cond>
+              </p:nextCondLst>
+            </p:seq>
+          </p:childTnLst>
+        </p:cTn>
+      </p:par>
+    </p:tnLst>
+  </p:timing>
+</p:sld>
+</file>
+
+<file path=ppt/slides/slide5.xml><?xml version="1.0" encoding="utf-8"?>
+<p:sld xmlns:a="http://schemas.openxmlformats.org/drawingml/2006/main" xmlns:r="http://schemas.openxmlformats.org/officeDocument/2006/relationships" xmlns:p="http://schemas.openxmlformats.org/presentationml/2006/main">
+  <p:cSld>
+    <p:spTree>
+      <p:nvGrpSpPr>
+        <p:cNvPr id="1" name=""/>
+        <p:cNvGrpSpPr/>
+        <p:nvPr/>
+      </p:nvGrpSpPr>
+      <p:grpSpPr>
+        <a:xfrm>
+          <a:off x="0" y="0"/>
+          <a:ext cx="0" cy="0"/>
+          <a:chOff x="0" y="0"/>
+          <a:chExt cx="0" cy="0"/>
+        </a:xfrm>
+      </p:grpSpPr>
+      <p:sp>
+        <p:nvSpPr>
+          <p:cNvPr id="3074" name="Title 1"/>
+          <p:cNvSpPr>
+            <a:spLocks noGrp="1"/>
+          </p:cNvSpPr>
+          <p:nvPr>
+            <p:ph type="title"/>
+          </p:nvPr>
+        </p:nvSpPr>
+        <p:spPr bwMode="auto">
+          <a:noFill/>
+          <a:ln>
+            <a:miter lim="800000"/>
+            <a:headEnd/>
+            <a:tailEnd/>
+          </a:ln>
+        </p:spPr>
+        <p:txBody>
+          <a:bodyPr vert="horz" wrap="square" lIns="91440" tIns="45720" rIns="91440" bIns="45720" numCol="1" anchor="t" anchorCtr="0" compatLnSpc="1">
+            <a:prstTxWarp prst="textNoShape">
+              <a:avLst/>
+            </a:prstTxWarp>
+          </a:bodyPr>
+          <a:lstStyle/>
+          <a:p>
+            <a:pPr eaLnBrk="1" hangingPunct="1"/>
+            <a:r>
+              <a:rPr lang="en-US" dirty="0" smtClean="0"/>
+              <a:t>Design Pattern Categories</a:t>
+            </a:r>
+          </a:p>
+        </p:txBody>
+      </p:sp>
+      <p:sp>
+        <p:nvSpPr>
+          <p:cNvPr id="3075" name="Text Placeholder 2"/>
+          <p:cNvSpPr>
+            <a:spLocks noGrp="1"/>
+          </p:cNvSpPr>
+          <p:nvPr>
+            <p:ph type="body" sz="quarter" idx="10"/>
+          </p:nvPr>
+        </p:nvSpPr>
+        <p:spPr>
+          <a:xfrm>
+            <a:off x="381000" y="1295400"/>
+            <a:ext cx="8686800" cy="3886200"/>
+          </a:xfrm>
+        </p:spPr>
+        <p:txBody>
+          <a:bodyPr/>
+          <a:lstStyle/>
+          <a:p>
+            <a:pPr marL="457200" indent="-457200">
+              <a:buFont typeface="+mj-lt"/>
+              <a:buAutoNum type="arabicPeriod"/>
+            </a:pPr>
+            <a:r>
+              <a:rPr lang="en-US" sz="2000" dirty="0" smtClean="0"/>
+              <a:t>23 Patterns in </a:t>
+            </a:r>
+            <a:r>
+              <a:rPr lang="en-US" sz="2000" dirty="0" err="1" smtClean="0"/>
+              <a:t>GoF</a:t>
+            </a:r>
+            <a:r>
+              <a:rPr lang="en-US" sz="2000" dirty="0" smtClean="0"/>
+              <a:t>- Foundation</a:t>
+            </a:r>
+          </a:p>
+          <a:p>
+            <a:pPr marL="457200" indent="-457200">
+              <a:buFont typeface="+mj-lt"/>
+              <a:buAutoNum type="arabicPeriod"/>
+            </a:pPr>
+            <a:r>
+              <a:rPr lang="en-US" sz="2000" dirty="0" smtClean="0"/>
+              <a:t>3 Groups </a:t>
+            </a:r>
+          </a:p>
+          <a:p>
+            <a:pPr marL="857250" lvl="1" indent="-457200">
+              <a:buFont typeface="+mj-lt"/>
+              <a:buAutoNum type="arabicPeriod"/>
+            </a:pPr>
+            <a:r>
+              <a:rPr lang="en-US" sz="2000" dirty="0" smtClean="0"/>
+              <a:t>Creational</a:t>
+            </a:r>
+          </a:p>
+          <a:p>
+            <a:pPr marL="857250" lvl="1" indent="-457200">
+              <a:buFont typeface="+mj-lt"/>
+              <a:buAutoNum type="arabicPeriod"/>
+            </a:pPr>
+            <a:r>
+              <a:rPr lang="en-US" sz="2000" dirty="0" smtClean="0"/>
+              <a:t>Structural</a:t>
+            </a:r>
+          </a:p>
+          <a:p>
+            <a:pPr marL="857250" lvl="1" indent="-457200">
+              <a:buFont typeface="+mj-lt"/>
+              <a:buAutoNum type="arabicPeriod"/>
+            </a:pPr>
+            <a:r>
+              <a:rPr lang="en-US" sz="2000" dirty="0" smtClean="0"/>
+              <a:t>Behavioral</a:t>
+            </a:r>
+          </a:p>
+          <a:p>
+            <a:pPr marL="457200" indent="-457200">
+              <a:buFont typeface="+mj-lt"/>
+              <a:buAutoNum type="arabicPeriod"/>
+            </a:pPr>
+            <a:r>
+              <a:rPr lang="en-US" sz="2000" dirty="0" smtClean="0"/>
+              <a:t>Specific Areas such as architecture, UI, concurrency, security</a:t>
+            </a:r>
+          </a:p>
+          <a:p>
+            <a:pPr marL="457200" indent="-457200">
+              <a:buNone/>
+            </a:pPr>
+            <a:r>
+              <a:rPr lang="en-US" sz="2000" dirty="0" smtClean="0"/>
+              <a:t>4. 	Forces and Solution</a:t>
+            </a:r>
+          </a:p>
+          <a:p>
+            <a:pPr marL="457200" indent="-457200">
+              <a:buNone/>
+            </a:pPr>
+            <a:r>
+              <a:rPr lang="en-US" sz="2000" dirty="0" smtClean="0"/>
+              <a:t>5. 	UML</a:t>
+            </a:r>
+          </a:p>
+          <a:p>
+            <a:pPr marL="457200" indent="-457200">
+              <a:buNone/>
+            </a:pPr>
+            <a:endParaRPr lang="en-US" sz="2000" i="1" dirty="0" smtClean="0"/>
+          </a:p>
+          <a:p>
+            <a:pPr marL="457200" indent="-457200">
+              <a:buNone/>
+            </a:pPr>
+            <a:r>
+              <a:rPr lang="en-US" sz="2000" i="1" dirty="0" smtClean="0"/>
+              <a:t>         </a:t>
+            </a:r>
+          </a:p>
+        </p:txBody>
+      </p:sp>
+      <p:sp>
+        <p:nvSpPr>
+          <p:cNvPr id="5" name="Rectangle 4"/>
+          <p:cNvSpPr/>
+          <p:nvPr/>
+        </p:nvSpPr>
+        <p:spPr>
+          <a:xfrm>
+            <a:off x="2514600" y="6553200"/>
+            <a:ext cx="4114800" cy="228600"/>
+          </a:xfrm>
+          <a:prstGeom prst="rect">
+            <a:avLst/>
+          </a:prstGeom>
+          <a:solidFill>
+            <a:schemeClr val="bg1"/>
+          </a:solidFill>
+          <a:ln>
+            <a:solidFill>
+              <a:schemeClr val="bg1"/>
+            </a:solidFill>
+          </a:ln>
+        </p:spPr>
+        <p:style>
+          <a:lnRef idx="2">
+            <a:schemeClr val="accent1">
+              <a:shade val="50000"/>
+            </a:schemeClr>
+          </a:lnRef>
+          <a:fillRef idx="1">
+            <a:schemeClr val="accent1"/>
+          </a:fillRef>
+          <a:effectRef idx="0">
+            <a:schemeClr val="accent1"/>
+          </a:effectRef>
+          <a:fontRef idx="minor">
+            <a:schemeClr val="lt1"/>
+          </a:fontRef>
+        </p:style>
+        <p:txBody>
+          <a:bodyPr rtlCol="0" anchor="ctr"/>
+          <a:lstStyle/>
+          <a:p>
+            <a:pPr algn="ctr"/>
+            <a:endParaRPr lang="en-US"/>
+          </a:p>
+        </p:txBody>
+      </p:sp>
+    </p:spTree>
+  </p:cSld>
+  <p:clrMapOvr>
+    <a:masterClrMapping/>
+  </p:clrMapOvr>
+  <p:timing>
+    <p:tnLst>
+      <p:par>
         <p:cTn id="1" dur="indefinite" restart="never" nodeType="tmRoot"/>
       </p:par>
     </p:tnLst>
@@ -6593,7 +7815,7 @@
 </p:sld>
 </file>
 
-<file path=ppt/slides/slide5.xml><?xml version="1.0" encoding="utf-8"?>
+<file path=ppt/slides/slide6.xml><?xml version="1.0" encoding="utf-8"?>
 <p:sld xmlns:a="http://schemas.openxmlformats.org/drawingml/2006/main" xmlns:r="http://schemas.openxmlformats.org/officeDocument/2006/relationships" xmlns:p="http://schemas.openxmlformats.org/presentationml/2006/main">
   <p:cSld>
     <p:spTree>
@@ -6927,7 +8149,7 @@
 </p:sld>
 </file>
 
-<file path=ppt/slides/slide6.xml><?xml version="1.0" encoding="utf-8"?>
+<file path=ppt/slides/slide7.xml><?xml version="1.0" encoding="utf-8"?>
 <p:sld xmlns:a="http://schemas.openxmlformats.org/drawingml/2006/main" xmlns:r="http://schemas.openxmlformats.org/officeDocument/2006/relationships" xmlns:p="http://schemas.openxmlformats.org/presentationml/2006/main">
   <p:cSld>
     <p:spTree>
@@ -7135,7 +8357,7 @@
 </p:sld>
 </file>
 
-<file path=ppt/slides/slide7.xml><?xml version="1.0" encoding="utf-8"?>
+<file path=ppt/slides/slide8.xml><?xml version="1.0" encoding="utf-8"?>
 <p:sld xmlns:a="http://schemas.openxmlformats.org/drawingml/2006/main" xmlns:r="http://schemas.openxmlformats.org/officeDocument/2006/relationships" xmlns:p="http://schemas.openxmlformats.org/presentationml/2006/main">
   <p:cSld>
     <p:spTree>
@@ -7295,7 +8517,7 @@
 </p:sld>
 </file>
 
-<file path=ppt/slides/slide8.xml><?xml version="1.0" encoding="utf-8"?>
+<file path=ppt/slides/slide9.xml><?xml version="1.0" encoding="utf-8"?>
 <p:sld xmlns:a="http://schemas.openxmlformats.org/drawingml/2006/main" xmlns:r="http://schemas.openxmlformats.org/officeDocument/2006/relationships" xmlns:p="http://schemas.openxmlformats.org/presentationml/2006/main">
   <p:cSld>
     <p:spTree>
@@ -7481,185 +8703,6 @@
             </a:r>
           </a:p>
           <a:p>
-            <a:endParaRPr lang="en-US" dirty="0" smtClean="0"/>
-          </a:p>
-        </p:txBody>
-      </p:sp>
-    </p:spTree>
-  </p:cSld>
-  <p:clrMapOvr>
-    <a:masterClrMapping/>
-  </p:clrMapOvr>
-  <p:timing>
-    <p:tnLst>
-      <p:par>
-        <p:cTn id="1" dur="indefinite" restart="never" nodeType="tmRoot"/>
-      </p:par>
-    </p:tnLst>
-  </p:timing>
-</p:sld>
-</file>
-
-<file path=ppt/slides/slide9.xml><?xml version="1.0" encoding="utf-8"?>
-<p:sld xmlns:a="http://schemas.openxmlformats.org/drawingml/2006/main" xmlns:r="http://schemas.openxmlformats.org/officeDocument/2006/relationships" xmlns:p="http://schemas.openxmlformats.org/presentationml/2006/main">
-  <p:cSld>
-    <p:spTree>
-      <p:nvGrpSpPr>
-        <p:cNvPr id="1" name=""/>
-        <p:cNvGrpSpPr/>
-        <p:nvPr/>
-      </p:nvGrpSpPr>
-      <p:grpSpPr>
-        <a:xfrm>
-          <a:off x="0" y="0"/>
-          <a:ext cx="0" cy="0"/>
-          <a:chOff x="0" y="0"/>
-          <a:chExt cx="0" cy="0"/>
-        </a:xfrm>
-      </p:grpSpPr>
-      <p:sp>
-        <p:nvSpPr>
-          <p:cNvPr id="3074" name="Title 1"/>
-          <p:cNvSpPr>
-            <a:spLocks noGrp="1"/>
-          </p:cNvSpPr>
-          <p:nvPr>
-            <p:ph type="title"/>
-          </p:nvPr>
-        </p:nvSpPr>
-        <p:spPr bwMode="auto">
-          <a:noFill/>
-          <a:ln>
-            <a:miter lim="800000"/>
-            <a:headEnd/>
-            <a:tailEnd/>
-          </a:ln>
-        </p:spPr>
-        <p:txBody>
-          <a:bodyPr vert="horz" wrap="square" lIns="91440" tIns="45720" rIns="91440" bIns="45720" numCol="1" anchor="t" anchorCtr="0" compatLnSpc="1">
-            <a:prstTxWarp prst="textNoShape">
-              <a:avLst/>
-            </a:prstTxWarp>
-          </a:bodyPr>
-          <a:lstStyle/>
-          <a:p>
-            <a:pPr eaLnBrk="1" hangingPunct="1"/>
-            <a:r>
-              <a:rPr lang="en-US" dirty="0" smtClean="0"/>
-              <a:t>Behavioral Patterns</a:t>
-            </a:r>
-          </a:p>
-        </p:txBody>
-      </p:sp>
-      <p:sp>
-        <p:nvSpPr>
-          <p:cNvPr id="4" name="Rectangle 3"/>
-          <p:cNvSpPr/>
-          <p:nvPr/>
-        </p:nvSpPr>
-        <p:spPr>
-          <a:xfrm>
-            <a:off x="2514600" y="6553200"/>
-            <a:ext cx="4114800" cy="228600"/>
-          </a:xfrm>
-          <a:prstGeom prst="rect">
-            <a:avLst/>
-          </a:prstGeom>
-          <a:solidFill>
-            <a:schemeClr val="bg1"/>
-          </a:solidFill>
-          <a:ln>
-            <a:solidFill>
-              <a:schemeClr val="bg1"/>
-            </a:solidFill>
-          </a:ln>
-        </p:spPr>
-        <p:style>
-          <a:lnRef idx="2">
-            <a:schemeClr val="accent1">
-              <a:shade val="50000"/>
-            </a:schemeClr>
-          </a:lnRef>
-          <a:fillRef idx="1">
-            <a:schemeClr val="accent1"/>
-          </a:fillRef>
-          <a:effectRef idx="0">
-            <a:schemeClr val="accent1"/>
-          </a:effectRef>
-          <a:fontRef idx="minor">
-            <a:schemeClr val="lt1"/>
-          </a:fontRef>
-        </p:style>
-        <p:txBody>
-          <a:bodyPr rtlCol="0" anchor="ctr"/>
-          <a:lstStyle/>
-          <a:p>
-            <a:pPr algn="ctr"/>
-            <a:endParaRPr lang="en-US"/>
-          </a:p>
-        </p:txBody>
-      </p:sp>
-      <p:sp>
-        <p:nvSpPr>
-          <p:cNvPr id="13" name="Text Placeholder 12"/>
-          <p:cNvSpPr>
-            <a:spLocks noGrp="1"/>
-          </p:cNvSpPr>
-          <p:nvPr>
-            <p:ph type="body" sz="quarter" idx="10"/>
-          </p:nvPr>
-        </p:nvSpPr>
-        <p:spPr/>
-        <p:txBody>
-          <a:bodyPr/>
-          <a:lstStyle/>
-          <a:p>
-            <a:r>
-              <a:rPr lang="en-US" b="1" dirty="0" smtClean="0"/>
-              <a:t>Observer </a:t>
-            </a:r>
-            <a:r>
-              <a:rPr lang="en-US" dirty="0" smtClean="0"/>
-              <a:t>– Publisher Subscriber System</a:t>
-            </a:r>
-          </a:p>
-          <a:p>
-            <a:r>
-              <a:rPr lang="en-US" b="1" dirty="0" smtClean="0"/>
-              <a:t>Visitor </a:t>
-            </a:r>
-            <a:r>
-              <a:rPr lang="en-US" dirty="0" smtClean="0"/>
-              <a:t>– Defines and performs new operations on all elements of an existing structure</a:t>
-            </a:r>
-          </a:p>
-          <a:p>
-            <a:r>
-              <a:rPr lang="en-US" b="1" dirty="0" smtClean="0"/>
-              <a:t>Interpreter </a:t>
-            </a:r>
-            <a:r>
-              <a:rPr lang="en-US" dirty="0" smtClean="0"/>
-              <a:t>– ?</a:t>
-            </a:r>
-          </a:p>
-          <a:p>
-            <a:r>
-              <a:rPr lang="en-US" b="1" dirty="0" smtClean="0"/>
-              <a:t>Memento </a:t>
-            </a:r>
-            <a:r>
-              <a:rPr lang="en-US" dirty="0" smtClean="0"/>
-              <a:t>– Captures the state of an object’s internal state and saves externally</a:t>
-            </a:r>
-          </a:p>
-          <a:p>
-            <a:endParaRPr lang="en-US" dirty="0" smtClean="0"/>
-          </a:p>
-          <a:p>
-            <a:pPr>
-              <a:buNone/>
-            </a:pPr>
             <a:endParaRPr lang="en-US" dirty="0" smtClean="0"/>
           </a:p>
         </p:txBody>
@@ -8545,21 +9588,6 @@
 </file>
 
 <file path=customXml/item1.xml><?xml version="1.0" encoding="utf-8"?>
-<?mso-contentType ?>
-<FormTemplates xmlns="http://schemas.microsoft.com/sharepoint/v3/contenttype/forms">
-  <Display>DocumentLibraryForm</Display>
-  <Edit>DocumentLibraryForm</Edit>
-  <New>DocumentLibraryForm</New>
-</FormTemplates>
-</file>
-
-<file path=customXml/item2.xml><?xml version="1.0" encoding="utf-8"?>
-<p:properties xmlns:p="http://schemas.microsoft.com/office/2006/metadata/properties" xmlns:xsi="http://www.w3.org/2001/XMLSchema-instance">
-  <documentManagement/>
-</p:properties>
-</file>
-
-<file path=customXml/item3.xml><?xml version="1.0" encoding="utf-8"?>
 <ct:contentTypeSchema xmlns:ct="http://schemas.microsoft.com/office/2006/metadata/contentType" xmlns:ma="http://schemas.microsoft.com/office/2006/metadata/properties/metaAttributes" ct:_="" ma:_="" ma:contentTypeName="Document" ma:contentTypeID="0x010100081EEA846D466D42A2F8C262663B0874" ma:contentTypeVersion="0" ma:contentTypeDescription="Create a new document." ma:contentTypeScope="" ma:versionID="bb71263b1de598fc4454cb39f55dc523">
   <xsd:schema xmlns:xsd="http://www.w3.org/2001/XMLSchema" xmlns:p="http://schemas.microsoft.com/office/2006/metadata/properties" targetNamespace="http://schemas.microsoft.com/office/2006/metadata/properties" ma:root="true" ma:fieldsID="4aeb20c0e3442673af7ee10786458764">
     <xsd:element name="properties">
@@ -8608,10 +9636,32 @@
 </ct:contentTypeSchema>
 </file>
 
+<file path=customXml/item2.xml><?xml version="1.0" encoding="utf-8"?>
+<p:properties xmlns:p="http://schemas.microsoft.com/office/2006/metadata/properties" xmlns:xsi="http://www.w3.org/2001/XMLSchema-instance">
+  <documentManagement/>
+</p:properties>
+</file>
+
+<file path=customXml/item3.xml><?xml version="1.0" encoding="utf-8"?>
+<?mso-contentType ?>
+<FormTemplates xmlns="http://schemas.microsoft.com/sharepoint/v3/contenttype/forms">
+  <Display>DocumentLibraryForm</Display>
+  <Edit>DocumentLibraryForm</Edit>
+  <New>DocumentLibraryForm</New>
+</FormTemplates>
+</file>
+
 <file path=customXml/itemProps1.xml><?xml version="1.0" encoding="utf-8"?>
-<ds:datastoreItem xmlns:ds="http://schemas.openxmlformats.org/officeDocument/2006/customXml" ds:itemID="{B8CDF88D-34F6-4273-95F6-DA3DE3684139}">
+<ds:datastoreItem xmlns:ds="http://schemas.openxmlformats.org/officeDocument/2006/customXml" ds:itemID="{ADBD3571-0B2C-4EE2-BC06-1BEB32539D86}">
   <ds:schemaRefs>
-    <ds:schemaRef ds:uri="http://schemas.microsoft.com/sharepoint/v3/contenttype/forms"/>
+    <ds:schemaRef ds:uri="http://schemas.microsoft.com/office/2006/metadata/contentType"/>
+    <ds:schemaRef ds:uri="http://schemas.microsoft.com/office/2006/metadata/properties/metaAttributes"/>
+    <ds:schemaRef ds:uri="http://www.w3.org/2001/XMLSchema"/>
+    <ds:schemaRef ds:uri="http://schemas.microsoft.com/office/2006/metadata/properties"/>
+    <ds:schemaRef ds:uri="http://schemas.openxmlformats.org/package/2006/metadata/core-properties"/>
+    <ds:schemaRef ds:uri="http://purl.org/dc/elements/1.1/"/>
+    <ds:schemaRef ds:uri="http://purl.org/dc/terms/"/>
+    <ds:schemaRef ds:uri="http://schemas.microsoft.com/office/internal/2005/internalDocumentation"/>
   </ds:schemaRefs>
 </ds:datastoreItem>
 </file>
@@ -8631,16 +9681,9 @@
 </file>
 
 <file path=customXml/itemProps3.xml><?xml version="1.0" encoding="utf-8"?>
-<ds:datastoreItem xmlns:ds="http://schemas.openxmlformats.org/officeDocument/2006/customXml" ds:itemID="{ADBD3571-0B2C-4EE2-BC06-1BEB32539D86}">
+<ds:datastoreItem xmlns:ds="http://schemas.openxmlformats.org/officeDocument/2006/customXml" ds:itemID="{B8CDF88D-34F6-4273-95F6-DA3DE3684139}">
   <ds:schemaRefs>
-    <ds:schemaRef ds:uri="http://schemas.microsoft.com/office/2006/metadata/contentType"/>
-    <ds:schemaRef ds:uri="http://schemas.microsoft.com/office/2006/metadata/properties/metaAttributes"/>
-    <ds:schemaRef ds:uri="http://www.w3.org/2001/XMLSchema"/>
-    <ds:schemaRef ds:uri="http://schemas.microsoft.com/office/2006/metadata/properties"/>
-    <ds:schemaRef ds:uri="http://schemas.openxmlformats.org/package/2006/metadata/core-properties"/>
-    <ds:schemaRef ds:uri="http://purl.org/dc/elements/1.1/"/>
-    <ds:schemaRef ds:uri="http://purl.org/dc/terms/"/>
-    <ds:schemaRef ds:uri="http://schemas.microsoft.com/office/internal/2005/internalDocumentation"/>
+    <ds:schemaRef ds:uri="http://schemas.microsoft.com/sharepoint/v3/contenttype/forms"/>
   </ds:schemaRefs>
 </ds:datastoreItem>
 </file>
</xml_diff>

<commit_message>
Added details for strategy pattern as well as code... also added scenarios to each project
</commit_message>
<xml_diff>
--- a/Design Patterns Part 1.pptx
+++ b/Design Patterns Part 1.pptx
@@ -264,7 +264,7 @@
               <a:pPr>
                 <a:defRPr/>
               </a:pPr>
-              <a:t>5/27/2012</a:t>
+              <a:t>5/29/2012</a:t>
             </a:fld>
             <a:endParaRPr lang="en-US"/>
           </a:p>
@@ -442,7 +442,7 @@
               <a:pPr>
                 <a:defRPr/>
               </a:pPr>
-              <a:t>5/27/2012</a:t>
+              <a:t>5/29/2012</a:t>
             </a:fld>
             <a:endParaRPr lang="en-US"/>
           </a:p>
@@ -3472,11 +3472,25 @@
               <a:t>Publisher/Subscriber</a:t>
             </a:r>
           </a:p>
+          <a:p>
+            <a:pPr>
+              <a:buNone/>
+            </a:pPr>
+            <a:r>
+              <a:rPr lang="en-US" dirty="0" err="1" smtClean="0"/>
+              <a:t>Notifier</a:t>
+            </a:r>
+            <a:r>
+              <a:rPr lang="en-US" dirty="0" smtClean="0"/>
+              <a:t>/Handler</a:t>
+            </a:r>
+            <a:endParaRPr lang="en-US" dirty="0" smtClean="0"/>
+          </a:p>
         </p:txBody>
       </p:sp>
       <p:pic>
         <p:nvPicPr>
-          <p:cNvPr id="1026" name="Picture 2"/>
+          <p:cNvPr id="4098" name="Picture 2"/>
           <p:cNvPicPr>
             <a:picLocks noChangeAspect="1" noChangeArrowheads="1"/>
           </p:cNvPicPr>
@@ -3491,8 +3505,8 @@
         </p:blipFill>
         <p:spPr bwMode="auto">
           <a:xfrm>
-            <a:off x="457200" y="1600200"/>
-            <a:ext cx="7799056" cy="3276600"/>
+            <a:off x="1143000" y="2895600"/>
+            <a:ext cx="5055476" cy="2133600"/>
           </a:xfrm>
           <a:prstGeom prst="rect">
             <a:avLst/>
@@ -3811,14 +3825,24 @@
             </a:pPr>
             <a:r>
               <a:rPr lang="en-US" dirty="0" smtClean="0"/>
-              <a:t>.</a:t>
-            </a:r>
+              <a:t>List of handlers set in sequence of priority</a:t>
+            </a:r>
+          </a:p>
+          <a:p>
+            <a:pPr>
+              <a:buNone/>
+            </a:pPr>
+            <a:r>
+              <a:rPr lang="en-US" dirty="0" smtClean="0"/>
+              <a:t>Extensible</a:t>
+            </a:r>
+            <a:endParaRPr lang="en-US" dirty="0" smtClean="0"/>
           </a:p>
         </p:txBody>
       </p:sp>
       <p:pic>
         <p:nvPicPr>
-          <p:cNvPr id="2" name="Picture 2"/>
+          <p:cNvPr id="2051" name="Picture 3"/>
           <p:cNvPicPr>
             <a:picLocks noChangeAspect="1" noChangeArrowheads="1"/>
           </p:cNvPicPr>
@@ -3833,8 +3857,8 @@
         </p:blipFill>
         <p:spPr bwMode="auto">
           <a:xfrm>
-            <a:off x="1219200" y="1143000"/>
-            <a:ext cx="5715000" cy="5111750"/>
+            <a:off x="2514600" y="2133600"/>
+            <a:ext cx="4333875" cy="3848100"/>
           </a:xfrm>
           <a:prstGeom prst="rect">
             <a:avLst/>
@@ -3982,11 +4006,64 @@
             </a:pPr>
             <a:r>
               <a:rPr lang="en-US" dirty="0" smtClean="0"/>
-              <a:t>.</a:t>
-            </a:r>
-          </a:p>
-        </p:txBody>
-      </p:sp>
+              <a:t>Group – Creational</a:t>
+            </a:r>
+          </a:p>
+          <a:p>
+            <a:pPr>
+              <a:buNone/>
+            </a:pPr>
+            <a:r>
+              <a:rPr lang="en-US" dirty="0" smtClean="0"/>
+              <a:t>Role -  Implement the concept of factories</a:t>
+            </a:r>
+          </a:p>
+          <a:p>
+            <a:pPr>
+              <a:buNone/>
+            </a:pPr>
+            <a:endParaRPr lang="en-US" dirty="0" smtClean="0"/>
+          </a:p>
+          <a:p>
+            <a:pPr>
+              <a:buNone/>
+            </a:pPr>
+            <a:endParaRPr lang="en-US" dirty="0" smtClean="0"/>
+          </a:p>
+        </p:txBody>
+      </p:sp>
+      <p:pic>
+        <p:nvPicPr>
+          <p:cNvPr id="1027" name="Picture 3"/>
+          <p:cNvPicPr>
+            <a:picLocks noChangeAspect="1" noChangeArrowheads="1"/>
+          </p:cNvPicPr>
+          <p:nvPr/>
+        </p:nvPicPr>
+        <p:blipFill>
+          <a:blip r:embed="rId3"/>
+          <a:srcRect/>
+          <a:stretch>
+            <a:fillRect/>
+          </a:stretch>
+        </p:blipFill>
+        <p:spPr bwMode="auto">
+          <a:xfrm>
+            <a:off x="1066800" y="2514600"/>
+            <a:ext cx="5457825" cy="3028950"/>
+          </a:xfrm>
+          <a:prstGeom prst="rect">
+            <a:avLst/>
+          </a:prstGeom>
+          <a:noFill/>
+          <a:ln w="9525">
+            <a:noFill/>
+            <a:miter lim="800000"/>
+            <a:headEnd/>
+            <a:tailEnd/>
+          </a:ln>
+        </p:spPr>
+      </p:pic>
     </p:spTree>
   </p:cSld>
   <p:clrMapOvr>
@@ -4121,11 +4198,65 @@
             </a:pPr>
             <a:r>
               <a:rPr lang="en-US" dirty="0" smtClean="0"/>
-              <a:t>.</a:t>
-            </a:r>
-          </a:p>
-        </p:txBody>
-      </p:sp>
+              <a:t>Group: Behavioral</a:t>
+            </a:r>
+          </a:p>
+          <a:p>
+            <a:pPr>
+              <a:buNone/>
+            </a:pPr>
+            <a:r>
+              <a:rPr lang="en-US" dirty="0" smtClean="0"/>
+              <a:t>Extract Strategy out of context to simply client and maintain cohesion</a:t>
+            </a:r>
+            <a:endParaRPr lang="en-US" dirty="0" smtClean="0"/>
+          </a:p>
+          <a:p>
+            <a:pPr>
+              <a:buNone/>
+            </a:pPr>
+            <a:endParaRPr lang="en-US" dirty="0" smtClean="0"/>
+          </a:p>
+          <a:p>
+            <a:pPr>
+              <a:buNone/>
+            </a:pPr>
+            <a:endParaRPr lang="en-US" dirty="0" smtClean="0"/>
+          </a:p>
+        </p:txBody>
+      </p:sp>
+      <p:pic>
+        <p:nvPicPr>
+          <p:cNvPr id="2" name="Picture 2"/>
+          <p:cNvPicPr>
+            <a:picLocks noChangeAspect="1" noChangeArrowheads="1"/>
+          </p:cNvPicPr>
+          <p:nvPr/>
+        </p:nvPicPr>
+        <p:blipFill>
+          <a:blip r:embed="rId3"/>
+          <a:srcRect/>
+          <a:stretch>
+            <a:fillRect/>
+          </a:stretch>
+        </p:blipFill>
+        <p:spPr bwMode="auto">
+          <a:xfrm>
+            <a:off x="1143000" y="2819400"/>
+            <a:ext cx="4343400" cy="1955667"/>
+          </a:xfrm>
+          <a:prstGeom prst="rect">
+            <a:avLst/>
+          </a:prstGeom>
+          <a:noFill/>
+          <a:ln w="9525">
+            <a:noFill/>
+            <a:miter lim="800000"/>
+            <a:headEnd/>
+            <a:tailEnd/>
+          </a:ln>
+        </p:spPr>
+      </p:pic>
     </p:spTree>
   </p:cSld>
   <p:clrMapOvr>
@@ -5708,7 +5839,6 @@
               <a:rPr lang="en-US" b="1" dirty="0" smtClean="0"/>
               <a:t>What design patterns are</a:t>
             </a:r>
-            <a:endParaRPr lang="en-US" b="1" dirty="0" smtClean="0"/>
           </a:p>
           <a:p>
             <a:pPr eaLnBrk="1" hangingPunct="1"/>
@@ -5716,7 +5846,6 @@
               <a:rPr lang="en-US" b="1" dirty="0" smtClean="0"/>
               <a:t>List all the original 23 Gang of Four Design Patterns</a:t>
             </a:r>
-            <a:endParaRPr lang="en-US" b="1" dirty="0" smtClean="0"/>
           </a:p>
           <a:p>
             <a:pPr eaLnBrk="1" hangingPunct="1"/>
@@ -5790,7 +5919,6 @@
               <a:rPr lang="en-US" dirty="0" smtClean="0"/>
               <a:t>Objectives of This Presentation</a:t>
             </a:r>
-            <a:endParaRPr lang="en-US" dirty="0" smtClean="0"/>
           </a:p>
         </p:txBody>
       </p:sp>
@@ -9588,6 +9716,21 @@
 </file>
 
 <file path=customXml/item1.xml><?xml version="1.0" encoding="utf-8"?>
+<?mso-contentType ?>
+<FormTemplates xmlns="http://schemas.microsoft.com/sharepoint/v3/contenttype/forms">
+  <Display>DocumentLibraryForm</Display>
+  <Edit>DocumentLibraryForm</Edit>
+  <New>DocumentLibraryForm</New>
+</FormTemplates>
+</file>
+
+<file path=customXml/item2.xml><?xml version="1.0" encoding="utf-8"?>
+<p:properties xmlns:p="http://schemas.microsoft.com/office/2006/metadata/properties" xmlns:xsi="http://www.w3.org/2001/XMLSchema-instance">
+  <documentManagement/>
+</p:properties>
+</file>
+
+<file path=customXml/item3.xml><?xml version="1.0" encoding="utf-8"?>
 <ct:contentTypeSchema xmlns:ct="http://schemas.microsoft.com/office/2006/metadata/contentType" xmlns:ma="http://schemas.microsoft.com/office/2006/metadata/properties/metaAttributes" ct:_="" ma:_="" ma:contentTypeName="Document" ma:contentTypeID="0x010100081EEA846D466D42A2F8C262663B0874" ma:contentTypeVersion="0" ma:contentTypeDescription="Create a new document." ma:contentTypeScope="" ma:versionID="bb71263b1de598fc4454cb39f55dc523">
   <xsd:schema xmlns:xsd="http://www.w3.org/2001/XMLSchema" xmlns:p="http://schemas.microsoft.com/office/2006/metadata/properties" targetNamespace="http://schemas.microsoft.com/office/2006/metadata/properties" ma:root="true" ma:fieldsID="4aeb20c0e3442673af7ee10786458764">
     <xsd:element name="properties">
@@ -9636,32 +9779,10 @@
 </ct:contentTypeSchema>
 </file>
 
-<file path=customXml/item2.xml><?xml version="1.0" encoding="utf-8"?>
-<p:properties xmlns:p="http://schemas.microsoft.com/office/2006/metadata/properties" xmlns:xsi="http://www.w3.org/2001/XMLSchema-instance">
-  <documentManagement/>
-</p:properties>
-</file>
-
-<file path=customXml/item3.xml><?xml version="1.0" encoding="utf-8"?>
-<?mso-contentType ?>
-<FormTemplates xmlns="http://schemas.microsoft.com/sharepoint/v3/contenttype/forms">
-  <Display>DocumentLibraryForm</Display>
-  <Edit>DocumentLibraryForm</Edit>
-  <New>DocumentLibraryForm</New>
-</FormTemplates>
-</file>
-
 <file path=customXml/itemProps1.xml><?xml version="1.0" encoding="utf-8"?>
-<ds:datastoreItem xmlns:ds="http://schemas.openxmlformats.org/officeDocument/2006/customXml" ds:itemID="{ADBD3571-0B2C-4EE2-BC06-1BEB32539D86}">
+<ds:datastoreItem xmlns:ds="http://schemas.openxmlformats.org/officeDocument/2006/customXml" ds:itemID="{B8CDF88D-34F6-4273-95F6-DA3DE3684139}">
   <ds:schemaRefs>
-    <ds:schemaRef ds:uri="http://schemas.microsoft.com/office/2006/metadata/contentType"/>
-    <ds:schemaRef ds:uri="http://schemas.microsoft.com/office/2006/metadata/properties/metaAttributes"/>
-    <ds:schemaRef ds:uri="http://www.w3.org/2001/XMLSchema"/>
-    <ds:schemaRef ds:uri="http://schemas.microsoft.com/office/2006/metadata/properties"/>
-    <ds:schemaRef ds:uri="http://schemas.openxmlformats.org/package/2006/metadata/core-properties"/>
-    <ds:schemaRef ds:uri="http://purl.org/dc/elements/1.1/"/>
-    <ds:schemaRef ds:uri="http://purl.org/dc/terms/"/>
-    <ds:schemaRef ds:uri="http://schemas.microsoft.com/office/internal/2005/internalDocumentation"/>
+    <ds:schemaRef ds:uri="http://schemas.microsoft.com/sharepoint/v3/contenttype/forms"/>
   </ds:schemaRefs>
 </ds:datastoreItem>
 </file>
@@ -9681,9 +9802,16 @@
 </file>
 
 <file path=customXml/itemProps3.xml><?xml version="1.0" encoding="utf-8"?>
-<ds:datastoreItem xmlns:ds="http://schemas.openxmlformats.org/officeDocument/2006/customXml" ds:itemID="{B8CDF88D-34F6-4273-95F6-DA3DE3684139}">
+<ds:datastoreItem xmlns:ds="http://schemas.openxmlformats.org/officeDocument/2006/customXml" ds:itemID="{ADBD3571-0B2C-4EE2-BC06-1BEB32539D86}">
   <ds:schemaRefs>
-    <ds:schemaRef ds:uri="http://schemas.microsoft.com/sharepoint/v3/contenttype/forms"/>
+    <ds:schemaRef ds:uri="http://schemas.microsoft.com/office/2006/metadata/contentType"/>
+    <ds:schemaRef ds:uri="http://schemas.microsoft.com/office/2006/metadata/properties/metaAttributes"/>
+    <ds:schemaRef ds:uri="http://www.w3.org/2001/XMLSchema"/>
+    <ds:schemaRef ds:uri="http://schemas.microsoft.com/office/2006/metadata/properties"/>
+    <ds:schemaRef ds:uri="http://schemas.openxmlformats.org/package/2006/metadata/core-properties"/>
+    <ds:schemaRef ds:uri="http://purl.org/dc/elements/1.1/"/>
+    <ds:schemaRef ds:uri="http://purl.org/dc/terms/"/>
+    <ds:schemaRef ds:uri="http://schemas.microsoft.com/office/internal/2005/internalDocumentation"/>
   </ds:schemaRefs>
 </ds:datastoreItem>
 </file>
</xml_diff>

<commit_message>
updated slides with additional git details
</commit_message>
<xml_diff>
--- a/Design Patterns Part 1.pptx
+++ b/Design Patterns Part 1.pptx
@@ -5,38 +5,39 @@
     <p:sldMasterId id="2147483822" r:id="rId4"/>
   </p:sldMasterIdLst>
   <p:notesMasterIdLst>
-    <p:notesMasterId r:id="rId21"/>
+    <p:notesMasterId r:id="rId22"/>
   </p:notesMasterIdLst>
   <p:handoutMasterIdLst>
-    <p:handoutMasterId r:id="rId22"/>
+    <p:handoutMasterId r:id="rId23"/>
   </p:handoutMasterIdLst>
   <p:sldIdLst>
     <p:sldId id="256" r:id="rId5"/>
     <p:sldId id="309" r:id="rId6"/>
     <p:sldId id="326" r:id="rId7"/>
-    <p:sldId id="311" r:id="rId8"/>
-    <p:sldId id="261" r:id="rId9"/>
-    <p:sldId id="280" r:id="rId10"/>
-    <p:sldId id="315" r:id="rId11"/>
-    <p:sldId id="317" r:id="rId12"/>
-    <p:sldId id="318" r:id="rId13"/>
-    <p:sldId id="319" r:id="rId14"/>
-    <p:sldId id="321" r:id="rId15"/>
-    <p:sldId id="322" r:id="rId16"/>
-    <p:sldId id="323" r:id="rId17"/>
-    <p:sldId id="324" r:id="rId18"/>
-    <p:sldId id="325" r:id="rId19"/>
-    <p:sldId id="274" r:id="rId20"/>
+    <p:sldId id="327" r:id="rId8"/>
+    <p:sldId id="311" r:id="rId9"/>
+    <p:sldId id="261" r:id="rId10"/>
+    <p:sldId id="280" r:id="rId11"/>
+    <p:sldId id="315" r:id="rId12"/>
+    <p:sldId id="317" r:id="rId13"/>
+    <p:sldId id="318" r:id="rId14"/>
+    <p:sldId id="319" r:id="rId15"/>
+    <p:sldId id="321" r:id="rId16"/>
+    <p:sldId id="322" r:id="rId17"/>
+    <p:sldId id="323" r:id="rId18"/>
+    <p:sldId id="324" r:id="rId19"/>
+    <p:sldId id="325" r:id="rId20"/>
+    <p:sldId id="274" r:id="rId21"/>
   </p:sldIdLst>
   <p:sldSz cx="9144000" cy="6858000" type="screen4x3"/>
   <p:notesSz cx="7010400" cy="9296400"/>
   <p:embeddedFontLst>
     <p:embeddedFont>
       <p:font typeface="Calibri" pitchFamily="34" charset="0"/>
-      <p:regular r:id="rId23"/>
-      <p:bold r:id="rId24"/>
-      <p:italic r:id="rId25"/>
-      <p:boldItalic r:id="rId26"/>
+      <p:regular r:id="rId24"/>
+      <p:bold r:id="rId25"/>
+      <p:italic r:id="rId26"/>
+      <p:boldItalic r:id="rId27"/>
     </p:embeddedFont>
   </p:embeddedFontLst>
   <p:defaultTextStyle>
@@ -1268,6 +1269,93 @@
 </p:notes>
 </file>
 
+<file path=ppt/notesSlides/notesSlide15.xml><?xml version="1.0" encoding="utf-8"?>
+<p:notes xmlns:a="http://schemas.openxmlformats.org/drawingml/2006/main" xmlns:r="http://schemas.openxmlformats.org/officeDocument/2006/relationships" xmlns:p="http://schemas.openxmlformats.org/presentationml/2006/main">
+  <p:cSld>
+    <p:spTree>
+      <p:nvGrpSpPr>
+        <p:cNvPr id="1" name=""/>
+        <p:cNvGrpSpPr/>
+        <p:nvPr/>
+      </p:nvGrpSpPr>
+      <p:grpSpPr>
+        <a:xfrm>
+          <a:off x="0" y="0"/>
+          <a:ext cx="0" cy="0"/>
+          <a:chOff x="0" y="0"/>
+          <a:chExt cx="0" cy="0"/>
+        </a:xfrm>
+      </p:grpSpPr>
+      <p:sp>
+        <p:nvSpPr>
+          <p:cNvPr id="2" name="Slide Image Placeholder 1"/>
+          <p:cNvSpPr>
+            <a:spLocks noGrp="1" noRot="1" noChangeAspect="1"/>
+          </p:cNvSpPr>
+          <p:nvPr>
+            <p:ph type="sldImg"/>
+          </p:nvPr>
+        </p:nvSpPr>
+        <p:spPr/>
+      </p:sp>
+      <p:sp>
+        <p:nvSpPr>
+          <p:cNvPr id="3" name="Notes Placeholder 2"/>
+          <p:cNvSpPr>
+            <a:spLocks noGrp="1"/>
+          </p:cNvSpPr>
+          <p:nvPr>
+            <p:ph type="body" idx="1"/>
+          </p:nvPr>
+        </p:nvSpPr>
+        <p:spPr/>
+        <p:txBody>
+          <a:bodyPr>
+            <a:normAutofit/>
+          </a:bodyPr>
+          <a:lstStyle/>
+          <a:p>
+            <a:endParaRPr lang="en-US" dirty="0"/>
+          </a:p>
+        </p:txBody>
+      </p:sp>
+      <p:sp>
+        <p:nvSpPr>
+          <p:cNvPr id="4" name="Slide Number Placeholder 3"/>
+          <p:cNvSpPr>
+            <a:spLocks noGrp="1"/>
+          </p:cNvSpPr>
+          <p:nvPr>
+            <p:ph type="sldNum" sz="quarter" idx="10"/>
+          </p:nvPr>
+        </p:nvSpPr>
+        <p:spPr/>
+        <p:txBody>
+          <a:bodyPr/>
+          <a:lstStyle/>
+          <a:p>
+            <a:pPr>
+              <a:defRPr/>
+            </a:pPr>
+            <a:fld id="{1931C8FD-CC35-423B-99F4-64D81D6A80AE}" type="slidenum">
+              <a:rPr lang="en-US" smtClean="0"/>
+              <a:pPr>
+                <a:defRPr/>
+              </a:pPr>
+              <a:t>16</a:t>
+            </a:fld>
+            <a:endParaRPr lang="en-US"/>
+          </a:p>
+        </p:txBody>
+      </p:sp>
+    </p:spTree>
+  </p:cSld>
+  <p:clrMapOvr>
+    <a:masterClrMapping/>
+  </p:clrMapOvr>
+</p:notes>
+</file>
+
 <file path=ppt/notesSlides/notesSlide2.xml><?xml version="1.0" encoding="utf-8"?>
 <p:notes xmlns:a="http://schemas.openxmlformats.org/drawingml/2006/main" xmlns:r="http://schemas.openxmlformats.org/officeDocument/2006/relationships" xmlns:p="http://schemas.openxmlformats.org/presentationml/2006/main">
   <p:cSld>
@@ -1602,7 +1690,7 @@
               <a:pPr>
                 <a:defRPr/>
               </a:pPr>
-              <a:t>6</a:t>
+              <a:t>5</a:t>
             </a:fld>
             <a:endParaRPr lang="en-US"/>
           </a:p>
@@ -3287,50 +3375,76 @@
           <a:p>
             <a:r>
               <a:rPr lang="en-US" b="1" dirty="0" smtClean="0"/>
-              <a:t>Observer </a:t>
+              <a:t>Strategy </a:t>
             </a:r>
             <a:r>
               <a:rPr lang="en-US" dirty="0" smtClean="0"/>
-              <a:t>– Publisher Subscriber System</a:t>
+              <a:t>– Client chooses  concrete implementation</a:t>
             </a:r>
           </a:p>
           <a:p>
             <a:r>
               <a:rPr lang="en-US" b="1" dirty="0" smtClean="0"/>
-              <a:t>Visitor </a:t>
+              <a:t>State </a:t>
             </a:r>
             <a:r>
               <a:rPr lang="en-US" dirty="0" smtClean="0"/>
-              <a:t>– Defines and performs new operations on all elements of an existing structure</a:t>
+              <a:t>– Context changes from state to state</a:t>
             </a:r>
           </a:p>
           <a:p>
             <a:r>
               <a:rPr lang="en-US" b="1" dirty="0" smtClean="0"/>
-              <a:t>Interpreter </a:t>
+              <a:t>Template Method </a:t>
             </a:r>
             <a:r>
               <a:rPr lang="en-US" dirty="0" smtClean="0"/>
-              <a:t>– ?</a:t>
+              <a:t>– Template algorithm with certain steps to be handled elsewhere</a:t>
             </a:r>
           </a:p>
           <a:p>
             <a:r>
               <a:rPr lang="en-US" b="1" dirty="0" smtClean="0"/>
-              <a:t>Memento </a:t>
+              <a:t>Chain of Responsibility </a:t>
             </a:r>
             <a:r>
               <a:rPr lang="en-US" dirty="0" smtClean="0"/>
-              <a:t>– Captures the state of an object’s internal state and saves externally</a:t>
-            </a:r>
-          </a:p>
-          <a:p>
-            <a:endParaRPr lang="en-US" dirty="0" smtClean="0"/>
-          </a:p>
-          <a:p>
-            <a:pPr>
-              <a:buNone/>
-            </a:pPr>
+              <a:t>– List of handler objects and handling stops at first successful handling</a:t>
+            </a:r>
+          </a:p>
+          <a:p>
+            <a:r>
+              <a:rPr lang="en-US" b="1" dirty="0" err="1" smtClean="0"/>
+              <a:t>Iterator</a:t>
+            </a:r>
+            <a:r>
+              <a:rPr lang="en-US" b="1" dirty="0" smtClean="0"/>
+              <a:t> </a:t>
+            </a:r>
+            <a:r>
+              <a:rPr lang="en-US" dirty="0" smtClean="0"/>
+              <a:t>– </a:t>
+            </a:r>
+            <a:r>
+              <a:rPr lang="en-US" dirty="0" err="1" smtClean="0"/>
+              <a:t>foreach</a:t>
+            </a:r>
+            <a:r>
+              <a:rPr lang="en-US" dirty="0" smtClean="0"/>
+              <a:t> case closed</a:t>
+            </a:r>
+          </a:p>
+          <a:p>
+            <a:r>
+              <a:rPr lang="en-US" b="1" dirty="0" smtClean="0"/>
+              <a:t>Mediator </a:t>
+            </a:r>
+            <a:r>
+              <a:rPr lang="en-US" dirty="0" smtClean="0"/>
+              <a:t>– enables communications of objects without those objects knowing each other</a:t>
+            </a:r>
+          </a:p>
+          <a:p>
             <a:endParaRPr lang="en-US" dirty="0" smtClean="0"/>
           </a:p>
         </p:txBody>
@@ -3351,6 +3465,185 @@
 </file>
 
 <file path=ppt/slides/slide11.xml><?xml version="1.0" encoding="utf-8"?>
+<p:sld xmlns:a="http://schemas.openxmlformats.org/drawingml/2006/main" xmlns:r="http://schemas.openxmlformats.org/officeDocument/2006/relationships" xmlns:p="http://schemas.openxmlformats.org/presentationml/2006/main">
+  <p:cSld>
+    <p:spTree>
+      <p:nvGrpSpPr>
+        <p:cNvPr id="1" name=""/>
+        <p:cNvGrpSpPr/>
+        <p:nvPr/>
+      </p:nvGrpSpPr>
+      <p:grpSpPr>
+        <a:xfrm>
+          <a:off x="0" y="0"/>
+          <a:ext cx="0" cy="0"/>
+          <a:chOff x="0" y="0"/>
+          <a:chExt cx="0" cy="0"/>
+        </a:xfrm>
+      </p:grpSpPr>
+      <p:sp>
+        <p:nvSpPr>
+          <p:cNvPr id="3074" name="Title 1"/>
+          <p:cNvSpPr>
+            <a:spLocks noGrp="1"/>
+          </p:cNvSpPr>
+          <p:nvPr>
+            <p:ph type="title"/>
+          </p:nvPr>
+        </p:nvSpPr>
+        <p:spPr bwMode="auto">
+          <a:noFill/>
+          <a:ln>
+            <a:miter lim="800000"/>
+            <a:headEnd/>
+            <a:tailEnd/>
+          </a:ln>
+        </p:spPr>
+        <p:txBody>
+          <a:bodyPr vert="horz" wrap="square" lIns="91440" tIns="45720" rIns="91440" bIns="45720" numCol="1" anchor="t" anchorCtr="0" compatLnSpc="1">
+            <a:prstTxWarp prst="textNoShape">
+              <a:avLst/>
+            </a:prstTxWarp>
+          </a:bodyPr>
+          <a:lstStyle/>
+          <a:p>
+            <a:pPr eaLnBrk="1" hangingPunct="1"/>
+            <a:r>
+              <a:rPr lang="en-US" dirty="0" smtClean="0"/>
+              <a:t>Behavioral Patterns</a:t>
+            </a:r>
+          </a:p>
+        </p:txBody>
+      </p:sp>
+      <p:sp>
+        <p:nvSpPr>
+          <p:cNvPr id="4" name="Rectangle 3"/>
+          <p:cNvSpPr/>
+          <p:nvPr/>
+        </p:nvSpPr>
+        <p:spPr>
+          <a:xfrm>
+            <a:off x="2514600" y="6553200"/>
+            <a:ext cx="4114800" cy="228600"/>
+          </a:xfrm>
+          <a:prstGeom prst="rect">
+            <a:avLst/>
+          </a:prstGeom>
+          <a:solidFill>
+            <a:schemeClr val="bg1"/>
+          </a:solidFill>
+          <a:ln>
+            <a:solidFill>
+              <a:schemeClr val="bg1"/>
+            </a:solidFill>
+          </a:ln>
+        </p:spPr>
+        <p:style>
+          <a:lnRef idx="2">
+            <a:schemeClr val="accent1">
+              <a:shade val="50000"/>
+            </a:schemeClr>
+          </a:lnRef>
+          <a:fillRef idx="1">
+            <a:schemeClr val="accent1"/>
+          </a:fillRef>
+          <a:effectRef idx="0">
+            <a:schemeClr val="accent1"/>
+          </a:effectRef>
+          <a:fontRef idx="minor">
+            <a:schemeClr val="lt1"/>
+          </a:fontRef>
+        </p:style>
+        <p:txBody>
+          <a:bodyPr rtlCol="0" anchor="ctr"/>
+          <a:lstStyle/>
+          <a:p>
+            <a:pPr algn="ctr"/>
+            <a:endParaRPr lang="en-US"/>
+          </a:p>
+        </p:txBody>
+      </p:sp>
+      <p:sp>
+        <p:nvSpPr>
+          <p:cNvPr id="13" name="Text Placeholder 12"/>
+          <p:cNvSpPr>
+            <a:spLocks noGrp="1"/>
+          </p:cNvSpPr>
+          <p:nvPr>
+            <p:ph type="body" sz="quarter" idx="10"/>
+          </p:nvPr>
+        </p:nvSpPr>
+        <p:spPr/>
+        <p:txBody>
+          <a:bodyPr/>
+          <a:lstStyle/>
+          <a:p>
+            <a:r>
+              <a:rPr lang="en-US" b="1" dirty="0" smtClean="0"/>
+              <a:t>Observer </a:t>
+            </a:r>
+            <a:r>
+              <a:rPr lang="en-US" dirty="0" smtClean="0"/>
+              <a:t>– Publisher Subscriber System</a:t>
+            </a:r>
+          </a:p>
+          <a:p>
+            <a:r>
+              <a:rPr lang="en-US" b="1" dirty="0" smtClean="0"/>
+              <a:t>Visitor </a:t>
+            </a:r>
+            <a:r>
+              <a:rPr lang="en-US" dirty="0" smtClean="0"/>
+              <a:t>– Defines and performs new operations on all elements of an existing structure</a:t>
+            </a:r>
+          </a:p>
+          <a:p>
+            <a:r>
+              <a:rPr lang="en-US" b="1" dirty="0" smtClean="0"/>
+              <a:t>Interpreter </a:t>
+            </a:r>
+            <a:r>
+              <a:rPr lang="en-US" dirty="0" smtClean="0"/>
+              <a:t>– ?</a:t>
+            </a:r>
+          </a:p>
+          <a:p>
+            <a:r>
+              <a:rPr lang="en-US" b="1" dirty="0" smtClean="0"/>
+              <a:t>Memento </a:t>
+            </a:r>
+            <a:r>
+              <a:rPr lang="en-US" dirty="0" smtClean="0"/>
+              <a:t>– Captures the state of an object’s internal state and saves externally</a:t>
+            </a:r>
+          </a:p>
+          <a:p>
+            <a:endParaRPr lang="en-US" dirty="0" smtClean="0"/>
+          </a:p>
+          <a:p>
+            <a:pPr>
+              <a:buNone/>
+            </a:pPr>
+            <a:endParaRPr lang="en-US" dirty="0" smtClean="0"/>
+          </a:p>
+        </p:txBody>
+      </p:sp>
+    </p:spTree>
+  </p:cSld>
+  <p:clrMapOvr>
+    <a:masterClrMapping/>
+  </p:clrMapOvr>
+  <p:timing>
+    <p:tnLst>
+      <p:par>
+        <p:cTn id="1" dur="indefinite" restart="never" nodeType="tmRoot"/>
+      </p:par>
+    </p:tnLst>
+  </p:timing>
+</p:sld>
+</file>
+
+<file path=ppt/slides/slide12.xml><?xml version="1.0" encoding="utf-8"?>
 <p:sld xmlns:a="http://schemas.openxmlformats.org/drawingml/2006/main" xmlns:r="http://schemas.openxmlformats.org/officeDocument/2006/relationships" xmlns:p="http://schemas.openxmlformats.org/presentationml/2006/main">
   <p:cSld>
     <p:spTree>
@@ -3535,7 +3828,7 @@
 </p:sld>
 </file>
 
-<file path=ppt/slides/slide12.xml><?xml version="1.0" encoding="utf-8"?>
+<file path=ppt/slides/slide13.xml><?xml version="1.0" encoding="utf-8"?>
 <p:sld xmlns:a="http://schemas.openxmlformats.org/drawingml/2006/main" xmlns:r="http://schemas.openxmlformats.org/officeDocument/2006/relationships" xmlns:p="http://schemas.openxmlformats.org/presentationml/2006/main">
   <p:cSld>
     <p:spTree>
@@ -3706,7 +3999,7 @@
 </p:sld>
 </file>
 
-<file path=ppt/slides/slide13.xml><?xml version="1.0" encoding="utf-8"?>
+<file path=ppt/slides/slide14.xml><?xml version="1.0" encoding="utf-8"?>
 <p:sld xmlns:a="http://schemas.openxmlformats.org/drawingml/2006/main" xmlns:r="http://schemas.openxmlformats.org/officeDocument/2006/relationships" xmlns:p="http://schemas.openxmlformats.org/presentationml/2006/main">
   <p:cSld>
     <p:spTree>
@@ -3887,7 +4180,7 @@
 </p:sld>
 </file>
 
-<file path=ppt/slides/slide14.xml><?xml version="1.0" encoding="utf-8"?>
+<file path=ppt/slides/slide15.xml><?xml version="1.0" encoding="utf-8"?>
 <p:sld xmlns:a="http://schemas.openxmlformats.org/drawingml/2006/main" xmlns:r="http://schemas.openxmlformats.org/officeDocument/2006/relationships" xmlns:p="http://schemas.openxmlformats.org/presentationml/2006/main">
   <p:cSld>
     <p:spTree>
@@ -4079,7 +4372,7 @@
 </p:sld>
 </file>
 
-<file path=ppt/slides/slide15.xml><?xml version="1.0" encoding="utf-8"?>
+<file path=ppt/slides/slide16.xml><?xml version="1.0" encoding="utf-8"?>
 <p:sld xmlns:a="http://schemas.openxmlformats.org/drawingml/2006/main" xmlns:r="http://schemas.openxmlformats.org/officeDocument/2006/relationships" xmlns:p="http://schemas.openxmlformats.org/presentationml/2006/main">
   <p:cSld>
     <p:spTree>
@@ -4272,7 +4565,7 @@
 </p:sld>
 </file>
 
-<file path=ppt/slides/slide16.xml><?xml version="1.0" encoding="utf-8"?>
+<file path=ppt/slides/slide17.xml><?xml version="1.0" encoding="utf-8"?>
 <p:sld xmlns:a="http://schemas.openxmlformats.org/drawingml/2006/main" xmlns:r="http://schemas.openxmlformats.org/officeDocument/2006/relationships" xmlns:p="http://schemas.openxmlformats.org/presentationml/2006/main">
   <p:cSld>
     <p:spTree>
@@ -5837,7 +6130,23 @@
             <a:pPr eaLnBrk="1" hangingPunct="1"/>
             <a:r>
               <a:rPr lang="en-US" b="1" dirty="0" smtClean="0"/>
-              <a:t>What design patterns are</a:t>
+              <a:t>Briefly Discuss </a:t>
+            </a:r>
+            <a:r>
+              <a:rPr lang="en-US" b="1" dirty="0" err="1" smtClean="0"/>
+              <a:t>Git</a:t>
+            </a:r>
+            <a:endParaRPr lang="en-US" b="1" dirty="0" smtClean="0"/>
+          </a:p>
+          <a:p>
+            <a:pPr eaLnBrk="1" hangingPunct="1"/>
+            <a:r>
+              <a:rPr lang="en-US" b="1" dirty="0" smtClean="0"/>
+              <a:t>What </a:t>
+            </a:r>
+            <a:r>
+              <a:rPr lang="en-US" b="1" dirty="0" smtClean="0"/>
+              <a:t>design patterns are</a:t>
             </a:r>
           </a:p>
           <a:p>
@@ -5873,11 +6182,7 @@
             <a:pPr eaLnBrk="1" hangingPunct="1"/>
             <a:r>
               <a:rPr lang="en-US" b="1" dirty="0" smtClean="0"/>
-              <a:t>Gather Interest on a part 2 of </a:t>
-            </a:r>
-            <a:r>
-              <a:rPr lang="en-US" b="1" smtClean="0"/>
-              <a:t>design patterns</a:t>
+              <a:t>Gather Interest on a part 2 of design patterns</a:t>
             </a:r>
           </a:p>
           <a:p>
@@ -6707,6 +7012,109 @@
                       </p:childTnLst>
                     </p:cTn>
                   </p:par>
+                  <p:par>
+                    <p:cTn id="45" fill="hold">
+                      <p:stCondLst>
+                        <p:cond delay="indefinite"/>
+                      </p:stCondLst>
+                      <p:childTnLst>
+                        <p:par>
+                          <p:cTn id="46" fill="hold">
+                            <p:stCondLst>
+                              <p:cond delay="0"/>
+                            </p:stCondLst>
+                            <p:childTnLst>
+                              <p:par>
+                                <p:cTn id="47" presetID="2" presetClass="entr" presetSubtype="4" fill="hold" nodeType="clickEffect">
+                                  <p:stCondLst>
+                                    <p:cond delay="0"/>
+                                  </p:stCondLst>
+                                  <p:childTnLst>
+                                    <p:set>
+                                      <p:cBhvr>
+                                        <p:cTn id="48" dur="1" fill="hold">
+                                          <p:stCondLst>
+                                            <p:cond delay="0"/>
+                                          </p:stCondLst>
+                                        </p:cTn>
+                                        <p:tgtEl>
+                                          <p:spTgt spid="3075">
+                                            <p:txEl>
+                                              <p:pRg st="7" end="7"/>
+                                            </p:txEl>
+                                          </p:spTgt>
+                                        </p:tgtEl>
+                                        <p:attrNameLst>
+                                          <p:attrName>style.visibility</p:attrName>
+                                        </p:attrNameLst>
+                                      </p:cBhvr>
+                                      <p:to>
+                                        <p:strVal val="visible"/>
+                                      </p:to>
+                                    </p:set>
+                                    <p:anim calcmode="lin" valueType="num">
+                                      <p:cBhvr additive="base">
+                                        <p:cTn id="49" dur="500" fill="hold"/>
+                                        <p:tgtEl>
+                                          <p:spTgt spid="3075">
+                                            <p:txEl>
+                                              <p:pRg st="7" end="7"/>
+                                            </p:txEl>
+                                          </p:spTgt>
+                                        </p:tgtEl>
+                                        <p:attrNameLst>
+                                          <p:attrName>ppt_x</p:attrName>
+                                        </p:attrNameLst>
+                                      </p:cBhvr>
+                                      <p:tavLst>
+                                        <p:tav tm="0">
+                                          <p:val>
+                                            <p:strVal val="#ppt_x"/>
+                                          </p:val>
+                                        </p:tav>
+                                        <p:tav tm="100000">
+                                          <p:val>
+                                            <p:strVal val="#ppt_x"/>
+                                          </p:val>
+                                        </p:tav>
+                                      </p:tavLst>
+                                    </p:anim>
+                                    <p:anim calcmode="lin" valueType="num">
+                                      <p:cBhvr additive="base">
+                                        <p:cTn id="50" dur="500" fill="hold"/>
+                                        <p:tgtEl>
+                                          <p:spTgt spid="3075">
+                                            <p:txEl>
+                                              <p:pRg st="7" end="7"/>
+                                            </p:txEl>
+                                          </p:spTgt>
+                                        </p:tgtEl>
+                                        <p:attrNameLst>
+                                          <p:attrName>ppt_y</p:attrName>
+                                        </p:attrNameLst>
+                                      </p:cBhvr>
+                                      <p:tavLst>
+                                        <p:tav tm="0">
+                                          <p:val>
+                                            <p:strVal val="1+#ppt_h/2"/>
+                                          </p:val>
+                                        </p:tav>
+                                        <p:tav tm="100000">
+                                          <p:val>
+                                            <p:strVal val="#ppt_y"/>
+                                          </p:val>
+                                        </p:tav>
+                                      </p:tavLst>
+                                    </p:anim>
+                                  </p:childTnLst>
+                                </p:cTn>
+                              </p:par>
+                            </p:childTnLst>
+                          </p:cTn>
+                        </p:par>
+                      </p:childTnLst>
+                    </p:cTn>
+                  </p:par>
                 </p:childTnLst>
               </p:cTn>
               <p:prevCondLst>
@@ -6777,8 +7185,12 @@
           <a:p>
             <a:pPr eaLnBrk="1" hangingPunct="1"/>
             <a:r>
+              <a:rPr lang="en-US" dirty="0" err="1" smtClean="0"/>
+              <a:t>Git</a:t>
+            </a:r>
+            <a:r>
               <a:rPr lang="en-US" dirty="0" smtClean="0"/>
-              <a:t>Philosophy and Beginnings	</a:t>
+              <a:t>	</a:t>
             </a:r>
           </a:p>
         </p:txBody>
@@ -6809,7 +7221,7 @@
             </a:pPr>
             <a:r>
               <a:rPr lang="en-US" dirty="0" smtClean="0"/>
-              <a:t>We are talking about software. Right?</a:t>
+              <a:t>Github.com</a:t>
             </a:r>
           </a:p>
           <a:p>
@@ -6818,9 +7230,22 @@
               <a:buAutoNum type="arabicPeriod"/>
             </a:pPr>
             <a:r>
+              <a:rPr lang="en-US" dirty="0" err="1" smtClean="0"/>
+              <a:t>git</a:t>
+            </a:r>
+            <a:r>
               <a:rPr lang="en-US" dirty="0" smtClean="0"/>
-              <a:t>Reusable solution to a commonly occurring problem within a given context</a:t>
-            </a:r>
+              <a:t> clone &lt;clone </a:t>
+            </a:r>
+            <a:r>
+              <a:rPr lang="en-US" dirty="0" err="1" smtClean="0"/>
+              <a:t>url</a:t>
+            </a:r>
+            <a:r>
+              <a:rPr lang="en-US" dirty="0" smtClean="0"/>
+              <a:t>&gt;</a:t>
+            </a:r>
+            <a:endParaRPr lang="en-US" dirty="0" smtClean="0"/>
           </a:p>
           <a:p>
             <a:pPr marL="457200" indent="-457200">
@@ -6828,19 +7253,54 @@
               <a:buAutoNum type="arabicPeriod"/>
             </a:pPr>
             <a:r>
+              <a:rPr lang="en-US" dirty="0" err="1" smtClean="0"/>
+              <a:t>git</a:t>
+            </a:r>
+            <a:r>
               <a:rPr lang="en-US" dirty="0" smtClean="0"/>
-              <a:t>Christopher Alexander (1977/79)</a:t>
-            </a:r>
+              <a:t> add .</a:t>
+            </a:r>
+            <a:endParaRPr lang="en-US" dirty="0" smtClean="0"/>
+          </a:p>
+          <a:p>
+            <a:pPr marL="457200" indent="-457200">
+              <a:buFont typeface="+mj-lt"/>
+              <a:buAutoNum type="arabicPeriod"/>
+            </a:pPr>
+            <a:r>
+              <a:rPr lang="en-US" dirty="0" err="1" smtClean="0"/>
+              <a:t>g</a:t>
+            </a:r>
+            <a:r>
+              <a:rPr lang="en-US" dirty="0" err="1" smtClean="0"/>
+              <a:t>it</a:t>
+            </a:r>
+            <a:r>
+              <a:rPr lang="en-US" dirty="0" smtClean="0"/>
+              <a:t> commit –am “insert your comment here”</a:t>
+            </a:r>
+            <a:endParaRPr lang="en-US" dirty="0" smtClean="0"/>
           </a:p>
           <a:p>
             <a:pPr marL="457200" indent="-457200">
               <a:buNone/>
             </a:pPr>
             <a:r>
-              <a:rPr lang="en-US" b="1" i="1" dirty="0" smtClean="0"/>
-              <a:t>          A Pattern Language: Towns, Buildings, Construction</a:t>
-            </a:r>
-            <a:endParaRPr lang="en-US" dirty="0" smtClean="0"/>
+              <a:rPr lang="en-US" dirty="0" smtClean="0"/>
+              <a:t>5. 	</a:t>
+            </a:r>
+            <a:r>
+              <a:rPr lang="en-US" dirty="0" err="1" smtClean="0"/>
+              <a:t>g</a:t>
+            </a:r>
+            <a:r>
+              <a:rPr lang="en-US" dirty="0" err="1" smtClean="0"/>
+              <a:t>it</a:t>
+            </a:r>
+            <a:r>
+              <a:rPr lang="en-US" dirty="0" smtClean="0"/>
+              <a:t> push</a:t>
+            </a:r>
           </a:p>
           <a:p>
             <a:pPr marL="457200" indent="-457200">
@@ -6848,33 +7308,71 @@
             </a:pPr>
             <a:r>
               <a:rPr lang="en-US" dirty="0" smtClean="0"/>
-              <a:t>4. 	Form a common language</a:t>
-            </a:r>
+              <a:t>6.	</a:t>
+            </a:r>
+            <a:r>
+              <a:rPr lang="en-US" dirty="0" err="1" smtClean="0"/>
+              <a:t>gitk</a:t>
+            </a:r>
+            <a:endParaRPr lang="en-US" dirty="0" smtClean="0"/>
+          </a:p>
+          <a:p>
+            <a:pPr marL="457200" indent="-457200">
+              <a:buAutoNum type="arabicPeriod" startAt="7"/>
+            </a:pPr>
+            <a:r>
+              <a:rPr lang="en-US" dirty="0" smtClean="0"/>
+              <a:t>Other option is to use </a:t>
+            </a:r>
+            <a:r>
+              <a:rPr lang="en-US" dirty="0" smtClean="0">
+                <a:hlinkClick r:id="rId3"/>
+              </a:rPr>
+              <a:t>http://matdevsvt22/</a:t>
+            </a:r>
+            <a:endParaRPr lang="en-US" dirty="0" smtClean="0"/>
+          </a:p>
+          <a:p>
+            <a:pPr marL="457200" indent="-457200">
+              <a:buAutoNum type="arabicPeriod" startAt="7"/>
+            </a:pPr>
+            <a:r>
+              <a:rPr lang="en-US" smtClean="0">
+                <a:hlinkClick r:id="rId4"/>
+              </a:rPr>
+              <a:t>https</a:t>
+            </a:r>
+            <a:r>
+              <a:rPr lang="en-US" smtClean="0">
+                <a:hlinkClick r:id="rId4"/>
+              </a:rPr>
+              <a:t>://</a:t>
+            </a:r>
+            <a:r>
+              <a:rPr lang="en-US" smtClean="0">
+                <a:hlinkClick r:id="rId4"/>
+              </a:rPr>
+              <a:t>fernandozamoraj@github.com/fernandozamoraj/design-patterns-presentation.git</a:t>
+            </a:r>
+            <a:endParaRPr lang="en-US" smtClean="0"/>
           </a:p>
           <a:p>
             <a:pPr marL="457200" indent="-457200">
               <a:buNone/>
             </a:pPr>
-            <a:r>
-              <a:rPr lang="en-US" dirty="0" smtClean="0"/>
-              <a:t>5. 	</a:t>
-            </a:r>
-            <a:r>
-              <a:rPr lang="en-US" dirty="0" err="1" smtClean="0"/>
-              <a:t>GoF</a:t>
-            </a:r>
-            <a:r>
-              <a:rPr lang="en-US" dirty="0" smtClean="0"/>
-              <a:t> – </a:t>
-            </a:r>
-            <a:r>
-              <a:rPr lang="en-US" b="1" i="1" dirty="0" smtClean="0"/>
-              <a:t>DESIGN PATTERNS Elements of Reusable Object Oriented Software Gamma, et al. </a:t>
-            </a:r>
-            <a:r>
-              <a:rPr lang="en-US" dirty="0" smtClean="0"/>
-              <a:t>(1995)</a:t>
-            </a:r>
+            <a:endParaRPr lang="en-US" dirty="0" smtClean="0"/>
+          </a:p>
+          <a:p>
+            <a:pPr marL="457200" indent="-457200">
+              <a:buAutoNum type="arabicPeriod" startAt="5"/>
+            </a:pPr>
+            <a:endParaRPr lang="en-US" dirty="0" smtClean="0"/>
+          </a:p>
+          <a:p>
+            <a:pPr marL="457200" indent="-457200">
+              <a:buNone/>
+            </a:pPr>
+            <a:endParaRPr lang="en-US" dirty="0" smtClean="0"/>
           </a:p>
           <a:p>
             <a:pPr marL="457200" indent="-457200">
@@ -7682,6 +8180,212 @@
                       </p:childTnLst>
                     </p:cTn>
                   </p:par>
+                  <p:par>
+                    <p:cTn id="45" fill="hold">
+                      <p:stCondLst>
+                        <p:cond delay="indefinite"/>
+                      </p:stCondLst>
+                      <p:childTnLst>
+                        <p:par>
+                          <p:cTn id="46" fill="hold">
+                            <p:stCondLst>
+                              <p:cond delay="0"/>
+                            </p:stCondLst>
+                            <p:childTnLst>
+                              <p:par>
+                                <p:cTn id="47" presetID="2" presetClass="entr" presetSubtype="4" fill="hold" nodeType="clickEffect">
+                                  <p:stCondLst>
+                                    <p:cond delay="0"/>
+                                  </p:stCondLst>
+                                  <p:childTnLst>
+                                    <p:set>
+                                      <p:cBhvr>
+                                        <p:cTn id="48" dur="1" fill="hold">
+                                          <p:stCondLst>
+                                            <p:cond delay="0"/>
+                                          </p:stCondLst>
+                                        </p:cTn>
+                                        <p:tgtEl>
+                                          <p:spTgt spid="3075">
+                                            <p:txEl>
+                                              <p:pRg st="7" end="7"/>
+                                            </p:txEl>
+                                          </p:spTgt>
+                                        </p:tgtEl>
+                                        <p:attrNameLst>
+                                          <p:attrName>style.visibility</p:attrName>
+                                        </p:attrNameLst>
+                                      </p:cBhvr>
+                                      <p:to>
+                                        <p:strVal val="visible"/>
+                                      </p:to>
+                                    </p:set>
+                                    <p:anim calcmode="lin" valueType="num">
+                                      <p:cBhvr additive="base">
+                                        <p:cTn id="49" dur="500" fill="hold"/>
+                                        <p:tgtEl>
+                                          <p:spTgt spid="3075">
+                                            <p:txEl>
+                                              <p:pRg st="7" end="7"/>
+                                            </p:txEl>
+                                          </p:spTgt>
+                                        </p:tgtEl>
+                                        <p:attrNameLst>
+                                          <p:attrName>ppt_x</p:attrName>
+                                        </p:attrNameLst>
+                                      </p:cBhvr>
+                                      <p:tavLst>
+                                        <p:tav tm="0">
+                                          <p:val>
+                                            <p:strVal val="#ppt_x"/>
+                                          </p:val>
+                                        </p:tav>
+                                        <p:tav tm="100000">
+                                          <p:val>
+                                            <p:strVal val="#ppt_x"/>
+                                          </p:val>
+                                        </p:tav>
+                                      </p:tavLst>
+                                    </p:anim>
+                                    <p:anim calcmode="lin" valueType="num">
+                                      <p:cBhvr additive="base">
+                                        <p:cTn id="50" dur="500" fill="hold"/>
+                                        <p:tgtEl>
+                                          <p:spTgt spid="3075">
+                                            <p:txEl>
+                                              <p:pRg st="7" end="7"/>
+                                            </p:txEl>
+                                          </p:spTgt>
+                                        </p:tgtEl>
+                                        <p:attrNameLst>
+                                          <p:attrName>ppt_y</p:attrName>
+                                        </p:attrNameLst>
+                                      </p:cBhvr>
+                                      <p:tavLst>
+                                        <p:tav tm="0">
+                                          <p:val>
+                                            <p:strVal val="1+#ppt_h/2"/>
+                                          </p:val>
+                                        </p:tav>
+                                        <p:tav tm="100000">
+                                          <p:val>
+                                            <p:strVal val="#ppt_y"/>
+                                          </p:val>
+                                        </p:tav>
+                                      </p:tavLst>
+                                    </p:anim>
+                                  </p:childTnLst>
+                                </p:cTn>
+                              </p:par>
+                            </p:childTnLst>
+                          </p:cTn>
+                        </p:par>
+                      </p:childTnLst>
+                    </p:cTn>
+                  </p:par>
+                  <p:par>
+                    <p:cTn id="51" fill="hold">
+                      <p:stCondLst>
+                        <p:cond delay="indefinite"/>
+                      </p:stCondLst>
+                      <p:childTnLst>
+                        <p:par>
+                          <p:cTn id="52" fill="hold">
+                            <p:stCondLst>
+                              <p:cond delay="0"/>
+                            </p:stCondLst>
+                            <p:childTnLst>
+                              <p:par>
+                                <p:cTn id="53" presetID="2" presetClass="entr" presetSubtype="4" fill="hold" nodeType="clickEffect">
+                                  <p:stCondLst>
+                                    <p:cond delay="0"/>
+                                  </p:stCondLst>
+                                  <p:childTnLst>
+                                    <p:set>
+                                      <p:cBhvr>
+                                        <p:cTn id="54" dur="1" fill="hold">
+                                          <p:stCondLst>
+                                            <p:cond delay="0"/>
+                                          </p:stCondLst>
+                                        </p:cTn>
+                                        <p:tgtEl>
+                                          <p:spTgt spid="3075">
+                                            <p:txEl>
+                                              <p:pRg st="11" end="11"/>
+                                            </p:txEl>
+                                          </p:spTgt>
+                                        </p:tgtEl>
+                                        <p:attrNameLst>
+                                          <p:attrName>style.visibility</p:attrName>
+                                        </p:attrNameLst>
+                                      </p:cBhvr>
+                                      <p:to>
+                                        <p:strVal val="visible"/>
+                                      </p:to>
+                                    </p:set>
+                                    <p:anim calcmode="lin" valueType="num">
+                                      <p:cBhvr additive="base">
+                                        <p:cTn id="55" dur="500" fill="hold"/>
+                                        <p:tgtEl>
+                                          <p:spTgt spid="3075">
+                                            <p:txEl>
+                                              <p:pRg st="11" end="11"/>
+                                            </p:txEl>
+                                          </p:spTgt>
+                                        </p:tgtEl>
+                                        <p:attrNameLst>
+                                          <p:attrName>ppt_x</p:attrName>
+                                        </p:attrNameLst>
+                                      </p:cBhvr>
+                                      <p:tavLst>
+                                        <p:tav tm="0">
+                                          <p:val>
+                                            <p:strVal val="#ppt_x"/>
+                                          </p:val>
+                                        </p:tav>
+                                        <p:tav tm="100000">
+                                          <p:val>
+                                            <p:strVal val="#ppt_x"/>
+                                          </p:val>
+                                        </p:tav>
+                                      </p:tavLst>
+                                    </p:anim>
+                                    <p:anim calcmode="lin" valueType="num">
+                                      <p:cBhvr additive="base">
+                                        <p:cTn id="56" dur="500" fill="hold"/>
+                                        <p:tgtEl>
+                                          <p:spTgt spid="3075">
+                                            <p:txEl>
+                                              <p:pRg st="11" end="11"/>
+                                            </p:txEl>
+                                          </p:spTgt>
+                                        </p:tgtEl>
+                                        <p:attrNameLst>
+                                          <p:attrName>ppt_y</p:attrName>
+                                        </p:attrNameLst>
+                                      </p:cBhvr>
+                                      <p:tavLst>
+                                        <p:tav tm="0">
+                                          <p:val>
+                                            <p:strVal val="1+#ppt_h/2"/>
+                                          </p:val>
+                                        </p:tav>
+                                        <p:tav tm="100000">
+                                          <p:val>
+                                            <p:strVal val="#ppt_y"/>
+                                          </p:val>
+                                        </p:tav>
+                                      </p:tavLst>
+                                    </p:anim>
+                                  </p:childTnLst>
+                                </p:cTn>
+                              </p:par>
+                            </p:childTnLst>
+                          </p:cTn>
+                        </p:par>
+                      </p:childTnLst>
+                    </p:cTn>
+                  </p:par>
                 </p:childTnLst>
               </p:cTn>
               <p:prevCondLst>
@@ -7753,7 +8457,7 @@
             <a:pPr eaLnBrk="1" hangingPunct="1"/>
             <a:r>
               <a:rPr lang="en-US" dirty="0" smtClean="0"/>
-              <a:t>Design Pattern Categories</a:t>
+              <a:t>Philosophy and Beginnings	</a:t>
             </a:r>
           </a:p>
         </p:txBody>
@@ -7770,8 +8474,8 @@
         </p:nvSpPr>
         <p:spPr>
           <a:xfrm>
-            <a:off x="381000" y="1295400"/>
-            <a:ext cx="8686800" cy="3886200"/>
+            <a:off x="685800" y="1143000"/>
+            <a:ext cx="8229600" cy="4800600"/>
           </a:xfrm>
         </p:spPr>
         <p:txBody>
@@ -7783,16 +8487,8 @@
               <a:buAutoNum type="arabicPeriod"/>
             </a:pPr>
             <a:r>
-              <a:rPr lang="en-US" sz="2000" dirty="0" smtClean="0"/>
-              <a:t>23 Patterns in </a:t>
-            </a:r>
-            <a:r>
-              <a:rPr lang="en-US" sz="2000" dirty="0" err="1" smtClean="0"/>
-              <a:t>GoF</a:t>
-            </a:r>
-            <a:r>
-              <a:rPr lang="en-US" sz="2000" dirty="0" smtClean="0"/>
-              <a:t>- Foundation</a:t>
+              <a:rPr lang="en-US" dirty="0" smtClean="0"/>
+              <a:t>We are talking about software. Right?</a:t>
             </a:r>
           </a:p>
           <a:p>
@@ -7801,38 +8497,8 @@
               <a:buAutoNum type="arabicPeriod"/>
             </a:pPr>
             <a:r>
-              <a:rPr lang="en-US" sz="2000" dirty="0" smtClean="0"/>
-              <a:t>3 Groups </a:t>
-            </a:r>
-          </a:p>
-          <a:p>
-            <a:pPr marL="857250" lvl="1" indent="-457200">
-              <a:buFont typeface="+mj-lt"/>
-              <a:buAutoNum type="arabicPeriod"/>
-            </a:pPr>
-            <a:r>
-              <a:rPr lang="en-US" sz="2000" dirty="0" smtClean="0"/>
-              <a:t>Creational</a:t>
-            </a:r>
-          </a:p>
-          <a:p>
-            <a:pPr marL="857250" lvl="1" indent="-457200">
-              <a:buFont typeface="+mj-lt"/>
-              <a:buAutoNum type="arabicPeriod"/>
-            </a:pPr>
-            <a:r>
-              <a:rPr lang="en-US" sz="2000" dirty="0" smtClean="0"/>
-              <a:t>Structural</a:t>
-            </a:r>
-          </a:p>
-          <a:p>
-            <a:pPr marL="857250" lvl="1" indent="-457200">
-              <a:buFont typeface="+mj-lt"/>
-              <a:buAutoNum type="arabicPeriod"/>
-            </a:pPr>
-            <a:r>
-              <a:rPr lang="en-US" sz="2000" dirty="0" smtClean="0"/>
-              <a:t>Behavioral</a:t>
+              <a:rPr lang="en-US" dirty="0" smtClean="0"/>
+              <a:t>Reusable solution to a commonly occurring problem within a given context</a:t>
             </a:r>
           </a:p>
           <a:p>
@@ -7841,8 +8507,8 @@
               <a:buAutoNum type="arabicPeriod"/>
             </a:pPr>
             <a:r>
-              <a:rPr lang="en-US" sz="2000" dirty="0" smtClean="0"/>
-              <a:t>Specific Areas such as architecture, UI, concurrency, security</a:t>
+              <a:rPr lang="en-US" dirty="0" smtClean="0"/>
+              <a:t>Christopher Alexander (1977/79)</a:t>
             </a:r>
           </a:p>
           <a:p>
@@ -7850,33 +8516,66 @@
               <a:buNone/>
             </a:pPr>
             <a:r>
-              <a:rPr lang="en-US" sz="2000" dirty="0" smtClean="0"/>
-              <a:t>4. 	Forces and Solution</a:t>
-            </a:r>
+              <a:rPr lang="en-US" b="1" i="1" dirty="0" smtClean="0"/>
+              <a:t>          A Pattern Language: Towns, Buildings, Construction</a:t>
+            </a:r>
+            <a:endParaRPr lang="en-US" dirty="0" smtClean="0"/>
           </a:p>
           <a:p>
             <a:pPr marL="457200" indent="-457200">
               <a:buNone/>
             </a:pPr>
             <a:r>
-              <a:rPr lang="en-US" sz="2000" dirty="0" smtClean="0"/>
-              <a:t>5. 	UML</a:t>
+              <a:rPr lang="en-US" dirty="0" smtClean="0"/>
+              <a:t>4. 	Form a common language</a:t>
             </a:r>
           </a:p>
           <a:p>
             <a:pPr marL="457200" indent="-457200">
               <a:buNone/>
             </a:pPr>
-            <a:endParaRPr lang="en-US" sz="2000" i="1" dirty="0" smtClean="0"/>
+            <a:r>
+              <a:rPr lang="en-US" dirty="0" smtClean="0"/>
+              <a:t>5. 	</a:t>
+            </a:r>
+            <a:r>
+              <a:rPr lang="en-US" dirty="0" err="1" smtClean="0"/>
+              <a:t>GoF</a:t>
+            </a:r>
+            <a:r>
+              <a:rPr lang="en-US" dirty="0" smtClean="0"/>
+              <a:t> – </a:t>
+            </a:r>
+            <a:r>
+              <a:rPr lang="en-US" b="1" i="1" dirty="0" smtClean="0"/>
+              <a:t>DESIGN PATTERNS Elements of Reusable Object Oriented Software Gamma, et al. </a:t>
+            </a:r>
+            <a:r>
+              <a:rPr lang="en-US" dirty="0" smtClean="0"/>
+              <a:t>(1995)</a:t>
+            </a:r>
           </a:p>
           <a:p>
             <a:pPr marL="457200" indent="-457200">
               <a:buNone/>
             </a:pPr>
             <a:r>
-              <a:rPr lang="en-US" sz="2000" i="1" dirty="0" smtClean="0"/>
-              <a:t>         </a:t>
-            </a:r>
+              <a:rPr lang="en-US" sz="3200" dirty="0" smtClean="0"/>
+              <a:t>	</a:t>
+            </a:r>
+            <a:endParaRPr lang="en-US" sz="1600" dirty="0" smtClean="0"/>
+          </a:p>
+          <a:p>
+            <a:pPr marL="457200" indent="-457200">
+              <a:buNone/>
+            </a:pPr>
+            <a:endParaRPr lang="en-US" sz="2000" dirty="0" smtClean="0"/>
+          </a:p>
+          <a:p>
+            <a:pPr marL="457200" indent="-457200">
+              <a:buNone/>
+            </a:pPr>
+            <a:endParaRPr lang="en-US" sz="2000" dirty="0" smtClean="0"/>
           </a:p>
         </p:txBody>
       </p:sp>
@@ -7936,6 +8635,986 @@
   <p:timing>
     <p:tnLst>
       <p:par>
+        <p:cTn id="1" dur="indefinite" restart="never" nodeType="tmRoot">
+          <p:childTnLst>
+            <p:seq concurrent="1" nextAc="seek">
+              <p:cTn id="2" dur="indefinite" nodeType="mainSeq">
+                <p:childTnLst>
+                  <p:par>
+                    <p:cTn id="3" fill="hold">
+                      <p:stCondLst>
+                        <p:cond delay="indefinite"/>
+                      </p:stCondLst>
+                      <p:childTnLst>
+                        <p:par>
+                          <p:cTn id="4" fill="hold">
+                            <p:stCondLst>
+                              <p:cond delay="0"/>
+                            </p:stCondLst>
+                            <p:childTnLst>
+                              <p:par>
+                                <p:cTn id="5" presetID="2" presetClass="entr" presetSubtype="4" fill="hold" nodeType="clickEffect">
+                                  <p:stCondLst>
+                                    <p:cond delay="0"/>
+                                  </p:stCondLst>
+                                  <p:childTnLst>
+                                    <p:set>
+                                      <p:cBhvr>
+                                        <p:cTn id="6" dur="1" fill="hold">
+                                          <p:stCondLst>
+                                            <p:cond delay="0"/>
+                                          </p:stCondLst>
+                                        </p:cTn>
+                                        <p:tgtEl>
+                                          <p:spTgt spid="3075">
+                                            <p:txEl>
+                                              <p:pRg st="0" end="0"/>
+                                            </p:txEl>
+                                          </p:spTgt>
+                                        </p:tgtEl>
+                                        <p:attrNameLst>
+                                          <p:attrName>style.visibility</p:attrName>
+                                        </p:attrNameLst>
+                                      </p:cBhvr>
+                                      <p:to>
+                                        <p:strVal val="visible"/>
+                                      </p:to>
+                                    </p:set>
+                                    <p:anim calcmode="lin" valueType="num">
+                                      <p:cBhvr additive="base">
+                                        <p:cTn id="7" dur="500" fill="hold"/>
+                                        <p:tgtEl>
+                                          <p:spTgt spid="3075">
+                                            <p:txEl>
+                                              <p:pRg st="0" end="0"/>
+                                            </p:txEl>
+                                          </p:spTgt>
+                                        </p:tgtEl>
+                                        <p:attrNameLst>
+                                          <p:attrName>ppt_x</p:attrName>
+                                        </p:attrNameLst>
+                                      </p:cBhvr>
+                                      <p:tavLst>
+                                        <p:tav tm="0">
+                                          <p:val>
+                                            <p:strVal val="#ppt_x"/>
+                                          </p:val>
+                                        </p:tav>
+                                        <p:tav tm="100000">
+                                          <p:val>
+                                            <p:strVal val="#ppt_x"/>
+                                          </p:val>
+                                        </p:tav>
+                                      </p:tavLst>
+                                    </p:anim>
+                                    <p:anim calcmode="lin" valueType="num">
+                                      <p:cBhvr additive="base">
+                                        <p:cTn id="8" dur="500" fill="hold"/>
+                                        <p:tgtEl>
+                                          <p:spTgt spid="3075">
+                                            <p:txEl>
+                                              <p:pRg st="0" end="0"/>
+                                            </p:txEl>
+                                          </p:spTgt>
+                                        </p:tgtEl>
+                                        <p:attrNameLst>
+                                          <p:attrName>ppt_y</p:attrName>
+                                        </p:attrNameLst>
+                                      </p:cBhvr>
+                                      <p:tavLst>
+                                        <p:tav tm="0">
+                                          <p:val>
+                                            <p:strVal val="1+#ppt_h/2"/>
+                                          </p:val>
+                                        </p:tav>
+                                        <p:tav tm="100000">
+                                          <p:val>
+                                            <p:strVal val="#ppt_y"/>
+                                          </p:val>
+                                        </p:tav>
+                                      </p:tavLst>
+                                    </p:anim>
+                                  </p:childTnLst>
+                                </p:cTn>
+                              </p:par>
+                            </p:childTnLst>
+                          </p:cTn>
+                        </p:par>
+                      </p:childTnLst>
+                    </p:cTn>
+                  </p:par>
+                  <p:par>
+                    <p:cTn id="9" fill="hold">
+                      <p:stCondLst>
+                        <p:cond delay="indefinite"/>
+                      </p:stCondLst>
+                      <p:childTnLst>
+                        <p:par>
+                          <p:cTn id="10" fill="hold">
+                            <p:stCondLst>
+                              <p:cond delay="0"/>
+                            </p:stCondLst>
+                            <p:childTnLst>
+                              <p:par>
+                                <p:cTn id="11" presetID="2" presetClass="entr" presetSubtype="4" fill="hold" nodeType="clickEffect">
+                                  <p:stCondLst>
+                                    <p:cond delay="0"/>
+                                  </p:stCondLst>
+                                  <p:childTnLst>
+                                    <p:set>
+                                      <p:cBhvr>
+                                        <p:cTn id="12" dur="1" fill="hold">
+                                          <p:stCondLst>
+                                            <p:cond delay="0"/>
+                                          </p:stCondLst>
+                                        </p:cTn>
+                                        <p:tgtEl>
+                                          <p:spTgt spid="3075">
+                                            <p:txEl>
+                                              <p:pRg st="1" end="1"/>
+                                            </p:txEl>
+                                          </p:spTgt>
+                                        </p:tgtEl>
+                                        <p:attrNameLst>
+                                          <p:attrName>style.visibility</p:attrName>
+                                        </p:attrNameLst>
+                                      </p:cBhvr>
+                                      <p:to>
+                                        <p:strVal val="visible"/>
+                                      </p:to>
+                                    </p:set>
+                                    <p:anim calcmode="lin" valueType="num">
+                                      <p:cBhvr additive="base">
+                                        <p:cTn id="13" dur="500" fill="hold"/>
+                                        <p:tgtEl>
+                                          <p:spTgt spid="3075">
+                                            <p:txEl>
+                                              <p:pRg st="1" end="1"/>
+                                            </p:txEl>
+                                          </p:spTgt>
+                                        </p:tgtEl>
+                                        <p:attrNameLst>
+                                          <p:attrName>ppt_x</p:attrName>
+                                        </p:attrNameLst>
+                                      </p:cBhvr>
+                                      <p:tavLst>
+                                        <p:tav tm="0">
+                                          <p:val>
+                                            <p:strVal val="#ppt_x"/>
+                                          </p:val>
+                                        </p:tav>
+                                        <p:tav tm="100000">
+                                          <p:val>
+                                            <p:strVal val="#ppt_x"/>
+                                          </p:val>
+                                        </p:tav>
+                                      </p:tavLst>
+                                    </p:anim>
+                                    <p:anim calcmode="lin" valueType="num">
+                                      <p:cBhvr additive="base">
+                                        <p:cTn id="14" dur="500" fill="hold"/>
+                                        <p:tgtEl>
+                                          <p:spTgt spid="3075">
+                                            <p:txEl>
+                                              <p:pRg st="1" end="1"/>
+                                            </p:txEl>
+                                          </p:spTgt>
+                                        </p:tgtEl>
+                                        <p:attrNameLst>
+                                          <p:attrName>ppt_y</p:attrName>
+                                        </p:attrNameLst>
+                                      </p:cBhvr>
+                                      <p:tavLst>
+                                        <p:tav tm="0">
+                                          <p:val>
+                                            <p:strVal val="1+#ppt_h/2"/>
+                                          </p:val>
+                                        </p:tav>
+                                        <p:tav tm="100000">
+                                          <p:val>
+                                            <p:strVal val="#ppt_y"/>
+                                          </p:val>
+                                        </p:tav>
+                                      </p:tavLst>
+                                    </p:anim>
+                                  </p:childTnLst>
+                                </p:cTn>
+                              </p:par>
+                            </p:childTnLst>
+                          </p:cTn>
+                        </p:par>
+                      </p:childTnLst>
+                    </p:cTn>
+                  </p:par>
+                  <p:par>
+                    <p:cTn id="15" fill="hold">
+                      <p:stCondLst>
+                        <p:cond delay="indefinite"/>
+                      </p:stCondLst>
+                      <p:childTnLst>
+                        <p:par>
+                          <p:cTn id="16" fill="hold">
+                            <p:stCondLst>
+                              <p:cond delay="0"/>
+                            </p:stCondLst>
+                            <p:childTnLst>
+                              <p:par>
+                                <p:cTn id="17" presetID="2" presetClass="entr" presetSubtype="4" fill="hold" nodeType="clickEffect">
+                                  <p:stCondLst>
+                                    <p:cond delay="0"/>
+                                  </p:stCondLst>
+                                  <p:childTnLst>
+                                    <p:set>
+                                      <p:cBhvr>
+                                        <p:cTn id="18" dur="1" fill="hold">
+                                          <p:stCondLst>
+                                            <p:cond delay="0"/>
+                                          </p:stCondLst>
+                                        </p:cTn>
+                                        <p:tgtEl>
+                                          <p:spTgt spid="3075">
+                                            <p:txEl>
+                                              <p:pRg st="2" end="2"/>
+                                            </p:txEl>
+                                          </p:spTgt>
+                                        </p:tgtEl>
+                                        <p:attrNameLst>
+                                          <p:attrName>style.visibility</p:attrName>
+                                        </p:attrNameLst>
+                                      </p:cBhvr>
+                                      <p:to>
+                                        <p:strVal val="visible"/>
+                                      </p:to>
+                                    </p:set>
+                                    <p:anim calcmode="lin" valueType="num">
+                                      <p:cBhvr additive="base">
+                                        <p:cTn id="19" dur="500" fill="hold"/>
+                                        <p:tgtEl>
+                                          <p:spTgt spid="3075">
+                                            <p:txEl>
+                                              <p:pRg st="2" end="2"/>
+                                            </p:txEl>
+                                          </p:spTgt>
+                                        </p:tgtEl>
+                                        <p:attrNameLst>
+                                          <p:attrName>ppt_x</p:attrName>
+                                        </p:attrNameLst>
+                                      </p:cBhvr>
+                                      <p:tavLst>
+                                        <p:tav tm="0">
+                                          <p:val>
+                                            <p:strVal val="#ppt_x"/>
+                                          </p:val>
+                                        </p:tav>
+                                        <p:tav tm="100000">
+                                          <p:val>
+                                            <p:strVal val="#ppt_x"/>
+                                          </p:val>
+                                        </p:tav>
+                                      </p:tavLst>
+                                    </p:anim>
+                                    <p:anim calcmode="lin" valueType="num">
+                                      <p:cBhvr additive="base">
+                                        <p:cTn id="20" dur="500" fill="hold"/>
+                                        <p:tgtEl>
+                                          <p:spTgt spid="3075">
+                                            <p:txEl>
+                                              <p:pRg st="2" end="2"/>
+                                            </p:txEl>
+                                          </p:spTgt>
+                                        </p:tgtEl>
+                                        <p:attrNameLst>
+                                          <p:attrName>ppt_y</p:attrName>
+                                        </p:attrNameLst>
+                                      </p:cBhvr>
+                                      <p:tavLst>
+                                        <p:tav tm="0">
+                                          <p:val>
+                                            <p:strVal val="1+#ppt_h/2"/>
+                                          </p:val>
+                                        </p:tav>
+                                        <p:tav tm="100000">
+                                          <p:val>
+                                            <p:strVal val="#ppt_y"/>
+                                          </p:val>
+                                        </p:tav>
+                                      </p:tavLst>
+                                    </p:anim>
+                                  </p:childTnLst>
+                                </p:cTn>
+                              </p:par>
+                            </p:childTnLst>
+                          </p:cTn>
+                        </p:par>
+                      </p:childTnLst>
+                    </p:cTn>
+                  </p:par>
+                  <p:par>
+                    <p:cTn id="21" fill="hold">
+                      <p:stCondLst>
+                        <p:cond delay="indefinite"/>
+                      </p:stCondLst>
+                      <p:childTnLst>
+                        <p:par>
+                          <p:cTn id="22" fill="hold">
+                            <p:stCondLst>
+                              <p:cond delay="0"/>
+                            </p:stCondLst>
+                            <p:childTnLst>
+                              <p:par>
+                                <p:cTn id="23" presetID="2" presetClass="entr" presetSubtype="4" fill="hold" nodeType="clickEffect">
+                                  <p:stCondLst>
+                                    <p:cond delay="0"/>
+                                  </p:stCondLst>
+                                  <p:childTnLst>
+                                    <p:set>
+                                      <p:cBhvr>
+                                        <p:cTn id="24" dur="1" fill="hold">
+                                          <p:stCondLst>
+                                            <p:cond delay="0"/>
+                                          </p:stCondLst>
+                                        </p:cTn>
+                                        <p:tgtEl>
+                                          <p:spTgt spid="3075">
+                                            <p:txEl>
+                                              <p:pRg st="3" end="3"/>
+                                            </p:txEl>
+                                          </p:spTgt>
+                                        </p:tgtEl>
+                                        <p:attrNameLst>
+                                          <p:attrName>style.visibility</p:attrName>
+                                        </p:attrNameLst>
+                                      </p:cBhvr>
+                                      <p:to>
+                                        <p:strVal val="visible"/>
+                                      </p:to>
+                                    </p:set>
+                                    <p:anim calcmode="lin" valueType="num">
+                                      <p:cBhvr additive="base">
+                                        <p:cTn id="25" dur="500" fill="hold"/>
+                                        <p:tgtEl>
+                                          <p:spTgt spid="3075">
+                                            <p:txEl>
+                                              <p:pRg st="3" end="3"/>
+                                            </p:txEl>
+                                          </p:spTgt>
+                                        </p:tgtEl>
+                                        <p:attrNameLst>
+                                          <p:attrName>ppt_x</p:attrName>
+                                        </p:attrNameLst>
+                                      </p:cBhvr>
+                                      <p:tavLst>
+                                        <p:tav tm="0">
+                                          <p:val>
+                                            <p:strVal val="#ppt_x"/>
+                                          </p:val>
+                                        </p:tav>
+                                        <p:tav tm="100000">
+                                          <p:val>
+                                            <p:strVal val="#ppt_x"/>
+                                          </p:val>
+                                        </p:tav>
+                                      </p:tavLst>
+                                    </p:anim>
+                                    <p:anim calcmode="lin" valueType="num">
+                                      <p:cBhvr additive="base">
+                                        <p:cTn id="26" dur="500" fill="hold"/>
+                                        <p:tgtEl>
+                                          <p:spTgt spid="3075">
+                                            <p:txEl>
+                                              <p:pRg st="3" end="3"/>
+                                            </p:txEl>
+                                          </p:spTgt>
+                                        </p:tgtEl>
+                                        <p:attrNameLst>
+                                          <p:attrName>ppt_y</p:attrName>
+                                        </p:attrNameLst>
+                                      </p:cBhvr>
+                                      <p:tavLst>
+                                        <p:tav tm="0">
+                                          <p:val>
+                                            <p:strVal val="1+#ppt_h/2"/>
+                                          </p:val>
+                                        </p:tav>
+                                        <p:tav tm="100000">
+                                          <p:val>
+                                            <p:strVal val="#ppt_y"/>
+                                          </p:val>
+                                        </p:tav>
+                                      </p:tavLst>
+                                    </p:anim>
+                                  </p:childTnLst>
+                                </p:cTn>
+                              </p:par>
+                            </p:childTnLst>
+                          </p:cTn>
+                        </p:par>
+                      </p:childTnLst>
+                    </p:cTn>
+                  </p:par>
+                  <p:par>
+                    <p:cTn id="27" fill="hold">
+                      <p:stCondLst>
+                        <p:cond delay="indefinite"/>
+                      </p:stCondLst>
+                      <p:childTnLst>
+                        <p:par>
+                          <p:cTn id="28" fill="hold">
+                            <p:stCondLst>
+                              <p:cond delay="0"/>
+                            </p:stCondLst>
+                            <p:childTnLst>
+                              <p:par>
+                                <p:cTn id="29" presetID="2" presetClass="entr" presetSubtype="4" fill="hold" nodeType="clickEffect">
+                                  <p:stCondLst>
+                                    <p:cond delay="0"/>
+                                  </p:stCondLst>
+                                  <p:childTnLst>
+                                    <p:set>
+                                      <p:cBhvr>
+                                        <p:cTn id="30" dur="1" fill="hold">
+                                          <p:stCondLst>
+                                            <p:cond delay="0"/>
+                                          </p:stCondLst>
+                                        </p:cTn>
+                                        <p:tgtEl>
+                                          <p:spTgt spid="3075">
+                                            <p:txEl>
+                                              <p:pRg st="4" end="4"/>
+                                            </p:txEl>
+                                          </p:spTgt>
+                                        </p:tgtEl>
+                                        <p:attrNameLst>
+                                          <p:attrName>style.visibility</p:attrName>
+                                        </p:attrNameLst>
+                                      </p:cBhvr>
+                                      <p:to>
+                                        <p:strVal val="visible"/>
+                                      </p:to>
+                                    </p:set>
+                                    <p:anim calcmode="lin" valueType="num">
+                                      <p:cBhvr additive="base">
+                                        <p:cTn id="31" dur="500" fill="hold"/>
+                                        <p:tgtEl>
+                                          <p:spTgt spid="3075">
+                                            <p:txEl>
+                                              <p:pRg st="4" end="4"/>
+                                            </p:txEl>
+                                          </p:spTgt>
+                                        </p:tgtEl>
+                                        <p:attrNameLst>
+                                          <p:attrName>ppt_x</p:attrName>
+                                        </p:attrNameLst>
+                                      </p:cBhvr>
+                                      <p:tavLst>
+                                        <p:tav tm="0">
+                                          <p:val>
+                                            <p:strVal val="#ppt_x"/>
+                                          </p:val>
+                                        </p:tav>
+                                        <p:tav tm="100000">
+                                          <p:val>
+                                            <p:strVal val="#ppt_x"/>
+                                          </p:val>
+                                        </p:tav>
+                                      </p:tavLst>
+                                    </p:anim>
+                                    <p:anim calcmode="lin" valueType="num">
+                                      <p:cBhvr additive="base">
+                                        <p:cTn id="32" dur="500" fill="hold"/>
+                                        <p:tgtEl>
+                                          <p:spTgt spid="3075">
+                                            <p:txEl>
+                                              <p:pRg st="4" end="4"/>
+                                            </p:txEl>
+                                          </p:spTgt>
+                                        </p:tgtEl>
+                                        <p:attrNameLst>
+                                          <p:attrName>ppt_y</p:attrName>
+                                        </p:attrNameLst>
+                                      </p:cBhvr>
+                                      <p:tavLst>
+                                        <p:tav tm="0">
+                                          <p:val>
+                                            <p:strVal val="1+#ppt_h/2"/>
+                                          </p:val>
+                                        </p:tav>
+                                        <p:tav tm="100000">
+                                          <p:val>
+                                            <p:strVal val="#ppt_y"/>
+                                          </p:val>
+                                        </p:tav>
+                                      </p:tavLst>
+                                    </p:anim>
+                                  </p:childTnLst>
+                                </p:cTn>
+                              </p:par>
+                            </p:childTnLst>
+                          </p:cTn>
+                        </p:par>
+                      </p:childTnLst>
+                    </p:cTn>
+                  </p:par>
+                  <p:par>
+                    <p:cTn id="33" fill="hold">
+                      <p:stCondLst>
+                        <p:cond delay="indefinite"/>
+                      </p:stCondLst>
+                      <p:childTnLst>
+                        <p:par>
+                          <p:cTn id="34" fill="hold">
+                            <p:stCondLst>
+                              <p:cond delay="0"/>
+                            </p:stCondLst>
+                            <p:childTnLst>
+                              <p:par>
+                                <p:cTn id="35" presetID="2" presetClass="entr" presetSubtype="4" fill="hold" nodeType="clickEffect">
+                                  <p:stCondLst>
+                                    <p:cond delay="0"/>
+                                  </p:stCondLst>
+                                  <p:childTnLst>
+                                    <p:set>
+                                      <p:cBhvr>
+                                        <p:cTn id="36" dur="1" fill="hold">
+                                          <p:stCondLst>
+                                            <p:cond delay="0"/>
+                                          </p:stCondLst>
+                                        </p:cTn>
+                                        <p:tgtEl>
+                                          <p:spTgt spid="3075">
+                                            <p:txEl>
+                                              <p:pRg st="5" end="5"/>
+                                            </p:txEl>
+                                          </p:spTgt>
+                                        </p:tgtEl>
+                                        <p:attrNameLst>
+                                          <p:attrName>style.visibility</p:attrName>
+                                        </p:attrNameLst>
+                                      </p:cBhvr>
+                                      <p:to>
+                                        <p:strVal val="visible"/>
+                                      </p:to>
+                                    </p:set>
+                                    <p:anim calcmode="lin" valueType="num">
+                                      <p:cBhvr additive="base">
+                                        <p:cTn id="37" dur="500" fill="hold"/>
+                                        <p:tgtEl>
+                                          <p:spTgt spid="3075">
+                                            <p:txEl>
+                                              <p:pRg st="5" end="5"/>
+                                            </p:txEl>
+                                          </p:spTgt>
+                                        </p:tgtEl>
+                                        <p:attrNameLst>
+                                          <p:attrName>ppt_x</p:attrName>
+                                        </p:attrNameLst>
+                                      </p:cBhvr>
+                                      <p:tavLst>
+                                        <p:tav tm="0">
+                                          <p:val>
+                                            <p:strVal val="#ppt_x"/>
+                                          </p:val>
+                                        </p:tav>
+                                        <p:tav tm="100000">
+                                          <p:val>
+                                            <p:strVal val="#ppt_x"/>
+                                          </p:val>
+                                        </p:tav>
+                                      </p:tavLst>
+                                    </p:anim>
+                                    <p:anim calcmode="lin" valueType="num">
+                                      <p:cBhvr additive="base">
+                                        <p:cTn id="38" dur="500" fill="hold"/>
+                                        <p:tgtEl>
+                                          <p:spTgt spid="3075">
+                                            <p:txEl>
+                                              <p:pRg st="5" end="5"/>
+                                            </p:txEl>
+                                          </p:spTgt>
+                                        </p:tgtEl>
+                                        <p:attrNameLst>
+                                          <p:attrName>ppt_y</p:attrName>
+                                        </p:attrNameLst>
+                                      </p:cBhvr>
+                                      <p:tavLst>
+                                        <p:tav tm="0">
+                                          <p:val>
+                                            <p:strVal val="1+#ppt_h/2"/>
+                                          </p:val>
+                                        </p:tav>
+                                        <p:tav tm="100000">
+                                          <p:val>
+                                            <p:strVal val="#ppt_y"/>
+                                          </p:val>
+                                        </p:tav>
+                                      </p:tavLst>
+                                    </p:anim>
+                                  </p:childTnLst>
+                                </p:cTn>
+                              </p:par>
+                            </p:childTnLst>
+                          </p:cTn>
+                        </p:par>
+                      </p:childTnLst>
+                    </p:cTn>
+                  </p:par>
+                  <p:par>
+                    <p:cTn id="39" fill="hold">
+                      <p:stCondLst>
+                        <p:cond delay="indefinite"/>
+                      </p:stCondLst>
+                      <p:childTnLst>
+                        <p:par>
+                          <p:cTn id="40" fill="hold">
+                            <p:stCondLst>
+                              <p:cond delay="0"/>
+                            </p:stCondLst>
+                            <p:childTnLst>
+                              <p:par>
+                                <p:cTn id="41" presetID="2" presetClass="entr" presetSubtype="4" fill="hold" nodeType="clickEffect">
+                                  <p:stCondLst>
+                                    <p:cond delay="0"/>
+                                  </p:stCondLst>
+                                  <p:childTnLst>
+                                    <p:set>
+                                      <p:cBhvr>
+                                        <p:cTn id="42" dur="1" fill="hold">
+                                          <p:stCondLst>
+                                            <p:cond delay="0"/>
+                                          </p:stCondLst>
+                                        </p:cTn>
+                                        <p:tgtEl>
+                                          <p:spTgt spid="3075">
+                                            <p:txEl>
+                                              <p:pRg st="6" end="6"/>
+                                            </p:txEl>
+                                          </p:spTgt>
+                                        </p:tgtEl>
+                                        <p:attrNameLst>
+                                          <p:attrName>style.visibility</p:attrName>
+                                        </p:attrNameLst>
+                                      </p:cBhvr>
+                                      <p:to>
+                                        <p:strVal val="visible"/>
+                                      </p:to>
+                                    </p:set>
+                                    <p:anim calcmode="lin" valueType="num">
+                                      <p:cBhvr additive="base">
+                                        <p:cTn id="43" dur="500" fill="hold"/>
+                                        <p:tgtEl>
+                                          <p:spTgt spid="3075">
+                                            <p:txEl>
+                                              <p:pRg st="6" end="6"/>
+                                            </p:txEl>
+                                          </p:spTgt>
+                                        </p:tgtEl>
+                                        <p:attrNameLst>
+                                          <p:attrName>ppt_x</p:attrName>
+                                        </p:attrNameLst>
+                                      </p:cBhvr>
+                                      <p:tavLst>
+                                        <p:tav tm="0">
+                                          <p:val>
+                                            <p:strVal val="#ppt_x"/>
+                                          </p:val>
+                                        </p:tav>
+                                        <p:tav tm="100000">
+                                          <p:val>
+                                            <p:strVal val="#ppt_x"/>
+                                          </p:val>
+                                        </p:tav>
+                                      </p:tavLst>
+                                    </p:anim>
+                                    <p:anim calcmode="lin" valueType="num">
+                                      <p:cBhvr additive="base">
+                                        <p:cTn id="44" dur="500" fill="hold"/>
+                                        <p:tgtEl>
+                                          <p:spTgt spid="3075">
+                                            <p:txEl>
+                                              <p:pRg st="6" end="6"/>
+                                            </p:txEl>
+                                          </p:spTgt>
+                                        </p:tgtEl>
+                                        <p:attrNameLst>
+                                          <p:attrName>ppt_y</p:attrName>
+                                        </p:attrNameLst>
+                                      </p:cBhvr>
+                                      <p:tavLst>
+                                        <p:tav tm="0">
+                                          <p:val>
+                                            <p:strVal val="1+#ppt_h/2"/>
+                                          </p:val>
+                                        </p:tav>
+                                        <p:tav tm="100000">
+                                          <p:val>
+                                            <p:strVal val="#ppt_y"/>
+                                          </p:val>
+                                        </p:tav>
+                                      </p:tavLst>
+                                    </p:anim>
+                                  </p:childTnLst>
+                                </p:cTn>
+                              </p:par>
+                            </p:childTnLst>
+                          </p:cTn>
+                        </p:par>
+                      </p:childTnLst>
+                    </p:cTn>
+                  </p:par>
+                </p:childTnLst>
+              </p:cTn>
+              <p:prevCondLst>
+                <p:cond evt="onPrev" delay="0">
+                  <p:tgtEl>
+                    <p:sldTgt/>
+                  </p:tgtEl>
+                </p:cond>
+              </p:prevCondLst>
+              <p:nextCondLst>
+                <p:cond evt="onNext" delay="0">
+                  <p:tgtEl>
+                    <p:sldTgt/>
+                  </p:tgtEl>
+                </p:cond>
+              </p:nextCondLst>
+            </p:seq>
+          </p:childTnLst>
+        </p:cTn>
+      </p:par>
+    </p:tnLst>
+  </p:timing>
+</p:sld>
+</file>
+
+<file path=ppt/slides/slide6.xml><?xml version="1.0" encoding="utf-8"?>
+<p:sld xmlns:a="http://schemas.openxmlformats.org/drawingml/2006/main" xmlns:r="http://schemas.openxmlformats.org/officeDocument/2006/relationships" xmlns:p="http://schemas.openxmlformats.org/presentationml/2006/main">
+  <p:cSld>
+    <p:spTree>
+      <p:nvGrpSpPr>
+        <p:cNvPr id="1" name=""/>
+        <p:cNvGrpSpPr/>
+        <p:nvPr/>
+      </p:nvGrpSpPr>
+      <p:grpSpPr>
+        <a:xfrm>
+          <a:off x="0" y="0"/>
+          <a:ext cx="0" cy="0"/>
+          <a:chOff x="0" y="0"/>
+          <a:chExt cx="0" cy="0"/>
+        </a:xfrm>
+      </p:grpSpPr>
+      <p:sp>
+        <p:nvSpPr>
+          <p:cNvPr id="3074" name="Title 1"/>
+          <p:cNvSpPr>
+            <a:spLocks noGrp="1"/>
+          </p:cNvSpPr>
+          <p:nvPr>
+            <p:ph type="title"/>
+          </p:nvPr>
+        </p:nvSpPr>
+        <p:spPr bwMode="auto">
+          <a:noFill/>
+          <a:ln>
+            <a:miter lim="800000"/>
+            <a:headEnd/>
+            <a:tailEnd/>
+          </a:ln>
+        </p:spPr>
+        <p:txBody>
+          <a:bodyPr vert="horz" wrap="square" lIns="91440" tIns="45720" rIns="91440" bIns="45720" numCol="1" anchor="t" anchorCtr="0" compatLnSpc="1">
+            <a:prstTxWarp prst="textNoShape">
+              <a:avLst/>
+            </a:prstTxWarp>
+          </a:bodyPr>
+          <a:lstStyle/>
+          <a:p>
+            <a:pPr eaLnBrk="1" hangingPunct="1"/>
+            <a:r>
+              <a:rPr lang="en-US" dirty="0" smtClean="0"/>
+              <a:t>Design Pattern Categories</a:t>
+            </a:r>
+          </a:p>
+        </p:txBody>
+      </p:sp>
+      <p:sp>
+        <p:nvSpPr>
+          <p:cNvPr id="3075" name="Text Placeholder 2"/>
+          <p:cNvSpPr>
+            <a:spLocks noGrp="1"/>
+          </p:cNvSpPr>
+          <p:nvPr>
+            <p:ph type="body" sz="quarter" idx="10"/>
+          </p:nvPr>
+        </p:nvSpPr>
+        <p:spPr>
+          <a:xfrm>
+            <a:off x="381000" y="1295400"/>
+            <a:ext cx="8686800" cy="3886200"/>
+          </a:xfrm>
+        </p:spPr>
+        <p:txBody>
+          <a:bodyPr/>
+          <a:lstStyle/>
+          <a:p>
+            <a:pPr marL="457200" indent="-457200">
+              <a:buFont typeface="+mj-lt"/>
+              <a:buAutoNum type="arabicPeriod"/>
+            </a:pPr>
+            <a:r>
+              <a:rPr lang="en-US" sz="2000" dirty="0" smtClean="0"/>
+              <a:t>23 Patterns in </a:t>
+            </a:r>
+            <a:r>
+              <a:rPr lang="en-US" sz="2000" dirty="0" err="1" smtClean="0"/>
+              <a:t>GoF</a:t>
+            </a:r>
+            <a:r>
+              <a:rPr lang="en-US" sz="2000" dirty="0" smtClean="0"/>
+              <a:t>- Foundation</a:t>
+            </a:r>
+          </a:p>
+          <a:p>
+            <a:pPr marL="457200" indent="-457200">
+              <a:buFont typeface="+mj-lt"/>
+              <a:buAutoNum type="arabicPeriod"/>
+            </a:pPr>
+            <a:r>
+              <a:rPr lang="en-US" sz="2000" dirty="0" smtClean="0"/>
+              <a:t>3 Groups </a:t>
+            </a:r>
+          </a:p>
+          <a:p>
+            <a:pPr marL="857250" lvl="1" indent="-457200">
+              <a:buFont typeface="+mj-lt"/>
+              <a:buAutoNum type="arabicPeriod"/>
+            </a:pPr>
+            <a:r>
+              <a:rPr lang="en-US" sz="2000" dirty="0" smtClean="0"/>
+              <a:t>Creational</a:t>
+            </a:r>
+          </a:p>
+          <a:p>
+            <a:pPr marL="857250" lvl="1" indent="-457200">
+              <a:buFont typeface="+mj-lt"/>
+              <a:buAutoNum type="arabicPeriod"/>
+            </a:pPr>
+            <a:r>
+              <a:rPr lang="en-US" sz="2000" dirty="0" smtClean="0"/>
+              <a:t>Structural</a:t>
+            </a:r>
+          </a:p>
+          <a:p>
+            <a:pPr marL="857250" lvl="1" indent="-457200">
+              <a:buFont typeface="+mj-lt"/>
+              <a:buAutoNum type="arabicPeriod"/>
+            </a:pPr>
+            <a:r>
+              <a:rPr lang="en-US" sz="2000" dirty="0" smtClean="0"/>
+              <a:t>Behavioral</a:t>
+            </a:r>
+          </a:p>
+          <a:p>
+            <a:pPr marL="457200" indent="-457200">
+              <a:buFont typeface="+mj-lt"/>
+              <a:buAutoNum type="arabicPeriod"/>
+            </a:pPr>
+            <a:r>
+              <a:rPr lang="en-US" sz="2000" dirty="0" smtClean="0"/>
+              <a:t>Specific Areas such as architecture, UI, concurrency, security</a:t>
+            </a:r>
+          </a:p>
+          <a:p>
+            <a:pPr marL="457200" indent="-457200">
+              <a:buNone/>
+            </a:pPr>
+            <a:r>
+              <a:rPr lang="en-US" sz="2000" dirty="0" smtClean="0"/>
+              <a:t>4. 	Forces and Solution</a:t>
+            </a:r>
+          </a:p>
+          <a:p>
+            <a:pPr marL="457200" indent="-457200">
+              <a:buNone/>
+            </a:pPr>
+            <a:r>
+              <a:rPr lang="en-US" sz="2000" dirty="0" smtClean="0"/>
+              <a:t>5. 	UML</a:t>
+            </a:r>
+          </a:p>
+          <a:p>
+            <a:pPr marL="457200" indent="-457200">
+              <a:buNone/>
+            </a:pPr>
+            <a:endParaRPr lang="en-US" sz="2000" i="1" dirty="0" smtClean="0"/>
+          </a:p>
+          <a:p>
+            <a:pPr marL="457200" indent="-457200">
+              <a:buNone/>
+            </a:pPr>
+            <a:r>
+              <a:rPr lang="en-US" sz="2000" i="1" dirty="0" smtClean="0"/>
+              <a:t>         </a:t>
+            </a:r>
+          </a:p>
+        </p:txBody>
+      </p:sp>
+      <p:sp>
+        <p:nvSpPr>
+          <p:cNvPr id="5" name="Rectangle 4"/>
+          <p:cNvSpPr/>
+          <p:nvPr/>
+        </p:nvSpPr>
+        <p:spPr>
+          <a:xfrm>
+            <a:off x="2514600" y="6553200"/>
+            <a:ext cx="4114800" cy="228600"/>
+          </a:xfrm>
+          <a:prstGeom prst="rect">
+            <a:avLst/>
+          </a:prstGeom>
+          <a:solidFill>
+            <a:schemeClr val="bg1"/>
+          </a:solidFill>
+          <a:ln>
+            <a:solidFill>
+              <a:schemeClr val="bg1"/>
+            </a:solidFill>
+          </a:ln>
+        </p:spPr>
+        <p:style>
+          <a:lnRef idx="2">
+            <a:schemeClr val="accent1">
+              <a:shade val="50000"/>
+            </a:schemeClr>
+          </a:lnRef>
+          <a:fillRef idx="1">
+            <a:schemeClr val="accent1"/>
+          </a:fillRef>
+          <a:effectRef idx="0">
+            <a:schemeClr val="accent1"/>
+          </a:effectRef>
+          <a:fontRef idx="minor">
+            <a:schemeClr val="lt1"/>
+          </a:fontRef>
+        </p:style>
+        <p:txBody>
+          <a:bodyPr rtlCol="0" anchor="ctr"/>
+          <a:lstStyle/>
+          <a:p>
+            <a:pPr algn="ctr"/>
+            <a:endParaRPr lang="en-US"/>
+          </a:p>
+        </p:txBody>
+      </p:sp>
+    </p:spTree>
+  </p:cSld>
+  <p:clrMapOvr>
+    <a:masterClrMapping/>
+  </p:clrMapOvr>
+  <p:timing>
+    <p:tnLst>
+      <p:par>
         <p:cTn id="1" dur="indefinite" restart="never" nodeType="tmRoot"/>
       </p:par>
     </p:tnLst>
@@ -7943,7 +9622,7 @@
 </p:sld>
 </file>
 
-<file path=ppt/slides/slide6.xml><?xml version="1.0" encoding="utf-8"?>
+<file path=ppt/slides/slide7.xml><?xml version="1.0" encoding="utf-8"?>
 <p:sld xmlns:a="http://schemas.openxmlformats.org/drawingml/2006/main" xmlns:r="http://schemas.openxmlformats.org/officeDocument/2006/relationships" xmlns:p="http://schemas.openxmlformats.org/presentationml/2006/main">
   <p:cSld>
     <p:spTree>
@@ -8253,7 +9932,7 @@
 </p:sld>
 </file>
 
-<file path=ppt/slides/slide7.xml><?xml version="1.0" encoding="utf-8"?>
+<file path=ppt/slides/slide8.xml><?xml version="1.0" encoding="utf-8"?>
 <p:sld xmlns:a="http://schemas.openxmlformats.org/drawingml/2006/main" xmlns:r="http://schemas.openxmlformats.org/officeDocument/2006/relationships" xmlns:p="http://schemas.openxmlformats.org/presentationml/2006/main">
   <p:cSld>
     <p:spTree>
@@ -8461,7 +10140,7 @@
 </p:sld>
 </file>
 
-<file path=ppt/slides/slide8.xml><?xml version="1.0" encoding="utf-8"?>
+<file path=ppt/slides/slide9.xml><?xml version="1.0" encoding="utf-8"?>
 <p:sld xmlns:a="http://schemas.openxmlformats.org/drawingml/2006/main" xmlns:r="http://schemas.openxmlformats.org/officeDocument/2006/relationships" xmlns:p="http://schemas.openxmlformats.org/presentationml/2006/main">
   <p:cSld>
     <p:spTree>
@@ -8603,211 +10282,6 @@
               <a:rPr lang="en-US" dirty="0" smtClean="0"/>
               <a:t>– One instance of a class with global access</a:t>
             </a:r>
-          </a:p>
-        </p:txBody>
-      </p:sp>
-    </p:spTree>
-  </p:cSld>
-  <p:clrMapOvr>
-    <a:masterClrMapping/>
-  </p:clrMapOvr>
-  <p:timing>
-    <p:tnLst>
-      <p:par>
-        <p:cTn id="1" dur="indefinite" restart="never" nodeType="tmRoot"/>
-      </p:par>
-    </p:tnLst>
-  </p:timing>
-</p:sld>
-</file>
-
-<file path=ppt/slides/slide9.xml><?xml version="1.0" encoding="utf-8"?>
-<p:sld xmlns:a="http://schemas.openxmlformats.org/drawingml/2006/main" xmlns:r="http://schemas.openxmlformats.org/officeDocument/2006/relationships" xmlns:p="http://schemas.openxmlformats.org/presentationml/2006/main">
-  <p:cSld>
-    <p:spTree>
-      <p:nvGrpSpPr>
-        <p:cNvPr id="1" name=""/>
-        <p:cNvGrpSpPr/>
-        <p:nvPr/>
-      </p:nvGrpSpPr>
-      <p:grpSpPr>
-        <a:xfrm>
-          <a:off x="0" y="0"/>
-          <a:ext cx="0" cy="0"/>
-          <a:chOff x="0" y="0"/>
-          <a:chExt cx="0" cy="0"/>
-        </a:xfrm>
-      </p:grpSpPr>
-      <p:sp>
-        <p:nvSpPr>
-          <p:cNvPr id="3074" name="Title 1"/>
-          <p:cNvSpPr>
-            <a:spLocks noGrp="1"/>
-          </p:cNvSpPr>
-          <p:nvPr>
-            <p:ph type="title"/>
-          </p:nvPr>
-        </p:nvSpPr>
-        <p:spPr bwMode="auto">
-          <a:noFill/>
-          <a:ln>
-            <a:miter lim="800000"/>
-            <a:headEnd/>
-            <a:tailEnd/>
-          </a:ln>
-        </p:spPr>
-        <p:txBody>
-          <a:bodyPr vert="horz" wrap="square" lIns="91440" tIns="45720" rIns="91440" bIns="45720" numCol="1" anchor="t" anchorCtr="0" compatLnSpc="1">
-            <a:prstTxWarp prst="textNoShape">
-              <a:avLst/>
-            </a:prstTxWarp>
-          </a:bodyPr>
-          <a:lstStyle/>
-          <a:p>
-            <a:pPr eaLnBrk="1" hangingPunct="1"/>
-            <a:r>
-              <a:rPr lang="en-US" dirty="0" smtClean="0"/>
-              <a:t>Behavioral Patterns</a:t>
-            </a:r>
-          </a:p>
-        </p:txBody>
-      </p:sp>
-      <p:sp>
-        <p:nvSpPr>
-          <p:cNvPr id="4" name="Rectangle 3"/>
-          <p:cNvSpPr/>
-          <p:nvPr/>
-        </p:nvSpPr>
-        <p:spPr>
-          <a:xfrm>
-            <a:off x="2514600" y="6553200"/>
-            <a:ext cx="4114800" cy="228600"/>
-          </a:xfrm>
-          <a:prstGeom prst="rect">
-            <a:avLst/>
-          </a:prstGeom>
-          <a:solidFill>
-            <a:schemeClr val="bg1"/>
-          </a:solidFill>
-          <a:ln>
-            <a:solidFill>
-              <a:schemeClr val="bg1"/>
-            </a:solidFill>
-          </a:ln>
-        </p:spPr>
-        <p:style>
-          <a:lnRef idx="2">
-            <a:schemeClr val="accent1">
-              <a:shade val="50000"/>
-            </a:schemeClr>
-          </a:lnRef>
-          <a:fillRef idx="1">
-            <a:schemeClr val="accent1"/>
-          </a:fillRef>
-          <a:effectRef idx="0">
-            <a:schemeClr val="accent1"/>
-          </a:effectRef>
-          <a:fontRef idx="minor">
-            <a:schemeClr val="lt1"/>
-          </a:fontRef>
-        </p:style>
-        <p:txBody>
-          <a:bodyPr rtlCol="0" anchor="ctr"/>
-          <a:lstStyle/>
-          <a:p>
-            <a:pPr algn="ctr"/>
-            <a:endParaRPr lang="en-US"/>
-          </a:p>
-        </p:txBody>
-      </p:sp>
-      <p:sp>
-        <p:nvSpPr>
-          <p:cNvPr id="13" name="Text Placeholder 12"/>
-          <p:cNvSpPr>
-            <a:spLocks noGrp="1"/>
-          </p:cNvSpPr>
-          <p:nvPr>
-            <p:ph type="body" sz="quarter" idx="10"/>
-          </p:nvPr>
-        </p:nvSpPr>
-        <p:spPr/>
-        <p:txBody>
-          <a:bodyPr/>
-          <a:lstStyle/>
-          <a:p>
-            <a:r>
-              <a:rPr lang="en-US" b="1" dirty="0" smtClean="0"/>
-              <a:t>Strategy </a:t>
-            </a:r>
-            <a:r>
-              <a:rPr lang="en-US" dirty="0" smtClean="0"/>
-              <a:t>– Client chooses  concrete implementation</a:t>
-            </a:r>
-          </a:p>
-          <a:p>
-            <a:r>
-              <a:rPr lang="en-US" b="1" dirty="0" smtClean="0"/>
-              <a:t>State </a:t>
-            </a:r>
-            <a:r>
-              <a:rPr lang="en-US" dirty="0" smtClean="0"/>
-              <a:t>– Context changes from state to state</a:t>
-            </a:r>
-          </a:p>
-          <a:p>
-            <a:r>
-              <a:rPr lang="en-US" b="1" dirty="0" smtClean="0"/>
-              <a:t>Template Method </a:t>
-            </a:r>
-            <a:r>
-              <a:rPr lang="en-US" dirty="0" smtClean="0"/>
-              <a:t>– Template algorithm with certain steps to be handled elsewhere</a:t>
-            </a:r>
-          </a:p>
-          <a:p>
-            <a:r>
-              <a:rPr lang="en-US" b="1" dirty="0" smtClean="0"/>
-              <a:t>Chain of Responsibility </a:t>
-            </a:r>
-            <a:r>
-              <a:rPr lang="en-US" dirty="0" smtClean="0"/>
-              <a:t>– List of handler objects and handling stops at first successful handling</a:t>
-            </a:r>
-          </a:p>
-          <a:p>
-            <a:r>
-              <a:rPr lang="en-US" b="1" dirty="0" err="1" smtClean="0"/>
-              <a:t>Iterator</a:t>
-            </a:r>
-            <a:r>
-              <a:rPr lang="en-US" b="1" dirty="0" smtClean="0"/>
-              <a:t> </a:t>
-            </a:r>
-            <a:r>
-              <a:rPr lang="en-US" dirty="0" smtClean="0"/>
-              <a:t>– </a:t>
-            </a:r>
-            <a:r>
-              <a:rPr lang="en-US" dirty="0" err="1" smtClean="0"/>
-              <a:t>foreach</a:t>
-            </a:r>
-            <a:r>
-              <a:rPr lang="en-US" dirty="0" smtClean="0"/>
-              <a:t> case closed</a:t>
-            </a:r>
-          </a:p>
-          <a:p>
-            <a:r>
-              <a:rPr lang="en-US" b="1" dirty="0" smtClean="0"/>
-              <a:t>Mediator </a:t>
-            </a:r>
-            <a:r>
-              <a:rPr lang="en-US" dirty="0" smtClean="0"/>
-              <a:t>– enables communications of objects without those objects knowing each other</a:t>
-            </a:r>
-          </a:p>
-          <a:p>
-            <a:endParaRPr lang="en-US" dirty="0" smtClean="0"/>
           </a:p>
         </p:txBody>
       </p:sp>

</xml_diff>